<commit_message>
Slides Naming conventions and Nested Deployments have been added
</commit_message>
<xml_diff>
--- a/meetup-slides.pptx
+++ b/meetup-slides.pptx
@@ -5,7 +5,7 @@
     <p:sldMasterId id="2147483648" r:id="rId4"/>
   </p:sldMasterIdLst>
   <p:notesMasterIdLst>
-    <p:notesMasterId r:id="rId19"/>
+    <p:notesMasterId r:id="rId21"/>
   </p:notesMasterIdLst>
   <p:sldIdLst>
     <p:sldId id="256" r:id="rId5"/>
@@ -17,11 +17,13 @@
     <p:sldId id="259" r:id="rId11"/>
     <p:sldId id="264" r:id="rId12"/>
     <p:sldId id="262" r:id="rId13"/>
-    <p:sldId id="267" r:id="rId14"/>
-    <p:sldId id="261" r:id="rId15"/>
-    <p:sldId id="265" r:id="rId16"/>
-    <p:sldId id="266" r:id="rId17"/>
-    <p:sldId id="268" r:id="rId18"/>
+    <p:sldId id="270" r:id="rId14"/>
+    <p:sldId id="267" r:id="rId15"/>
+    <p:sldId id="261" r:id="rId16"/>
+    <p:sldId id="265" r:id="rId17"/>
+    <p:sldId id="271" r:id="rId18"/>
+    <p:sldId id="266" r:id="rId19"/>
+    <p:sldId id="268" r:id="rId20"/>
   </p:sldIdLst>
   <p:sldSz cx="12192000" cy="6858000"/>
   <p:notesSz cx="6858000" cy="9144000"/>
@@ -139,10 +141,6 @@
 </p:presentation>
 </file>
 
-<file path=ppt/revisionInfo.xml><?xml version="1.0" encoding="utf-8"?>
-<p1510:revInfo xmlns:a="http://schemas.openxmlformats.org/drawingml/2006/main" xmlns:r="http://schemas.openxmlformats.org/officeDocument/2006/relationships" xmlns:p1510="http://schemas.microsoft.com/office/powerpoint/2015/10/main"/>
-</file>
-
 <file path=ppt/notesMasters/notesMaster1.xml><?xml version="1.0" encoding="utf-8"?>
 <p:notesMaster xmlns:a="http://schemas.openxmlformats.org/drawingml/2006/main" xmlns:r="http://schemas.openxmlformats.org/officeDocument/2006/relationships" xmlns:p="http://schemas.openxmlformats.org/presentationml/2006/main">
   <p:cSld>
@@ -225,7 +223,7 @@
           <a:p>
             <a:fld id="{1FC3341F-0C55-4C8F-B15B-0191D7D89B5D}" type="datetimeFigureOut">
               <a:rPr lang="de-DE" smtClean="0"/>
-              <a:t>16.12.2017</a:t>
+              <a:t>24.02.2018</a:t>
             </a:fld>
             <a:endParaRPr lang="de-DE"/>
           </a:p>
@@ -1917,7 +1915,7 @@
           <a:p>
             <a:fld id="{A9CB1174-AD10-43F3-85BB-D9E528253736}" type="slidenum">
               <a:rPr lang="de-DE" smtClean="0"/>
-              <a:t>11</a:t>
+              <a:t>12</a:t>
             </a:fld>
             <a:endParaRPr lang="de-DE"/>
           </a:p>
@@ -2083,7 +2081,7 @@
           <a:p>
             <a:fld id="{EF617A4E-D3F1-4F1D-A735-6FDB733985F3}" type="datetime1">
               <a:rPr lang="de-DE" smtClean="0"/>
-              <a:t>16.12.2017</a:t>
+              <a:t>24.02.2018</a:t>
             </a:fld>
             <a:endParaRPr lang="de-DE"/>
           </a:p>
@@ -2301,7 +2299,7 @@
           <a:p>
             <a:fld id="{20FA97AD-D0DD-468C-8962-6F6139B2CB67}" type="datetime1">
               <a:rPr lang="de-DE" smtClean="0"/>
-              <a:t>16.12.2017</a:t>
+              <a:t>24.02.2018</a:t>
             </a:fld>
             <a:endParaRPr lang="de-DE"/>
           </a:p>
@@ -2512,7 +2510,7 @@
           <a:p>
             <a:fld id="{A5CCAB40-DC5B-4CA6-8A08-2243973DD615}" type="datetime1">
               <a:rPr lang="de-DE" smtClean="0"/>
-              <a:t>16.12.2017</a:t>
+              <a:t>24.02.2018</a:t>
             </a:fld>
             <a:endParaRPr lang="de-DE"/>
           </a:p>
@@ -2713,7 +2711,7 @@
           <a:p>
             <a:fld id="{93F60345-1EA2-4B69-B767-E525A3C2A026}" type="datetime1">
               <a:rPr lang="de-DE" smtClean="0"/>
-              <a:t>16.12.2017</a:t>
+              <a:t>24.02.2018</a:t>
             </a:fld>
             <a:endParaRPr lang="de-DE"/>
           </a:p>
@@ -2991,7 +2989,7 @@
           <a:p>
             <a:fld id="{C52CB2D1-97A0-42A9-9D97-BD4889C5B434}" type="datetime1">
               <a:rPr lang="de-DE" smtClean="0"/>
-              <a:t>16.12.2017</a:t>
+              <a:t>24.02.2018</a:t>
             </a:fld>
             <a:endParaRPr lang="de-DE"/>
           </a:p>
@@ -3259,7 +3257,7 @@
           <a:p>
             <a:fld id="{E42E2172-073E-4F12-B886-B43846F0DF2F}" type="datetime1">
               <a:rPr lang="de-DE" smtClean="0"/>
-              <a:t>16.12.2017</a:t>
+              <a:t>24.02.2018</a:t>
             </a:fld>
             <a:endParaRPr lang="de-DE"/>
           </a:p>
@@ -3674,7 +3672,7 @@
           <a:p>
             <a:fld id="{BF7DAA22-8B0C-45B6-B1DF-56C5DBA5AFF7}" type="datetime1">
               <a:rPr lang="de-DE" smtClean="0"/>
-              <a:t>16.12.2017</a:t>
+              <a:t>24.02.2018</a:t>
             </a:fld>
             <a:endParaRPr lang="de-DE"/>
           </a:p>
@@ -3818,7 +3816,7 @@
           <a:p>
             <a:fld id="{E8E521B9-21AD-4309-B7CF-0B27FD850F88}" type="datetime1">
               <a:rPr lang="de-DE" smtClean="0"/>
-              <a:t>16.12.2017</a:t>
+              <a:t>24.02.2018</a:t>
             </a:fld>
             <a:endParaRPr lang="de-DE"/>
           </a:p>
@@ -3934,7 +3932,7 @@
           <a:p>
             <a:fld id="{FE3C7DAE-D66A-4092-B86F-77D15F07C7E4}" type="datetime1">
               <a:rPr lang="de-DE" smtClean="0"/>
-              <a:t>16.12.2017</a:t>
+              <a:t>24.02.2018</a:t>
             </a:fld>
             <a:endParaRPr lang="de-DE"/>
           </a:p>
@@ -4248,7 +4246,7 @@
           <a:p>
             <a:fld id="{2B8383A9-53B2-43BD-8D6F-6423125336B7}" type="datetime1">
               <a:rPr lang="de-DE" smtClean="0"/>
-              <a:t>16.12.2017</a:t>
+              <a:t>24.02.2018</a:t>
             </a:fld>
             <a:endParaRPr lang="de-DE"/>
           </a:p>
@@ -4539,7 +4537,7 @@
           <a:p>
             <a:fld id="{6FF1D10D-9FE0-4781-A466-F943D1D5EDF3}" type="datetime1">
               <a:rPr lang="de-DE" smtClean="0"/>
-              <a:t>16.12.2017</a:t>
+              <a:t>24.02.2018</a:t>
             </a:fld>
             <a:endParaRPr lang="de-DE"/>
           </a:p>
@@ -4835,7 +4833,7 @@
           <a:p>
             <a:fld id="{511110B1-5D0A-49F0-9940-964C42EA8456}" type="datetime1">
               <a:rPr lang="de-DE" smtClean="0"/>
-              <a:t>16.12.2017</a:t>
+              <a:t>24.02.2018</a:t>
             </a:fld>
             <a:endParaRPr lang="de-DE"/>
           </a:p>
@@ -5303,8 +5301,8 @@
         </p:nvSpPr>
         <p:spPr>
           <a:xfrm>
-            <a:off x="9280634" y="0"/>
-            <a:ext cx="3247697" cy="2123090"/>
+            <a:off x="9280635" y="0"/>
+            <a:ext cx="2911366" cy="2123090"/>
           </a:xfrm>
           <a:prstGeom prst="rect">
             <a:avLst/>
@@ -5400,13 +5398,7 @@
           <a:p>
             <a:r>
               <a:rPr lang="de-DE" dirty="0"/>
-              <a:t>Deploy Christmas </a:t>
-            </a:r>
-          </a:p>
-          <a:p>
-            <a:r>
-              <a:rPr lang="de-DE" dirty="0"/>
-              <a:t> Azure Infrastructure </a:t>
+              <a:t>Azure Infrastructure </a:t>
             </a:r>
             <a:r>
               <a:rPr lang="de-DE" dirty="0" err="1"/>
@@ -5480,10 +5472,10 @@
       </p:grpSpPr>
       <p:sp>
         <p:nvSpPr>
-          <p:cNvPr id="2" name="Titel 1">
-            <a:extLst>
-              <a:ext uri="{FF2B5EF4-FFF2-40B4-BE49-F238E27FC236}">
-                <a16:creationId xmlns:a16="http://schemas.microsoft.com/office/drawing/2014/main" id="{7114DA6D-FE59-490A-9004-62DF38B2D936}"/>
+          <p:cNvPr id="2" name="Title 1">
+            <a:extLst>
+              <a:ext uri="{FF2B5EF4-FFF2-40B4-BE49-F238E27FC236}">
+                <a16:creationId xmlns:a16="http://schemas.microsoft.com/office/drawing/2014/main" id="{77473AC3-C28E-4B21-ACA4-F1C0581A3158}"/>
               </a:ext>
             </a:extLst>
           </p:cNvPr>
@@ -5494,32 +5486,24 @@
             <p:ph type="title"/>
           </p:nvPr>
         </p:nvSpPr>
-        <p:spPr>
-          <a:xfrm>
-            <a:off x="0" y="2766218"/>
-            <a:ext cx="12192000" cy="1325563"/>
-          </a:xfrm>
-        </p:spPr>
-        <p:txBody>
-          <a:bodyPr>
-            <a:normAutofit/>
-          </a:bodyPr>
-          <a:lstStyle/>
-          <a:p>
-            <a:pPr algn="ctr"/>
-            <a:r>
-              <a:rPr lang="de-DE" sz="8800" dirty="0"/>
-              <a:t>Hands On!</a:t>
-            </a:r>
-          </a:p>
-        </p:txBody>
-      </p:sp>
-      <p:sp>
-        <p:nvSpPr>
-          <p:cNvPr id="4" name="Fußzeilenplatzhalter 3">
-            <a:extLst>
-              <a:ext uri="{FF2B5EF4-FFF2-40B4-BE49-F238E27FC236}">
-                <a16:creationId xmlns:a16="http://schemas.microsoft.com/office/drawing/2014/main" id="{EAAA7E8D-7422-4D87-A4CD-DA509BDDF5DC}"/>
+        <p:spPr/>
+        <p:txBody>
+          <a:bodyPr/>
+          <a:lstStyle/>
+          <a:p>
+            <a:r>
+              <a:rPr lang="en-US" dirty="0"/>
+              <a:t>Naming Conventions</a:t>
+            </a:r>
+          </a:p>
+        </p:txBody>
+      </p:sp>
+      <p:sp>
+        <p:nvSpPr>
+          <p:cNvPr id="4" name="Footer Placeholder 3">
+            <a:extLst>
+              <a:ext uri="{FF2B5EF4-FFF2-40B4-BE49-F238E27FC236}">
+                <a16:creationId xmlns:a16="http://schemas.microsoft.com/office/drawing/2014/main" id="{9C0FDBBD-51DA-4A67-8A4B-EBBA369F8F32}"/>
               </a:ext>
             </a:extLst>
           </p:cNvPr>
@@ -5537,13 +5521,7 @@
           <a:p>
             <a:r>
               <a:rPr lang="de-DE" dirty="0"/>
-              <a:t>Deploy Christmas </a:t>
-            </a:r>
-          </a:p>
-          <a:p>
-            <a:r>
-              <a:rPr lang="de-DE" dirty="0"/>
-              <a:t> Azure Infrastructure </a:t>
+              <a:t>Azure Infrastructure </a:t>
             </a:r>
             <a:r>
               <a:rPr lang="de-DE" dirty="0" err="1"/>
@@ -5558,10 +5536,10 @@
       </p:sp>
       <p:sp>
         <p:nvSpPr>
-          <p:cNvPr id="5" name="Foliennummernplatzhalter 4">
-            <a:extLst>
-              <a:ext uri="{FF2B5EF4-FFF2-40B4-BE49-F238E27FC236}">
-                <a16:creationId xmlns:a16="http://schemas.microsoft.com/office/drawing/2014/main" id="{34D2BEEB-B9A2-4D14-85A6-544FCED20DD5}"/>
+          <p:cNvPr id="5" name="Slide Number Placeholder 4">
+            <a:extLst>
+              <a:ext uri="{FF2B5EF4-FFF2-40B4-BE49-F238E27FC236}">
+                <a16:creationId xmlns:a16="http://schemas.microsoft.com/office/drawing/2014/main" id="{A02E25F7-6639-4698-AD3E-F2146619E96F}"/>
               </a:ext>
             </a:extLst>
           </p:cNvPr>
@@ -5585,10 +5563,604 @@
           </a:p>
         </p:txBody>
       </p:sp>
+      <p:pic>
+        <p:nvPicPr>
+          <p:cNvPr id="6" name="Picture 5">
+            <a:extLst>
+              <a:ext uri="{FF2B5EF4-FFF2-40B4-BE49-F238E27FC236}">
+                <a16:creationId xmlns:a16="http://schemas.microsoft.com/office/drawing/2014/main" id="{CDFCE406-3E00-42D4-B093-B1383C52635E}"/>
+              </a:ext>
+            </a:extLst>
+          </p:cNvPr>
+          <p:cNvPicPr>
+            <a:picLocks noChangeAspect="1"/>
+          </p:cNvPicPr>
+          <p:nvPr/>
+        </p:nvPicPr>
+        <p:blipFill>
+          <a:blip r:embed="rId2"/>
+          <a:stretch>
+            <a:fillRect/>
+          </a:stretch>
+        </p:blipFill>
+        <p:spPr>
+          <a:xfrm>
+            <a:off x="1007719" y="1842156"/>
+            <a:ext cx="780290" cy="665754"/>
+          </a:xfrm>
+          <a:prstGeom prst="rect">
+            <a:avLst/>
+          </a:prstGeom>
+        </p:spPr>
+      </p:pic>
+      <p:pic>
+        <p:nvPicPr>
+          <p:cNvPr id="7" name="Picture 6">
+            <a:extLst>
+              <a:ext uri="{FF2B5EF4-FFF2-40B4-BE49-F238E27FC236}">
+                <a16:creationId xmlns:a16="http://schemas.microsoft.com/office/drawing/2014/main" id="{C54EDB51-C10E-4834-9B0F-349D9A1FE533}"/>
+              </a:ext>
+            </a:extLst>
+          </p:cNvPr>
+          <p:cNvPicPr>
+            <a:picLocks noChangeAspect="1"/>
+          </p:cNvPicPr>
+          <p:nvPr/>
+        </p:nvPicPr>
+        <p:blipFill>
+          <a:blip r:embed="rId3"/>
+          <a:stretch>
+            <a:fillRect/>
+          </a:stretch>
+        </p:blipFill>
+        <p:spPr>
+          <a:xfrm>
+            <a:off x="6258012" y="1830732"/>
+            <a:ext cx="821932" cy="688601"/>
+          </a:xfrm>
+          <a:prstGeom prst="rect">
+            <a:avLst/>
+          </a:prstGeom>
+        </p:spPr>
+      </p:pic>
+      <p:pic>
+        <p:nvPicPr>
+          <p:cNvPr id="9" name="Picture 8">
+            <a:extLst>
+              <a:ext uri="{FF2B5EF4-FFF2-40B4-BE49-F238E27FC236}">
+                <a16:creationId xmlns:a16="http://schemas.microsoft.com/office/drawing/2014/main" id="{AAF02F85-EC95-4124-961A-916DBB519012}"/>
+              </a:ext>
+            </a:extLst>
+          </p:cNvPr>
+          <p:cNvPicPr>
+            <a:picLocks noChangeAspect="1"/>
+          </p:cNvPicPr>
+          <p:nvPr/>
+        </p:nvPicPr>
+        <p:blipFill>
+          <a:blip r:embed="rId4">
+            <a:extLst>
+              <a:ext uri="{28A0092B-C50C-407E-A947-70E740481C1C}">
+                <a14:useLocalDpi xmlns:a14="http://schemas.microsoft.com/office/drawing/2010/main" val="0"/>
+              </a:ext>
+            </a:extLst>
+          </a:blip>
+          <a:stretch>
+            <a:fillRect/>
+          </a:stretch>
+        </p:blipFill>
+        <p:spPr>
+          <a:xfrm>
+            <a:off x="967400" y="3888451"/>
+            <a:ext cx="780290" cy="780290"/>
+          </a:xfrm>
+          <a:prstGeom prst="rect">
+            <a:avLst/>
+          </a:prstGeom>
+        </p:spPr>
+      </p:pic>
+      <p:grpSp>
+        <p:nvGrpSpPr>
+          <p:cNvPr id="15" name="Group 14">
+            <a:extLst>
+              <a:ext uri="{FF2B5EF4-FFF2-40B4-BE49-F238E27FC236}">
+                <a16:creationId xmlns:a16="http://schemas.microsoft.com/office/drawing/2014/main" id="{F828AB2A-A02E-4422-816A-C6F94AE060CD}"/>
+              </a:ext>
+            </a:extLst>
+          </p:cNvPr>
+          <p:cNvGrpSpPr/>
+          <p:nvPr/>
+        </p:nvGrpSpPr>
+        <p:grpSpPr>
+          <a:xfrm>
+            <a:off x="1788009" y="1786346"/>
+            <a:ext cx="4114799" cy="1943017"/>
+            <a:chOff x="1788009" y="1786346"/>
+            <a:chExt cx="4114799" cy="1943017"/>
+          </a:xfrm>
+        </p:grpSpPr>
+        <p:sp>
+          <p:nvSpPr>
+            <p:cNvPr id="10" name="Rectangle 9">
+              <a:extLst>
+                <a:ext uri="{FF2B5EF4-FFF2-40B4-BE49-F238E27FC236}">
+                  <a16:creationId xmlns:a16="http://schemas.microsoft.com/office/drawing/2014/main" id="{0F9E10CC-8614-49AC-BC7D-EB5F606CB49F}"/>
+                </a:ext>
+              </a:extLst>
+            </p:cNvPr>
+            <p:cNvSpPr/>
+            <p:nvPr/>
+          </p:nvSpPr>
+          <p:spPr>
+            <a:xfrm>
+              <a:off x="1788009" y="1786346"/>
+              <a:ext cx="2797625" cy="523220"/>
+            </a:xfrm>
+            <a:prstGeom prst="rect">
+              <a:avLst/>
+            </a:prstGeom>
+          </p:spPr>
+          <p:txBody>
+            <a:bodyPr wrap="none">
+              <a:spAutoFit/>
+            </a:bodyPr>
+            <a:lstStyle/>
+            <a:p>
+              <a:r>
+                <a:rPr lang="de-DE" sz="2800" dirty="0"/>
+                <a:t>Storage Account</a:t>
+              </a:r>
+            </a:p>
+          </p:txBody>
+        </p:sp>
+        <p:sp>
+          <p:nvSpPr>
+            <p:cNvPr id="11" name="TextBox 10">
+              <a:extLst>
+                <a:ext uri="{FF2B5EF4-FFF2-40B4-BE49-F238E27FC236}">
+                  <a16:creationId xmlns:a16="http://schemas.microsoft.com/office/drawing/2014/main" id="{49444C2A-70FC-4151-8F66-4D02EA39EDBC}"/>
+                </a:ext>
+              </a:extLst>
+            </p:cNvPr>
+            <p:cNvSpPr txBox="1"/>
+            <p:nvPr/>
+          </p:nvSpPr>
+          <p:spPr>
+            <a:xfrm>
+              <a:off x="1841577" y="2529034"/>
+              <a:ext cx="3160451" cy="1200329"/>
+            </a:xfrm>
+            <a:prstGeom prst="rect">
+              <a:avLst/>
+            </a:prstGeom>
+            <a:noFill/>
+          </p:spPr>
+          <p:txBody>
+            <a:bodyPr wrap="square" rtlCol="0">
+              <a:spAutoFit/>
+            </a:bodyPr>
+            <a:lstStyle/>
+            <a:p>
+              <a:pPr marL="285750" indent="-285750">
+                <a:buFontTx/>
+                <a:buChar char="-"/>
+              </a:pPr>
+              <a:r>
+                <a:rPr lang="en-US" dirty="0"/>
+                <a:t>Globally unique name</a:t>
+              </a:r>
+            </a:p>
+            <a:p>
+              <a:pPr marL="285750" indent="-285750">
+                <a:buFontTx/>
+                <a:buChar char="-"/>
+              </a:pPr>
+              <a:r>
+                <a:rPr lang="en-US" dirty="0"/>
+                <a:t>Lower case letters only</a:t>
+              </a:r>
+            </a:p>
+            <a:p>
+              <a:pPr marL="285750" indent="-285750">
+                <a:buFontTx/>
+                <a:buChar char="-"/>
+              </a:pPr>
+              <a:r>
+                <a:rPr lang="en-US" dirty="0"/>
+                <a:t>No special characters</a:t>
+              </a:r>
+            </a:p>
+            <a:p>
+              <a:endParaRPr lang="en-US" dirty="0"/>
+            </a:p>
+          </p:txBody>
+        </p:sp>
+        <p:sp>
+          <p:nvSpPr>
+            <p:cNvPr id="14" name="TextBox 13">
+              <a:extLst>
+                <a:ext uri="{FF2B5EF4-FFF2-40B4-BE49-F238E27FC236}">
+                  <a16:creationId xmlns:a16="http://schemas.microsoft.com/office/drawing/2014/main" id="{BACBCF3C-DF9E-4964-9CAA-46994805A463}"/>
+                </a:ext>
+              </a:extLst>
+            </p:cNvPr>
+            <p:cNvSpPr txBox="1"/>
+            <p:nvPr/>
+          </p:nvSpPr>
+          <p:spPr>
+            <a:xfrm>
+              <a:off x="1788009" y="2196167"/>
+              <a:ext cx="4114799" cy="646331"/>
+            </a:xfrm>
+            <a:prstGeom prst="rect">
+              <a:avLst/>
+            </a:prstGeom>
+            <a:noFill/>
+          </p:spPr>
+          <p:txBody>
+            <a:bodyPr wrap="square" rtlCol="0">
+              <a:spAutoFit/>
+            </a:bodyPr>
+            <a:lstStyle/>
+            <a:p>
+              <a:r>
+                <a:rPr lang="en-US" i="1" dirty="0">
+                  <a:solidFill>
+                    <a:schemeClr val="accent1"/>
+                  </a:solidFill>
+                </a:rPr>
+                <a:t>name.type.core.windows.net</a:t>
+              </a:r>
+              <a:endParaRPr lang="en-US" dirty="0">
+                <a:solidFill>
+                  <a:schemeClr val="accent1"/>
+                </a:solidFill>
+              </a:endParaRPr>
+            </a:p>
+            <a:p>
+              <a:endParaRPr lang="en-US" dirty="0"/>
+            </a:p>
+          </p:txBody>
+        </p:sp>
+      </p:grpSp>
+      <p:grpSp>
+        <p:nvGrpSpPr>
+          <p:cNvPr id="16" name="Group 15">
+            <a:extLst>
+              <a:ext uri="{FF2B5EF4-FFF2-40B4-BE49-F238E27FC236}">
+                <a16:creationId xmlns:a16="http://schemas.microsoft.com/office/drawing/2014/main" id="{66B4F864-F43E-454B-8987-4ED562F81743}"/>
+              </a:ext>
+            </a:extLst>
+          </p:cNvPr>
+          <p:cNvGrpSpPr/>
+          <p:nvPr/>
+        </p:nvGrpSpPr>
+        <p:grpSpPr>
+          <a:xfrm>
+            <a:off x="7079944" y="1830732"/>
+            <a:ext cx="4273856" cy="1389019"/>
+            <a:chOff x="1788009" y="1786346"/>
+            <a:chExt cx="4273856" cy="1389019"/>
+          </a:xfrm>
+        </p:grpSpPr>
+        <p:sp>
+          <p:nvSpPr>
+            <p:cNvPr id="17" name="Rectangle 16">
+              <a:extLst>
+                <a:ext uri="{FF2B5EF4-FFF2-40B4-BE49-F238E27FC236}">
+                  <a16:creationId xmlns:a16="http://schemas.microsoft.com/office/drawing/2014/main" id="{F5DEF94B-4955-474C-A588-109417C091EC}"/>
+                </a:ext>
+              </a:extLst>
+            </p:cNvPr>
+            <p:cNvSpPr/>
+            <p:nvPr/>
+          </p:nvSpPr>
+          <p:spPr>
+            <a:xfrm>
+              <a:off x="1788009" y="1786346"/>
+              <a:ext cx="1532792" cy="523220"/>
+            </a:xfrm>
+            <a:prstGeom prst="rect">
+              <a:avLst/>
+            </a:prstGeom>
+          </p:spPr>
+          <p:txBody>
+            <a:bodyPr wrap="none">
+              <a:spAutoFit/>
+            </a:bodyPr>
+            <a:lstStyle/>
+            <a:p>
+              <a:r>
+                <a:rPr lang="de-DE" sz="2800" dirty="0"/>
+                <a:t>Public IP</a:t>
+              </a:r>
+            </a:p>
+          </p:txBody>
+        </p:sp>
+        <p:sp>
+          <p:nvSpPr>
+            <p:cNvPr id="18" name="TextBox 17">
+              <a:extLst>
+                <a:ext uri="{FF2B5EF4-FFF2-40B4-BE49-F238E27FC236}">
+                  <a16:creationId xmlns:a16="http://schemas.microsoft.com/office/drawing/2014/main" id="{420A9D51-5114-4B03-94B4-9EE8C94581C0}"/>
+                </a:ext>
+              </a:extLst>
+            </p:cNvPr>
+            <p:cNvSpPr txBox="1"/>
+            <p:nvPr/>
+          </p:nvSpPr>
+          <p:spPr>
+            <a:xfrm>
+              <a:off x="1841577" y="2529034"/>
+              <a:ext cx="4220288" cy="646331"/>
+            </a:xfrm>
+            <a:prstGeom prst="rect">
+              <a:avLst/>
+            </a:prstGeom>
+            <a:noFill/>
+          </p:spPr>
+          <p:txBody>
+            <a:bodyPr wrap="square" rtlCol="0">
+              <a:spAutoFit/>
+            </a:bodyPr>
+            <a:lstStyle/>
+            <a:p>
+              <a:pPr marL="285750" indent="-285750">
+                <a:buFontTx/>
+                <a:buChar char="-"/>
+              </a:pPr>
+              <a:r>
+                <a:rPr lang="en-US" dirty="0"/>
+                <a:t>Location/Region unique name </a:t>
+              </a:r>
+            </a:p>
+            <a:p>
+              <a:endParaRPr lang="en-US" dirty="0"/>
+            </a:p>
+          </p:txBody>
+        </p:sp>
+        <p:sp>
+          <p:nvSpPr>
+            <p:cNvPr id="19" name="TextBox 18">
+              <a:extLst>
+                <a:ext uri="{FF2B5EF4-FFF2-40B4-BE49-F238E27FC236}">
+                  <a16:creationId xmlns:a16="http://schemas.microsoft.com/office/drawing/2014/main" id="{181CFCCF-6F65-46C3-9387-BDA9332996E9}"/>
+                </a:ext>
+              </a:extLst>
+            </p:cNvPr>
+            <p:cNvSpPr txBox="1"/>
+            <p:nvPr/>
+          </p:nvSpPr>
+          <p:spPr>
+            <a:xfrm>
+              <a:off x="1788009" y="2196167"/>
+              <a:ext cx="4114799" cy="646331"/>
+            </a:xfrm>
+            <a:prstGeom prst="rect">
+              <a:avLst/>
+            </a:prstGeom>
+            <a:noFill/>
+          </p:spPr>
+          <p:txBody>
+            <a:bodyPr wrap="square" rtlCol="0">
+              <a:spAutoFit/>
+            </a:bodyPr>
+            <a:lstStyle/>
+            <a:p>
+              <a:r>
+                <a:rPr lang="en-US" i="1" dirty="0">
+                  <a:solidFill>
+                    <a:schemeClr val="accent1"/>
+                  </a:solidFill>
+                </a:rPr>
+                <a:t>name.region.cloudapp.azure.com</a:t>
+              </a:r>
+              <a:endParaRPr lang="en-US" dirty="0">
+                <a:solidFill>
+                  <a:schemeClr val="accent1"/>
+                </a:solidFill>
+              </a:endParaRPr>
+            </a:p>
+            <a:p>
+              <a:endParaRPr lang="en-US" dirty="0"/>
+            </a:p>
+          </p:txBody>
+        </p:sp>
+      </p:grpSp>
+      <p:grpSp>
+        <p:nvGrpSpPr>
+          <p:cNvPr id="20" name="Group 19">
+            <a:extLst>
+              <a:ext uri="{FF2B5EF4-FFF2-40B4-BE49-F238E27FC236}">
+                <a16:creationId xmlns:a16="http://schemas.microsoft.com/office/drawing/2014/main" id="{94F7401F-6BDC-4DD7-A137-290D0088AC5B}"/>
+              </a:ext>
+            </a:extLst>
+          </p:cNvPr>
+          <p:cNvGrpSpPr/>
+          <p:nvPr/>
+        </p:nvGrpSpPr>
+        <p:grpSpPr>
+          <a:xfrm>
+            <a:off x="1747690" y="3888451"/>
+            <a:ext cx="4348310" cy="1389019"/>
+            <a:chOff x="1788009" y="1786346"/>
+            <a:chExt cx="4348310" cy="1389019"/>
+          </a:xfrm>
+        </p:grpSpPr>
+        <p:sp>
+          <p:nvSpPr>
+            <p:cNvPr id="21" name="Rectangle 20">
+              <a:extLst>
+                <a:ext uri="{FF2B5EF4-FFF2-40B4-BE49-F238E27FC236}">
+                  <a16:creationId xmlns:a16="http://schemas.microsoft.com/office/drawing/2014/main" id="{508042E5-0A10-4FD3-9955-B23600151BAC}"/>
+                </a:ext>
+              </a:extLst>
+            </p:cNvPr>
+            <p:cNvSpPr/>
+            <p:nvPr/>
+          </p:nvSpPr>
+          <p:spPr>
+            <a:xfrm>
+              <a:off x="1788009" y="1786346"/>
+              <a:ext cx="1638525" cy="523220"/>
+            </a:xfrm>
+            <a:prstGeom prst="rect">
+              <a:avLst/>
+            </a:prstGeom>
+          </p:spPr>
+          <p:txBody>
+            <a:bodyPr wrap="none">
+              <a:spAutoFit/>
+            </a:bodyPr>
+            <a:lstStyle/>
+            <a:p>
+              <a:r>
+                <a:rPr lang="de-DE" sz="2800" dirty="0"/>
+                <a:t>Key Vault</a:t>
+              </a:r>
+            </a:p>
+          </p:txBody>
+        </p:sp>
+        <p:sp>
+          <p:nvSpPr>
+            <p:cNvPr id="22" name="TextBox 21">
+              <a:extLst>
+                <a:ext uri="{FF2B5EF4-FFF2-40B4-BE49-F238E27FC236}">
+                  <a16:creationId xmlns:a16="http://schemas.microsoft.com/office/drawing/2014/main" id="{88545FAE-6998-4B20-BC7E-C682F91D691A}"/>
+                </a:ext>
+              </a:extLst>
+            </p:cNvPr>
+            <p:cNvSpPr txBox="1"/>
+            <p:nvPr/>
+          </p:nvSpPr>
+          <p:spPr>
+            <a:xfrm>
+              <a:off x="1841577" y="2529034"/>
+              <a:ext cx="4294742" cy="646331"/>
+            </a:xfrm>
+            <a:prstGeom prst="rect">
+              <a:avLst/>
+            </a:prstGeom>
+            <a:noFill/>
+          </p:spPr>
+          <p:txBody>
+            <a:bodyPr wrap="square" rtlCol="0">
+              <a:spAutoFit/>
+            </a:bodyPr>
+            <a:lstStyle/>
+            <a:p>
+              <a:pPr marL="285750" indent="-285750">
+                <a:buFontTx/>
+                <a:buChar char="-"/>
+              </a:pPr>
+              <a:r>
+                <a:rPr lang="en-US" dirty="0"/>
+                <a:t>Globally unique name</a:t>
+              </a:r>
+            </a:p>
+            <a:p>
+              <a:pPr marL="285750" indent="-285750">
+                <a:buFontTx/>
+                <a:buChar char="-"/>
+              </a:pPr>
+              <a:r>
+                <a:rPr lang="en-GB" dirty="0"/>
+                <a:t>containing only (0-9, a-z, A-Z, and -)</a:t>
+              </a:r>
+              <a:endParaRPr lang="en-US" dirty="0"/>
+            </a:p>
+          </p:txBody>
+        </p:sp>
+        <p:sp>
+          <p:nvSpPr>
+            <p:cNvPr id="23" name="TextBox 22">
+              <a:extLst>
+                <a:ext uri="{FF2B5EF4-FFF2-40B4-BE49-F238E27FC236}">
+                  <a16:creationId xmlns:a16="http://schemas.microsoft.com/office/drawing/2014/main" id="{54B228A6-992B-4930-94FF-2D1FFD40E0B5}"/>
+                </a:ext>
+              </a:extLst>
+            </p:cNvPr>
+            <p:cNvSpPr txBox="1"/>
+            <p:nvPr/>
+          </p:nvSpPr>
+          <p:spPr>
+            <a:xfrm>
+              <a:off x="1788009" y="2196167"/>
+              <a:ext cx="4114799" cy="646331"/>
+            </a:xfrm>
+            <a:prstGeom prst="rect">
+              <a:avLst/>
+            </a:prstGeom>
+            <a:noFill/>
+          </p:spPr>
+          <p:txBody>
+            <a:bodyPr wrap="square" rtlCol="0">
+              <a:spAutoFit/>
+            </a:bodyPr>
+            <a:lstStyle/>
+            <a:p>
+              <a:r>
+                <a:rPr lang="en-US" i="1" dirty="0">
+                  <a:solidFill>
+                    <a:schemeClr val="accent1"/>
+                  </a:solidFill>
+                </a:rPr>
+                <a:t>name.vault.azure.net</a:t>
+              </a:r>
+              <a:endParaRPr lang="en-US" dirty="0">
+                <a:solidFill>
+                  <a:schemeClr val="accent1"/>
+                </a:solidFill>
+              </a:endParaRPr>
+            </a:p>
+            <a:p>
+              <a:endParaRPr lang="en-US" dirty="0"/>
+            </a:p>
+          </p:txBody>
+        </p:sp>
+      </p:grpSp>
+      <p:sp>
+        <p:nvSpPr>
+          <p:cNvPr id="24" name="Rectangle 23">
+            <a:extLst>
+              <a:ext uri="{FF2B5EF4-FFF2-40B4-BE49-F238E27FC236}">
+                <a16:creationId xmlns:a16="http://schemas.microsoft.com/office/drawing/2014/main" id="{5F642154-ABE5-40F4-B0B6-01EBD1A1859B}"/>
+              </a:ext>
+            </a:extLst>
+          </p:cNvPr>
+          <p:cNvSpPr/>
+          <p:nvPr/>
+        </p:nvSpPr>
+        <p:spPr>
+          <a:xfrm>
+            <a:off x="3939363" y="5967724"/>
+            <a:ext cx="3926889" cy="307777"/>
+          </a:xfrm>
+          <a:prstGeom prst="rect">
+            <a:avLst/>
+          </a:prstGeom>
+        </p:spPr>
+        <p:txBody>
+          <a:bodyPr wrap="square">
+            <a:spAutoFit/>
+          </a:bodyPr>
+          <a:lstStyle/>
+          <a:p>
+            <a:pPr algn="ctr"/>
+            <a:r>
+              <a:rPr lang="en-GB" sz="1400" dirty="0">
+                <a:hlinkClick r:id="rId5"/>
+              </a:rPr>
+              <a:t>Azure best Practices Naming Conventions</a:t>
+            </a:r>
+            <a:endParaRPr lang="en-US" sz="1400" dirty="0"/>
+          </a:p>
+        </p:txBody>
+      </p:sp>
     </p:spTree>
     <p:extLst>
       <p:ext uri="{BB962C8B-B14F-4D97-AF65-F5344CB8AC3E}">
-        <p14:creationId xmlns:p14="http://schemas.microsoft.com/office/powerpoint/2010/main" val="1983487205"/>
+        <p14:creationId xmlns:p14="http://schemas.microsoft.com/office/powerpoint/2010/main" val="3212581014"/>
       </p:ext>
     </p:extLst>
   </p:cSld>
@@ -5620,7 +6192,7 @@
           <p:cNvPr id="2" name="Titel 1">
             <a:extLst>
               <a:ext uri="{FF2B5EF4-FFF2-40B4-BE49-F238E27FC236}">
-                <a16:creationId xmlns:a16="http://schemas.microsoft.com/office/drawing/2014/main" id="{A6184E26-A488-44A7-A9E6-0A423EFC52B9}"/>
+                <a16:creationId xmlns:a16="http://schemas.microsoft.com/office/drawing/2014/main" id="{7114DA6D-FE59-490A-9004-62DF38B2D936}"/>
               </a:ext>
             </a:extLst>
           </p:cNvPr>
@@ -5633,31 +6205,21 @@
         </p:nvSpPr>
         <p:spPr>
           <a:xfrm>
-            <a:off x="838200" y="365125"/>
-            <a:ext cx="7902388" cy="1325563"/>
-          </a:xfrm>
-        </p:spPr>
-        <p:txBody>
-          <a:bodyPr/>
-          <a:lstStyle/>
-          <a:p>
-            <a:r>
-              <a:rPr lang="de-DE" dirty="0"/>
-              <a:t>Infrastructure </a:t>
-            </a:r>
-            <a:r>
-              <a:rPr lang="de-DE" dirty="0" err="1"/>
-              <a:t>Deployment</a:t>
-            </a:r>
-            <a:r>
-              <a:rPr lang="de-DE" dirty="0"/>
-              <a:t> - </a:t>
-            </a:r>
-            <a:r>
-              <a:rPr lang="de-DE" dirty="0" err="1"/>
-              <a:t>Overview</a:t>
-            </a:r>
-            <a:endParaRPr lang="de-DE" dirty="0"/>
+            <a:off x="0" y="2766218"/>
+            <a:ext cx="12192000" cy="1325563"/>
+          </a:xfrm>
+        </p:spPr>
+        <p:txBody>
+          <a:bodyPr>
+            <a:normAutofit/>
+          </a:bodyPr>
+          <a:lstStyle/>
+          <a:p>
+            <a:pPr algn="ctr"/>
+            <a:r>
+              <a:rPr lang="de-DE" sz="8800" dirty="0"/>
+              <a:t>Hands On!</a:t>
+            </a:r>
           </a:p>
         </p:txBody>
       </p:sp>
@@ -5666,7 +6228,7 @@
           <p:cNvPr id="4" name="Fußzeilenplatzhalter 3">
             <a:extLst>
               <a:ext uri="{FF2B5EF4-FFF2-40B4-BE49-F238E27FC236}">
-                <a16:creationId xmlns:a16="http://schemas.microsoft.com/office/drawing/2014/main" id="{843E194F-2B10-423F-8040-41EEF10C1B45}"/>
+                <a16:creationId xmlns:a16="http://schemas.microsoft.com/office/drawing/2014/main" id="{EAAA7E8D-7422-4D87-A4CD-DA509BDDF5DC}"/>
               </a:ext>
             </a:extLst>
           </p:cNvPr>
@@ -5708,7 +6270,7 @@
           <p:cNvPr id="5" name="Foliennummernplatzhalter 4">
             <a:extLst>
               <a:ext uri="{FF2B5EF4-FFF2-40B4-BE49-F238E27FC236}">
-                <a16:creationId xmlns:a16="http://schemas.microsoft.com/office/drawing/2014/main" id="{17772B95-3B20-4904-BE53-002DF40B096F}"/>
+                <a16:creationId xmlns:a16="http://schemas.microsoft.com/office/drawing/2014/main" id="{34D2BEEB-B9A2-4D14-85A6-544FCED20DD5}"/>
               </a:ext>
             </a:extLst>
           </p:cNvPr>
@@ -5732,40 +6294,10 @@
           </a:p>
         </p:txBody>
       </p:sp>
-      <p:pic>
-        <p:nvPicPr>
-          <p:cNvPr id="9" name="Picture 8">
-            <a:extLst>
-              <a:ext uri="{FF2B5EF4-FFF2-40B4-BE49-F238E27FC236}">
-                <a16:creationId xmlns:a16="http://schemas.microsoft.com/office/drawing/2014/main" id="{6610EF61-EB14-4F13-AE70-B270AA2C35F0}"/>
-              </a:ext>
-            </a:extLst>
-          </p:cNvPr>
-          <p:cNvPicPr>
-            <a:picLocks noChangeAspect="1"/>
-          </p:cNvPicPr>
-          <p:nvPr/>
-        </p:nvPicPr>
-        <p:blipFill>
-          <a:blip r:embed="rId3"/>
-          <a:stretch>
-            <a:fillRect/>
-          </a:stretch>
-        </p:blipFill>
-        <p:spPr>
-          <a:xfrm>
-            <a:off x="3352251" y="1919792"/>
-            <a:ext cx="5487497" cy="3852134"/>
-          </a:xfrm>
-          <a:prstGeom prst="rect">
-            <a:avLst/>
-          </a:prstGeom>
-        </p:spPr>
-      </p:pic>
     </p:spTree>
     <p:extLst>
       <p:ext uri="{BB962C8B-B14F-4D97-AF65-F5344CB8AC3E}">
-        <p14:creationId xmlns:p14="http://schemas.microsoft.com/office/powerpoint/2010/main" val="2344483193"/>
+        <p14:creationId xmlns:p14="http://schemas.microsoft.com/office/powerpoint/2010/main" val="1983487205"/>
       </p:ext>
     </p:extLst>
   </p:cSld>
@@ -5794,68 +6326,10 @@
       </p:grpSpPr>
       <p:sp>
         <p:nvSpPr>
-          <p:cNvPr id="31" name="Rectangle 30">
-            <a:extLst>
-              <a:ext uri="{FF2B5EF4-FFF2-40B4-BE49-F238E27FC236}">
-                <a16:creationId xmlns:a16="http://schemas.microsoft.com/office/drawing/2014/main" id="{263F90AB-24C3-48C3-9074-6F43DB91278E}"/>
-              </a:ext>
-            </a:extLst>
-          </p:cNvPr>
-          <p:cNvSpPr/>
-          <p:nvPr/>
-        </p:nvSpPr>
-        <p:spPr>
-          <a:xfrm>
-            <a:off x="4099647" y="3131820"/>
-            <a:ext cx="2929803" cy="2411030"/>
-          </a:xfrm>
-          <a:prstGeom prst="rect">
-            <a:avLst/>
-          </a:prstGeom>
-          <a:solidFill>
-            <a:schemeClr val="bg1">
-              <a:lumMod val="85000"/>
-            </a:schemeClr>
-          </a:solidFill>
-          <a:ln>
-            <a:solidFill>
-              <a:schemeClr val="bg1">
-                <a:lumMod val="95000"/>
-              </a:schemeClr>
-            </a:solidFill>
-          </a:ln>
-        </p:spPr>
-        <p:style>
-          <a:lnRef idx="2">
-            <a:schemeClr val="accent1">
-              <a:shade val="50000"/>
-            </a:schemeClr>
-          </a:lnRef>
-          <a:fillRef idx="1">
-            <a:schemeClr val="accent1"/>
-          </a:fillRef>
-          <a:effectRef idx="0">
-            <a:schemeClr val="accent1"/>
-          </a:effectRef>
-          <a:fontRef idx="minor">
-            <a:schemeClr val="lt1"/>
-          </a:fontRef>
-        </p:style>
-        <p:txBody>
-          <a:bodyPr rtlCol="0" anchor="ctr"/>
-          <a:lstStyle/>
-          <a:p>
-            <a:pPr algn="ctr"/>
-            <a:endParaRPr lang="en-US"/>
-          </a:p>
-        </p:txBody>
-      </p:sp>
-      <p:sp>
-        <p:nvSpPr>
           <p:cNvPr id="2" name="Titel 1">
             <a:extLst>
               <a:ext uri="{FF2B5EF4-FFF2-40B4-BE49-F238E27FC236}">
-                <a16:creationId xmlns:a16="http://schemas.microsoft.com/office/drawing/2014/main" id="{7114DA6D-FE59-490A-9004-62DF38B2D936}"/>
+                <a16:creationId xmlns:a16="http://schemas.microsoft.com/office/drawing/2014/main" id="{A6184E26-A488-44A7-A9E6-0A423EFC52B9}"/>
               </a:ext>
             </a:extLst>
           </p:cNvPr>
@@ -5866,6 +6340,52 @@
             <p:ph type="title"/>
           </p:nvPr>
         </p:nvSpPr>
+        <p:spPr>
+          <a:xfrm>
+            <a:off x="838200" y="365125"/>
+            <a:ext cx="7902388" cy="1325563"/>
+          </a:xfrm>
+        </p:spPr>
+        <p:txBody>
+          <a:bodyPr/>
+          <a:lstStyle/>
+          <a:p>
+            <a:r>
+              <a:rPr lang="de-DE" dirty="0"/>
+              <a:t>Infrastructure </a:t>
+            </a:r>
+            <a:r>
+              <a:rPr lang="de-DE" dirty="0" err="1"/>
+              <a:t>Deployment</a:t>
+            </a:r>
+            <a:r>
+              <a:rPr lang="de-DE" dirty="0"/>
+              <a:t> - </a:t>
+            </a:r>
+            <a:r>
+              <a:rPr lang="de-DE" dirty="0" err="1"/>
+              <a:t>Overview</a:t>
+            </a:r>
+            <a:endParaRPr lang="de-DE" dirty="0"/>
+          </a:p>
+        </p:txBody>
+      </p:sp>
+      <p:sp>
+        <p:nvSpPr>
+          <p:cNvPr id="4" name="Fußzeilenplatzhalter 3">
+            <a:extLst>
+              <a:ext uri="{FF2B5EF4-FFF2-40B4-BE49-F238E27FC236}">
+                <a16:creationId xmlns:a16="http://schemas.microsoft.com/office/drawing/2014/main" id="{843E194F-2B10-423F-8040-41EEF10C1B45}"/>
+              </a:ext>
+            </a:extLst>
+          </p:cNvPr>
+          <p:cNvSpPr>
+            <a:spLocks noGrp="1"/>
+          </p:cNvSpPr>
+          <p:nvPr>
+            <p:ph type="ftr" sz="quarter" idx="11"/>
+          </p:nvPr>
+        </p:nvSpPr>
         <p:spPr/>
         <p:txBody>
           <a:bodyPr/>
@@ -5873,41 +6393,7 @@
           <a:p>
             <a:r>
               <a:rPr lang="de-DE" dirty="0"/>
-              <a:t>HA Scenarios</a:t>
-            </a:r>
-          </a:p>
-        </p:txBody>
-      </p:sp>
-      <p:sp>
-        <p:nvSpPr>
-          <p:cNvPr id="4" name="Fußzeilenplatzhalter 3">
-            <a:extLst>
-              <a:ext uri="{FF2B5EF4-FFF2-40B4-BE49-F238E27FC236}">
-                <a16:creationId xmlns:a16="http://schemas.microsoft.com/office/drawing/2014/main" id="{EAAA7E8D-7422-4D87-A4CD-DA509BDDF5DC}"/>
-              </a:ext>
-            </a:extLst>
-          </p:cNvPr>
-          <p:cNvSpPr>
-            <a:spLocks noGrp="1"/>
-          </p:cNvSpPr>
-          <p:nvPr>
-            <p:ph type="ftr" sz="quarter" idx="11"/>
-          </p:nvPr>
-        </p:nvSpPr>
-        <p:spPr/>
-        <p:txBody>
-          <a:bodyPr/>
-          <a:lstStyle/>
-          <a:p>
-            <a:r>
-              <a:rPr lang="de-DE" dirty="0"/>
-              <a:t>Deploy Christmas </a:t>
-            </a:r>
-          </a:p>
-          <a:p>
-            <a:r>
-              <a:rPr lang="de-DE" dirty="0"/>
-              <a:t> Azure Infrastructure </a:t>
+              <a:t>Azure Infrastructure </a:t>
             </a:r>
             <a:r>
               <a:rPr lang="de-DE" dirty="0" err="1"/>
@@ -5925,7 +6411,7 @@
           <p:cNvPr id="5" name="Foliennummernplatzhalter 4">
             <a:extLst>
               <a:ext uri="{FF2B5EF4-FFF2-40B4-BE49-F238E27FC236}">
-                <a16:creationId xmlns:a16="http://schemas.microsoft.com/office/drawing/2014/main" id="{34D2BEEB-B9A2-4D14-85A6-544FCED20DD5}"/>
+                <a16:creationId xmlns:a16="http://schemas.microsoft.com/office/drawing/2014/main" id="{17772B95-3B20-4904-BE53-002DF40B096F}"/>
               </a:ext>
             </a:extLst>
           </p:cNvPr>
@@ -5951,40 +6437,10 @@
       </p:sp>
       <p:pic>
         <p:nvPicPr>
-          <p:cNvPr id="11" name="Picture 10">
-            <a:extLst>
-              <a:ext uri="{FF2B5EF4-FFF2-40B4-BE49-F238E27FC236}">
-                <a16:creationId xmlns:a16="http://schemas.microsoft.com/office/drawing/2014/main" id="{A5E4127D-2072-47FB-A885-E6D5AA13BE2D}"/>
-              </a:ext>
-            </a:extLst>
-          </p:cNvPr>
-          <p:cNvPicPr>
-            <a:picLocks noChangeAspect="1"/>
-          </p:cNvPicPr>
-          <p:nvPr/>
-        </p:nvPicPr>
-        <p:blipFill>
-          <a:blip r:embed="rId2"/>
-          <a:stretch>
-            <a:fillRect/>
-          </a:stretch>
-        </p:blipFill>
-        <p:spPr>
-          <a:xfrm>
-            <a:off x="5141182" y="2119223"/>
-            <a:ext cx="784072" cy="777886"/>
-          </a:xfrm>
-          <a:prstGeom prst="rect">
-            <a:avLst/>
-          </a:prstGeom>
-        </p:spPr>
-      </p:pic>
-      <p:pic>
-        <p:nvPicPr>
-          <p:cNvPr id="12" name="Picture 11">
-            <a:extLst>
-              <a:ext uri="{FF2B5EF4-FFF2-40B4-BE49-F238E27FC236}">
-                <a16:creationId xmlns:a16="http://schemas.microsoft.com/office/drawing/2014/main" id="{4553BDB5-7C84-412A-9B7E-016659ED99C3}"/>
+          <p:cNvPr id="9" name="Picture 8">
+            <a:extLst>
+              <a:ext uri="{FF2B5EF4-FFF2-40B4-BE49-F238E27FC236}">
+                <a16:creationId xmlns:a16="http://schemas.microsoft.com/office/drawing/2014/main" id="{6610EF61-EB14-4F13-AE70-B270AA2C35F0}"/>
               </a:ext>
             </a:extLst>
           </p:cNvPr>
@@ -6001,382 +6457,8 @@
         </p:blipFill>
         <p:spPr>
           <a:xfrm>
-            <a:off x="5141182" y="1172528"/>
-            <a:ext cx="780290" cy="653714"/>
-          </a:xfrm>
-          <a:prstGeom prst="rect">
-            <a:avLst/>
-          </a:prstGeom>
-        </p:spPr>
-      </p:pic>
-      <p:pic>
-        <p:nvPicPr>
-          <p:cNvPr id="13" name="Picture 12">
-            <a:extLst>
-              <a:ext uri="{FF2B5EF4-FFF2-40B4-BE49-F238E27FC236}">
-                <a16:creationId xmlns:a16="http://schemas.microsoft.com/office/drawing/2014/main" id="{8BC953AD-8EAF-4EA1-8D37-9B458A06CE3F}"/>
-              </a:ext>
-            </a:extLst>
-          </p:cNvPr>
-          <p:cNvPicPr>
-            <a:picLocks noChangeAspect="1"/>
-          </p:cNvPicPr>
-          <p:nvPr/>
-        </p:nvPicPr>
-        <p:blipFill>
-          <a:blip r:embed="rId4"/>
-          <a:stretch>
-            <a:fillRect/>
-          </a:stretch>
-        </p:blipFill>
-        <p:spPr>
-          <a:xfrm>
-            <a:off x="4558387" y="4448201"/>
-            <a:ext cx="780290" cy="666114"/>
-          </a:xfrm>
-          <a:prstGeom prst="rect">
-            <a:avLst/>
-          </a:prstGeom>
-        </p:spPr>
-      </p:pic>
-      <p:pic>
-        <p:nvPicPr>
-          <p:cNvPr id="15" name="Picture 14" descr="A picture containing electronics, display&#10;&#10;Description generated with very high confidence">
-            <a:extLst>
-              <a:ext uri="{FF2B5EF4-FFF2-40B4-BE49-F238E27FC236}">
-                <a16:creationId xmlns:a16="http://schemas.microsoft.com/office/drawing/2014/main" id="{C82BFC57-0201-4EC8-8EB1-B1A2CD889835}"/>
-              </a:ext>
-            </a:extLst>
-          </p:cNvPr>
-          <p:cNvPicPr>
-            <a:picLocks noChangeAspect="1"/>
-          </p:cNvPicPr>
-          <p:nvPr/>
-        </p:nvPicPr>
-        <p:blipFill>
-          <a:blip r:embed="rId5">
-            <a:extLst>
-              <a:ext uri="{28A0092B-C50C-407E-A947-70E740481C1C}">
-                <a14:useLocalDpi xmlns:a14="http://schemas.microsoft.com/office/drawing/2010/main" val="0"/>
-              </a:ext>
-            </a:extLst>
-          </a:blip>
-          <a:stretch>
-            <a:fillRect/>
-          </a:stretch>
-        </p:blipFill>
-        <p:spPr>
-          <a:xfrm>
-            <a:off x="4558387" y="3265551"/>
-            <a:ext cx="780290" cy="780290"/>
-          </a:xfrm>
-          <a:prstGeom prst="rect">
-            <a:avLst/>
-          </a:prstGeom>
-        </p:spPr>
-      </p:pic>
-      <p:pic>
-        <p:nvPicPr>
-          <p:cNvPr id="16" name="Picture 15">
-            <a:extLst>
-              <a:ext uri="{FF2B5EF4-FFF2-40B4-BE49-F238E27FC236}">
-                <a16:creationId xmlns:a16="http://schemas.microsoft.com/office/drawing/2014/main" id="{95A9AE08-4FCC-4986-A538-B8ED6E5F9047}"/>
-              </a:ext>
-            </a:extLst>
-          </p:cNvPr>
-          <p:cNvPicPr>
-            <a:picLocks noChangeAspect="1"/>
-          </p:cNvPicPr>
-          <p:nvPr/>
-        </p:nvPicPr>
-        <p:blipFill>
-          <a:blip r:embed="rId4"/>
-          <a:stretch>
-            <a:fillRect/>
-          </a:stretch>
-        </p:blipFill>
-        <p:spPr>
-          <a:xfrm>
-            <a:off x="5751041" y="4448201"/>
-            <a:ext cx="780290" cy="666114"/>
-          </a:xfrm>
-          <a:prstGeom prst="rect">
-            <a:avLst/>
-          </a:prstGeom>
-        </p:spPr>
-      </p:pic>
-      <p:pic>
-        <p:nvPicPr>
-          <p:cNvPr id="17" name="Picture 16" descr="A picture containing electronics, display&#10;&#10;Description generated with very high confidence">
-            <a:extLst>
-              <a:ext uri="{FF2B5EF4-FFF2-40B4-BE49-F238E27FC236}">
-                <a16:creationId xmlns:a16="http://schemas.microsoft.com/office/drawing/2014/main" id="{4D23C6D1-3489-4574-802E-667A0D17018B}"/>
-              </a:ext>
-            </a:extLst>
-          </p:cNvPr>
-          <p:cNvPicPr>
-            <a:picLocks noChangeAspect="1"/>
-          </p:cNvPicPr>
-          <p:nvPr/>
-        </p:nvPicPr>
-        <p:blipFill>
-          <a:blip r:embed="rId5">
-            <a:extLst>
-              <a:ext uri="{28A0092B-C50C-407E-A947-70E740481C1C}">
-                <a14:useLocalDpi xmlns:a14="http://schemas.microsoft.com/office/drawing/2010/main" val="0"/>
-              </a:ext>
-            </a:extLst>
-          </a:blip>
-          <a:stretch>
-            <a:fillRect/>
-          </a:stretch>
-        </p:blipFill>
-        <p:spPr>
-          <a:xfrm>
-            <a:off x="5751041" y="3265551"/>
-            <a:ext cx="780290" cy="780290"/>
-          </a:xfrm>
-          <a:prstGeom prst="rect">
-            <a:avLst/>
-          </a:prstGeom>
-        </p:spPr>
-      </p:pic>
-      <p:sp>
-        <p:nvSpPr>
-          <p:cNvPr id="18" name="Rectangle 17">
-            <a:extLst>
-              <a:ext uri="{FF2B5EF4-FFF2-40B4-BE49-F238E27FC236}">
-                <a16:creationId xmlns:a16="http://schemas.microsoft.com/office/drawing/2014/main" id="{875CB68F-5668-4071-B367-CD63F68E9218}"/>
-              </a:ext>
-            </a:extLst>
-          </p:cNvPr>
-          <p:cNvSpPr/>
-          <p:nvPr/>
-        </p:nvSpPr>
-        <p:spPr>
-          <a:xfrm>
-            <a:off x="4216892" y="2899514"/>
-            <a:ext cx="2636433" cy="1344500"/>
-          </a:xfrm>
-          <a:prstGeom prst="rect">
-            <a:avLst/>
-          </a:prstGeom>
-          <a:noFill/>
-          <a:ln w="28575">
-            <a:prstDash val="dash"/>
-          </a:ln>
-        </p:spPr>
-        <p:style>
-          <a:lnRef idx="2">
-            <a:schemeClr val="accent1">
-              <a:shade val="50000"/>
-            </a:schemeClr>
-          </a:lnRef>
-          <a:fillRef idx="1">
-            <a:schemeClr val="accent1"/>
-          </a:fillRef>
-          <a:effectRef idx="0">
-            <a:schemeClr val="accent1"/>
-          </a:effectRef>
-          <a:fontRef idx="minor">
-            <a:schemeClr val="lt1"/>
-          </a:fontRef>
-        </p:style>
-        <p:txBody>
-          <a:bodyPr rtlCol="0" anchor="ctr"/>
-          <a:lstStyle/>
-          <a:p>
-            <a:pPr algn="ctr"/>
-            <a:endParaRPr lang="en-US"/>
-          </a:p>
-        </p:txBody>
-      </p:sp>
-      <p:pic>
-        <p:nvPicPr>
-          <p:cNvPr id="19" name="Picture 18">
-            <a:extLst>
-              <a:ext uri="{FF2B5EF4-FFF2-40B4-BE49-F238E27FC236}">
-                <a16:creationId xmlns:a16="http://schemas.microsoft.com/office/drawing/2014/main" id="{047FECC9-F635-40BA-86B0-4798F887B4F3}"/>
-              </a:ext>
-            </a:extLst>
-          </p:cNvPr>
-          <p:cNvPicPr>
-            <a:picLocks noChangeAspect="1"/>
-          </p:cNvPicPr>
-          <p:nvPr/>
-        </p:nvPicPr>
-        <p:blipFill>
-          <a:blip r:embed="rId6"/>
-          <a:stretch>
-            <a:fillRect/>
-          </a:stretch>
-        </p:blipFill>
-        <p:spPr>
-          <a:xfrm>
-            <a:off x="3805237" y="2448737"/>
-            <a:ext cx="823309" cy="816814"/>
-          </a:xfrm>
-          <a:prstGeom prst="rect">
-            <a:avLst/>
-          </a:prstGeom>
-        </p:spPr>
-      </p:pic>
-      <p:cxnSp>
-        <p:nvCxnSpPr>
-          <p:cNvPr id="20" name="Connector: Elbow 19">
-            <a:extLst>
-              <a:ext uri="{FF2B5EF4-FFF2-40B4-BE49-F238E27FC236}">
-                <a16:creationId xmlns:a16="http://schemas.microsoft.com/office/drawing/2014/main" id="{4D100529-22DF-488C-892B-3544B89BBCCD}"/>
-              </a:ext>
-            </a:extLst>
-          </p:cNvPr>
-          <p:cNvCxnSpPr>
-            <a:cxnSpLocks/>
-            <a:stCxn id="15" idx="0"/>
-            <a:endCxn id="18" idx="0"/>
-          </p:cNvCxnSpPr>
-          <p:nvPr/>
-        </p:nvCxnSpPr>
-        <p:spPr>
-          <a:xfrm rot="5400000" flipH="1" flipV="1">
-            <a:off x="5058802" y="2789245"/>
-            <a:ext cx="366037" cy="586577"/>
-          </a:xfrm>
-          <a:prstGeom prst="bentConnector3">
-            <a:avLst>
-              <a:gd name="adj1" fmla="val 50887"/>
-            </a:avLst>
-          </a:prstGeom>
-          <a:ln w="28575"/>
-        </p:spPr>
-        <p:style>
-          <a:lnRef idx="1">
-            <a:schemeClr val="accent1"/>
-          </a:lnRef>
-          <a:fillRef idx="0">
-            <a:schemeClr val="accent1"/>
-          </a:fillRef>
-          <a:effectRef idx="0">
-            <a:schemeClr val="accent1"/>
-          </a:effectRef>
-          <a:fontRef idx="minor">
-            <a:schemeClr val="tx1"/>
-          </a:fontRef>
-        </p:style>
-      </p:cxnSp>
-      <p:cxnSp>
-        <p:nvCxnSpPr>
-          <p:cNvPr id="24" name="Connector: Elbow 23">
-            <a:extLst>
-              <a:ext uri="{FF2B5EF4-FFF2-40B4-BE49-F238E27FC236}">
-                <a16:creationId xmlns:a16="http://schemas.microsoft.com/office/drawing/2014/main" id="{5E971420-F6C1-42FD-A10D-B5EC1DA5BC76}"/>
-              </a:ext>
-            </a:extLst>
-          </p:cNvPr>
-          <p:cNvCxnSpPr>
-            <a:cxnSpLocks/>
-            <a:stCxn id="17" idx="0"/>
-            <a:endCxn id="18" idx="0"/>
-          </p:cNvCxnSpPr>
-          <p:nvPr/>
-        </p:nvCxnSpPr>
-        <p:spPr>
-          <a:xfrm rot="16200000" flipV="1">
-            <a:off x="5655130" y="2779494"/>
-            <a:ext cx="366037" cy="606077"/>
-          </a:xfrm>
-          <a:prstGeom prst="bentConnector3">
-            <a:avLst>
-              <a:gd name="adj1" fmla="val 50887"/>
-            </a:avLst>
-          </a:prstGeom>
-          <a:ln w="28575"/>
-        </p:spPr>
-        <p:style>
-          <a:lnRef idx="1">
-            <a:schemeClr val="accent1"/>
-          </a:lnRef>
-          <a:fillRef idx="0">
-            <a:schemeClr val="accent1"/>
-          </a:fillRef>
-          <a:effectRef idx="0">
-            <a:schemeClr val="accent1"/>
-          </a:effectRef>
-          <a:fontRef idx="minor">
-            <a:schemeClr val="tx1"/>
-          </a:fontRef>
-        </p:style>
-      </p:cxnSp>
-      <p:cxnSp>
-        <p:nvCxnSpPr>
-          <p:cNvPr id="29" name="Straight Connector 28">
-            <a:extLst>
-              <a:ext uri="{FF2B5EF4-FFF2-40B4-BE49-F238E27FC236}">
-                <a16:creationId xmlns:a16="http://schemas.microsoft.com/office/drawing/2014/main" id="{4BFCEBD0-50EF-4D9A-903F-E8855D25C2BF}"/>
-              </a:ext>
-            </a:extLst>
-          </p:cNvPr>
-          <p:cNvCxnSpPr>
-            <a:stCxn id="11" idx="0"/>
-            <a:endCxn id="12" idx="2"/>
-          </p:cNvCxnSpPr>
-          <p:nvPr/>
-        </p:nvCxnSpPr>
-        <p:spPr>
-          <a:xfrm flipH="1" flipV="1">
-            <a:off x="5531327" y="1826242"/>
-            <a:ext cx="1891" cy="292981"/>
-          </a:xfrm>
-          <a:prstGeom prst="line">
-            <a:avLst/>
-          </a:prstGeom>
-          <a:ln w="28575"/>
-        </p:spPr>
-        <p:style>
-          <a:lnRef idx="1">
-            <a:schemeClr val="accent1"/>
-          </a:lnRef>
-          <a:fillRef idx="0">
-            <a:schemeClr val="accent1"/>
-          </a:fillRef>
-          <a:effectRef idx="0">
-            <a:schemeClr val="accent1"/>
-          </a:effectRef>
-          <a:fontRef idx="minor">
-            <a:schemeClr val="tx1"/>
-          </a:fontRef>
-        </p:style>
-      </p:cxnSp>
-      <p:pic>
-        <p:nvPicPr>
-          <p:cNvPr id="30" name="Picture 29">
-            <a:extLst>
-              <a:ext uri="{FF2B5EF4-FFF2-40B4-BE49-F238E27FC236}">
-                <a16:creationId xmlns:a16="http://schemas.microsoft.com/office/drawing/2014/main" id="{300A7099-6A9C-4785-8799-8DA972833C5C}"/>
-              </a:ext>
-            </a:extLst>
-          </p:cNvPr>
-          <p:cNvPicPr>
-            <a:picLocks noChangeAspect="1"/>
-          </p:cNvPicPr>
-          <p:nvPr/>
-        </p:nvPicPr>
-        <p:blipFill>
-          <a:blip r:embed="rId7">
-            <a:extLst>
-              <a:ext uri="{28A0092B-C50C-407E-A947-70E740481C1C}">
-                <a14:useLocalDpi xmlns:a14="http://schemas.microsoft.com/office/drawing/2010/main" val="0"/>
-              </a:ext>
-            </a:extLst>
-          </a:blip>
-          <a:stretch>
-            <a:fillRect/>
-          </a:stretch>
-        </p:blipFill>
-        <p:spPr>
-          <a:xfrm>
-            <a:off x="3709502" y="5114315"/>
-            <a:ext cx="780290" cy="780290"/>
+            <a:off x="3352251" y="1919792"/>
+            <a:ext cx="5487497" cy="3852134"/>
           </a:xfrm>
           <a:prstGeom prst="rect">
             <a:avLst/>
@@ -6386,7 +6468,7 @@
     </p:spTree>
     <p:extLst>
       <p:ext uri="{BB962C8B-B14F-4D97-AF65-F5344CB8AC3E}">
-        <p14:creationId xmlns:p14="http://schemas.microsoft.com/office/powerpoint/2010/main" val="2163705761"/>
+        <p14:creationId xmlns:p14="http://schemas.microsoft.com/office/powerpoint/2010/main" val="2344483193"/>
       </p:ext>
     </p:extLst>
   </p:cSld>
@@ -6415,6 +6497,64 @@
       </p:grpSpPr>
       <p:sp>
         <p:nvSpPr>
+          <p:cNvPr id="31" name="Rectangle 30">
+            <a:extLst>
+              <a:ext uri="{FF2B5EF4-FFF2-40B4-BE49-F238E27FC236}">
+                <a16:creationId xmlns:a16="http://schemas.microsoft.com/office/drawing/2014/main" id="{263F90AB-24C3-48C3-9074-6F43DB91278E}"/>
+              </a:ext>
+            </a:extLst>
+          </p:cNvPr>
+          <p:cNvSpPr/>
+          <p:nvPr/>
+        </p:nvSpPr>
+        <p:spPr>
+          <a:xfrm>
+            <a:off x="4099647" y="3344886"/>
+            <a:ext cx="2929803" cy="2411030"/>
+          </a:xfrm>
+          <a:prstGeom prst="rect">
+            <a:avLst/>
+          </a:prstGeom>
+          <a:solidFill>
+            <a:schemeClr val="bg1">
+              <a:lumMod val="85000"/>
+            </a:schemeClr>
+          </a:solidFill>
+          <a:ln>
+            <a:solidFill>
+              <a:schemeClr val="bg1">
+                <a:lumMod val="95000"/>
+              </a:schemeClr>
+            </a:solidFill>
+          </a:ln>
+        </p:spPr>
+        <p:style>
+          <a:lnRef idx="2">
+            <a:schemeClr val="accent1">
+              <a:shade val="50000"/>
+            </a:schemeClr>
+          </a:lnRef>
+          <a:fillRef idx="1">
+            <a:schemeClr val="accent1"/>
+          </a:fillRef>
+          <a:effectRef idx="0">
+            <a:schemeClr val="accent1"/>
+          </a:effectRef>
+          <a:fontRef idx="minor">
+            <a:schemeClr val="lt1"/>
+          </a:fontRef>
+        </p:style>
+        <p:txBody>
+          <a:bodyPr rtlCol="0" anchor="ctr"/>
+          <a:lstStyle/>
+          <a:p>
+            <a:pPr algn="ctr"/>
+            <a:endParaRPr lang="en-US"/>
+          </a:p>
+        </p:txBody>
+      </p:sp>
+      <p:sp>
+        <p:nvSpPr>
           <p:cNvPr id="2" name="Titel 1">
             <a:extLst>
               <a:ext uri="{FF2B5EF4-FFF2-40B4-BE49-F238E27FC236}">
@@ -6429,22 +6569,14 @@
             <p:ph type="title"/>
           </p:nvPr>
         </p:nvSpPr>
-        <p:spPr>
-          <a:xfrm>
-            <a:off x="0" y="2766218"/>
-            <a:ext cx="12192000" cy="1325563"/>
-          </a:xfrm>
-        </p:spPr>
-        <p:txBody>
-          <a:bodyPr>
-            <a:normAutofit/>
-          </a:bodyPr>
-          <a:lstStyle/>
-          <a:p>
-            <a:pPr algn="ctr"/>
-            <a:r>
-              <a:rPr lang="de-DE" sz="8800" dirty="0"/>
-              <a:t>Hands On!</a:t>
+        <p:spPr/>
+        <p:txBody>
+          <a:bodyPr/>
+          <a:lstStyle/>
+          <a:p>
+            <a:r>
+              <a:rPr lang="de-DE" dirty="0"/>
+              <a:t>HA Scenarios</a:t>
             </a:r>
           </a:p>
         </p:txBody>
@@ -6472,13 +6604,7 @@
           <a:p>
             <a:r>
               <a:rPr lang="de-DE" dirty="0"/>
-              <a:t>Deploy Christmas </a:t>
-            </a:r>
-          </a:p>
-          <a:p>
-            <a:r>
-              <a:rPr lang="de-DE" dirty="0"/>
-              <a:t> Azure Infrastructure </a:t>
+              <a:t>Azure Infrastructure </a:t>
             </a:r>
             <a:r>
               <a:rPr lang="de-DE" dirty="0" err="1"/>
@@ -6520,10 +6646,630 @@
           </a:p>
         </p:txBody>
       </p:sp>
+      <p:pic>
+        <p:nvPicPr>
+          <p:cNvPr id="11" name="Picture 10">
+            <a:extLst>
+              <a:ext uri="{FF2B5EF4-FFF2-40B4-BE49-F238E27FC236}">
+                <a16:creationId xmlns:a16="http://schemas.microsoft.com/office/drawing/2014/main" id="{A5E4127D-2072-47FB-A885-E6D5AA13BE2D}"/>
+              </a:ext>
+            </a:extLst>
+          </p:cNvPr>
+          <p:cNvPicPr>
+            <a:picLocks noChangeAspect="1"/>
+          </p:cNvPicPr>
+          <p:nvPr/>
+        </p:nvPicPr>
+        <p:blipFill>
+          <a:blip r:embed="rId2"/>
+          <a:stretch>
+            <a:fillRect/>
+          </a:stretch>
+        </p:blipFill>
+        <p:spPr>
+          <a:xfrm>
+            <a:off x="5141182" y="1986141"/>
+            <a:ext cx="784072" cy="777886"/>
+          </a:xfrm>
+          <a:prstGeom prst="rect">
+            <a:avLst/>
+          </a:prstGeom>
+        </p:spPr>
+      </p:pic>
+      <p:pic>
+        <p:nvPicPr>
+          <p:cNvPr id="12" name="Picture 11">
+            <a:extLst>
+              <a:ext uri="{FF2B5EF4-FFF2-40B4-BE49-F238E27FC236}">
+                <a16:creationId xmlns:a16="http://schemas.microsoft.com/office/drawing/2014/main" id="{4553BDB5-7C84-412A-9B7E-016659ED99C3}"/>
+              </a:ext>
+            </a:extLst>
+          </p:cNvPr>
+          <p:cNvPicPr>
+            <a:picLocks noChangeAspect="1"/>
+          </p:cNvPicPr>
+          <p:nvPr/>
+        </p:nvPicPr>
+        <p:blipFill>
+          <a:blip r:embed="rId3"/>
+          <a:stretch>
+            <a:fillRect/>
+          </a:stretch>
+        </p:blipFill>
+        <p:spPr>
+          <a:xfrm>
+            <a:off x="5141182" y="1172528"/>
+            <a:ext cx="780290" cy="653714"/>
+          </a:xfrm>
+          <a:prstGeom prst="rect">
+            <a:avLst/>
+          </a:prstGeom>
+        </p:spPr>
+      </p:pic>
+      <p:pic>
+        <p:nvPicPr>
+          <p:cNvPr id="13" name="Picture 12">
+            <a:extLst>
+              <a:ext uri="{FF2B5EF4-FFF2-40B4-BE49-F238E27FC236}">
+                <a16:creationId xmlns:a16="http://schemas.microsoft.com/office/drawing/2014/main" id="{8BC953AD-8EAF-4EA1-8D37-9B458A06CE3F}"/>
+              </a:ext>
+            </a:extLst>
+          </p:cNvPr>
+          <p:cNvPicPr>
+            <a:picLocks noChangeAspect="1"/>
+          </p:cNvPicPr>
+          <p:nvPr/>
+        </p:nvPicPr>
+        <p:blipFill>
+          <a:blip r:embed="rId4"/>
+          <a:stretch>
+            <a:fillRect/>
+          </a:stretch>
+        </p:blipFill>
+        <p:spPr>
+          <a:xfrm>
+            <a:off x="4558387" y="4661267"/>
+            <a:ext cx="780290" cy="666114"/>
+          </a:xfrm>
+          <a:prstGeom prst="rect">
+            <a:avLst/>
+          </a:prstGeom>
+        </p:spPr>
+      </p:pic>
+      <p:pic>
+        <p:nvPicPr>
+          <p:cNvPr id="15" name="Picture 14" descr="A picture containing electronics, display&#10;&#10;Description generated with very high confidence">
+            <a:extLst>
+              <a:ext uri="{FF2B5EF4-FFF2-40B4-BE49-F238E27FC236}">
+                <a16:creationId xmlns:a16="http://schemas.microsoft.com/office/drawing/2014/main" id="{C82BFC57-0201-4EC8-8EB1-B1A2CD889835}"/>
+              </a:ext>
+            </a:extLst>
+          </p:cNvPr>
+          <p:cNvPicPr>
+            <a:picLocks noChangeAspect="1"/>
+          </p:cNvPicPr>
+          <p:nvPr/>
+        </p:nvPicPr>
+        <p:blipFill>
+          <a:blip r:embed="rId5">
+            <a:extLst>
+              <a:ext uri="{28A0092B-C50C-407E-A947-70E740481C1C}">
+                <a14:useLocalDpi xmlns:a14="http://schemas.microsoft.com/office/drawing/2010/main" val="0"/>
+              </a:ext>
+            </a:extLst>
+          </a:blip>
+          <a:stretch>
+            <a:fillRect/>
+          </a:stretch>
+        </p:blipFill>
+        <p:spPr>
+          <a:xfrm>
+            <a:off x="4558387" y="3478617"/>
+            <a:ext cx="780290" cy="780290"/>
+          </a:xfrm>
+          <a:prstGeom prst="rect">
+            <a:avLst/>
+          </a:prstGeom>
+        </p:spPr>
+      </p:pic>
+      <p:pic>
+        <p:nvPicPr>
+          <p:cNvPr id="16" name="Picture 15">
+            <a:extLst>
+              <a:ext uri="{FF2B5EF4-FFF2-40B4-BE49-F238E27FC236}">
+                <a16:creationId xmlns:a16="http://schemas.microsoft.com/office/drawing/2014/main" id="{95A9AE08-4FCC-4986-A538-B8ED6E5F9047}"/>
+              </a:ext>
+            </a:extLst>
+          </p:cNvPr>
+          <p:cNvPicPr>
+            <a:picLocks noChangeAspect="1"/>
+          </p:cNvPicPr>
+          <p:nvPr/>
+        </p:nvPicPr>
+        <p:blipFill>
+          <a:blip r:embed="rId4"/>
+          <a:stretch>
+            <a:fillRect/>
+          </a:stretch>
+        </p:blipFill>
+        <p:spPr>
+          <a:xfrm>
+            <a:off x="5751041" y="4661267"/>
+            <a:ext cx="780290" cy="666114"/>
+          </a:xfrm>
+          <a:prstGeom prst="rect">
+            <a:avLst/>
+          </a:prstGeom>
+        </p:spPr>
+      </p:pic>
+      <p:pic>
+        <p:nvPicPr>
+          <p:cNvPr id="17" name="Picture 16" descr="A picture containing electronics, display&#10;&#10;Description generated with very high confidence">
+            <a:extLst>
+              <a:ext uri="{FF2B5EF4-FFF2-40B4-BE49-F238E27FC236}">
+                <a16:creationId xmlns:a16="http://schemas.microsoft.com/office/drawing/2014/main" id="{4D23C6D1-3489-4574-802E-667A0D17018B}"/>
+              </a:ext>
+            </a:extLst>
+          </p:cNvPr>
+          <p:cNvPicPr>
+            <a:picLocks noChangeAspect="1"/>
+          </p:cNvPicPr>
+          <p:nvPr/>
+        </p:nvPicPr>
+        <p:blipFill>
+          <a:blip r:embed="rId5">
+            <a:extLst>
+              <a:ext uri="{28A0092B-C50C-407E-A947-70E740481C1C}">
+                <a14:useLocalDpi xmlns:a14="http://schemas.microsoft.com/office/drawing/2010/main" val="0"/>
+              </a:ext>
+            </a:extLst>
+          </a:blip>
+          <a:stretch>
+            <a:fillRect/>
+          </a:stretch>
+        </p:blipFill>
+        <p:spPr>
+          <a:xfrm>
+            <a:off x="5751041" y="3478617"/>
+            <a:ext cx="780290" cy="780290"/>
+          </a:xfrm>
+          <a:prstGeom prst="rect">
+            <a:avLst/>
+          </a:prstGeom>
+        </p:spPr>
+      </p:pic>
+      <p:sp>
+        <p:nvSpPr>
+          <p:cNvPr id="18" name="Rectangle 17">
+            <a:extLst>
+              <a:ext uri="{FF2B5EF4-FFF2-40B4-BE49-F238E27FC236}">
+                <a16:creationId xmlns:a16="http://schemas.microsoft.com/office/drawing/2014/main" id="{875CB68F-5668-4071-B367-CD63F68E9218}"/>
+              </a:ext>
+            </a:extLst>
+          </p:cNvPr>
+          <p:cNvSpPr/>
+          <p:nvPr/>
+        </p:nvSpPr>
+        <p:spPr>
+          <a:xfrm>
+            <a:off x="4216892" y="3112580"/>
+            <a:ext cx="2636433" cy="1344500"/>
+          </a:xfrm>
+          <a:prstGeom prst="rect">
+            <a:avLst/>
+          </a:prstGeom>
+          <a:noFill/>
+          <a:ln w="28575">
+            <a:prstDash val="dash"/>
+          </a:ln>
+        </p:spPr>
+        <p:style>
+          <a:lnRef idx="2">
+            <a:schemeClr val="accent1">
+              <a:shade val="50000"/>
+            </a:schemeClr>
+          </a:lnRef>
+          <a:fillRef idx="1">
+            <a:schemeClr val="accent1"/>
+          </a:fillRef>
+          <a:effectRef idx="0">
+            <a:schemeClr val="accent1"/>
+          </a:effectRef>
+          <a:fontRef idx="minor">
+            <a:schemeClr val="lt1"/>
+          </a:fontRef>
+        </p:style>
+        <p:txBody>
+          <a:bodyPr rtlCol="0" anchor="ctr"/>
+          <a:lstStyle/>
+          <a:p>
+            <a:pPr algn="ctr"/>
+            <a:endParaRPr lang="en-US"/>
+          </a:p>
+        </p:txBody>
+      </p:sp>
+      <p:pic>
+        <p:nvPicPr>
+          <p:cNvPr id="19" name="Picture 18">
+            <a:extLst>
+              <a:ext uri="{FF2B5EF4-FFF2-40B4-BE49-F238E27FC236}">
+                <a16:creationId xmlns:a16="http://schemas.microsoft.com/office/drawing/2014/main" id="{047FECC9-F635-40BA-86B0-4798F887B4F3}"/>
+              </a:ext>
+            </a:extLst>
+          </p:cNvPr>
+          <p:cNvPicPr>
+            <a:picLocks noChangeAspect="1"/>
+          </p:cNvPicPr>
+          <p:nvPr/>
+        </p:nvPicPr>
+        <p:blipFill>
+          <a:blip r:embed="rId6"/>
+          <a:stretch>
+            <a:fillRect/>
+          </a:stretch>
+        </p:blipFill>
+        <p:spPr>
+          <a:xfrm>
+            <a:off x="3805237" y="2661803"/>
+            <a:ext cx="823309" cy="816814"/>
+          </a:xfrm>
+          <a:prstGeom prst="rect">
+            <a:avLst/>
+          </a:prstGeom>
+        </p:spPr>
+      </p:pic>
+      <p:cxnSp>
+        <p:nvCxnSpPr>
+          <p:cNvPr id="20" name="Connector: Elbow 19">
+            <a:extLst>
+              <a:ext uri="{FF2B5EF4-FFF2-40B4-BE49-F238E27FC236}">
+                <a16:creationId xmlns:a16="http://schemas.microsoft.com/office/drawing/2014/main" id="{4D100529-22DF-488C-892B-3544B89BBCCD}"/>
+              </a:ext>
+            </a:extLst>
+          </p:cNvPr>
+          <p:cNvCxnSpPr>
+            <a:cxnSpLocks/>
+            <a:stCxn id="15" idx="0"/>
+            <a:endCxn id="11" idx="2"/>
+          </p:cNvCxnSpPr>
+          <p:nvPr/>
+        </p:nvCxnSpPr>
+        <p:spPr>
+          <a:xfrm rot="5400000" flipH="1" flipV="1">
+            <a:off x="4883580" y="2828979"/>
+            <a:ext cx="714590" cy="584686"/>
+          </a:xfrm>
+          <a:prstGeom prst="bentConnector3">
+            <a:avLst>
+              <a:gd name="adj1" fmla="val 32005"/>
+            </a:avLst>
+          </a:prstGeom>
+          <a:ln w="28575"/>
+        </p:spPr>
+        <p:style>
+          <a:lnRef idx="1">
+            <a:schemeClr val="accent1"/>
+          </a:lnRef>
+          <a:fillRef idx="0">
+            <a:schemeClr val="accent1"/>
+          </a:fillRef>
+          <a:effectRef idx="0">
+            <a:schemeClr val="accent1"/>
+          </a:effectRef>
+          <a:fontRef idx="minor">
+            <a:schemeClr val="tx1"/>
+          </a:fontRef>
+        </p:style>
+      </p:cxnSp>
+      <p:cxnSp>
+        <p:nvCxnSpPr>
+          <p:cNvPr id="24" name="Connector: Elbow 23">
+            <a:extLst>
+              <a:ext uri="{FF2B5EF4-FFF2-40B4-BE49-F238E27FC236}">
+                <a16:creationId xmlns:a16="http://schemas.microsoft.com/office/drawing/2014/main" id="{5E971420-F6C1-42FD-A10D-B5EC1DA5BC76}"/>
+              </a:ext>
+            </a:extLst>
+          </p:cNvPr>
+          <p:cNvCxnSpPr>
+            <a:cxnSpLocks/>
+            <a:stCxn id="17" idx="0"/>
+            <a:endCxn id="11" idx="2"/>
+          </p:cNvCxnSpPr>
+          <p:nvPr/>
+        </p:nvCxnSpPr>
+        <p:spPr>
+          <a:xfrm rot="16200000" flipV="1">
+            <a:off x="5479907" y="2817338"/>
+            <a:ext cx="714590" cy="607968"/>
+          </a:xfrm>
+          <a:prstGeom prst="bentConnector3">
+            <a:avLst>
+              <a:gd name="adj1" fmla="val 32672"/>
+            </a:avLst>
+          </a:prstGeom>
+          <a:ln w="28575"/>
+        </p:spPr>
+        <p:style>
+          <a:lnRef idx="1">
+            <a:schemeClr val="accent1"/>
+          </a:lnRef>
+          <a:fillRef idx="0">
+            <a:schemeClr val="accent1"/>
+          </a:fillRef>
+          <a:effectRef idx="0">
+            <a:schemeClr val="accent1"/>
+          </a:effectRef>
+          <a:fontRef idx="minor">
+            <a:schemeClr val="tx1"/>
+          </a:fontRef>
+        </p:style>
+      </p:cxnSp>
+      <p:cxnSp>
+        <p:nvCxnSpPr>
+          <p:cNvPr id="29" name="Straight Connector 28">
+            <a:extLst>
+              <a:ext uri="{FF2B5EF4-FFF2-40B4-BE49-F238E27FC236}">
+                <a16:creationId xmlns:a16="http://schemas.microsoft.com/office/drawing/2014/main" id="{4BFCEBD0-50EF-4D9A-903F-E8855D25C2BF}"/>
+              </a:ext>
+            </a:extLst>
+          </p:cNvPr>
+          <p:cNvCxnSpPr>
+            <a:stCxn id="11" idx="0"/>
+            <a:endCxn id="12" idx="2"/>
+          </p:cNvCxnSpPr>
+          <p:nvPr/>
+        </p:nvCxnSpPr>
+        <p:spPr>
+          <a:xfrm flipH="1" flipV="1">
+            <a:off x="5531327" y="1826242"/>
+            <a:ext cx="1891" cy="159899"/>
+          </a:xfrm>
+          <a:prstGeom prst="line">
+            <a:avLst/>
+          </a:prstGeom>
+          <a:ln w="28575"/>
+        </p:spPr>
+        <p:style>
+          <a:lnRef idx="1">
+            <a:schemeClr val="accent1"/>
+          </a:lnRef>
+          <a:fillRef idx="0">
+            <a:schemeClr val="accent1"/>
+          </a:fillRef>
+          <a:effectRef idx="0">
+            <a:schemeClr val="accent1"/>
+          </a:effectRef>
+          <a:fontRef idx="minor">
+            <a:schemeClr val="tx1"/>
+          </a:fontRef>
+        </p:style>
+      </p:cxnSp>
+      <p:pic>
+        <p:nvPicPr>
+          <p:cNvPr id="30" name="Picture 29">
+            <a:extLst>
+              <a:ext uri="{FF2B5EF4-FFF2-40B4-BE49-F238E27FC236}">
+                <a16:creationId xmlns:a16="http://schemas.microsoft.com/office/drawing/2014/main" id="{300A7099-6A9C-4785-8799-8DA972833C5C}"/>
+              </a:ext>
+            </a:extLst>
+          </p:cNvPr>
+          <p:cNvPicPr>
+            <a:picLocks noChangeAspect="1"/>
+          </p:cNvPicPr>
+          <p:nvPr/>
+        </p:nvPicPr>
+        <p:blipFill>
+          <a:blip r:embed="rId7">
+            <a:extLst>
+              <a:ext uri="{28A0092B-C50C-407E-A947-70E740481C1C}">
+                <a14:useLocalDpi xmlns:a14="http://schemas.microsoft.com/office/drawing/2010/main" val="0"/>
+              </a:ext>
+            </a:extLst>
+          </a:blip>
+          <a:stretch>
+            <a:fillRect/>
+          </a:stretch>
+        </p:blipFill>
+        <p:spPr>
+          <a:xfrm>
+            <a:off x="3709502" y="5327381"/>
+            <a:ext cx="780290" cy="780290"/>
+          </a:xfrm>
+          <a:prstGeom prst="rect">
+            <a:avLst/>
+          </a:prstGeom>
+        </p:spPr>
+      </p:pic>
+      <p:sp>
+        <p:nvSpPr>
+          <p:cNvPr id="21" name="TextBox 20">
+            <a:extLst>
+              <a:ext uri="{FF2B5EF4-FFF2-40B4-BE49-F238E27FC236}">
+                <a16:creationId xmlns:a16="http://schemas.microsoft.com/office/drawing/2014/main" id="{D82E050B-D5A9-4ABF-A6B8-36F7CFA24BCC}"/>
+              </a:ext>
+            </a:extLst>
+          </p:cNvPr>
+          <p:cNvSpPr txBox="1"/>
+          <p:nvPr/>
+        </p:nvSpPr>
+        <p:spPr>
+          <a:xfrm>
+            <a:off x="4729010" y="820387"/>
+            <a:ext cx="1604633" cy="307777"/>
+          </a:xfrm>
+          <a:prstGeom prst="rect">
+            <a:avLst/>
+          </a:prstGeom>
+          <a:solidFill>
+            <a:schemeClr val="bg1"/>
+          </a:solidFill>
+        </p:spPr>
+        <p:txBody>
+          <a:bodyPr wrap="square" rtlCol="0">
+            <a:spAutoFit/>
+          </a:bodyPr>
+          <a:lstStyle/>
+          <a:p>
+            <a:pPr algn="ctr"/>
+            <a:r>
+              <a:rPr lang="en-US" sz="1400" dirty="0"/>
+              <a:t>Public IP</a:t>
+            </a:r>
+          </a:p>
+        </p:txBody>
+      </p:sp>
+      <p:sp>
+        <p:nvSpPr>
+          <p:cNvPr id="22" name="TextBox 21">
+            <a:extLst>
+              <a:ext uri="{FF2B5EF4-FFF2-40B4-BE49-F238E27FC236}">
+                <a16:creationId xmlns:a16="http://schemas.microsoft.com/office/drawing/2014/main" id="{8E85FFBD-05A6-4031-A404-741D424DA7A2}"/>
+              </a:ext>
+            </a:extLst>
+          </p:cNvPr>
+          <p:cNvSpPr txBox="1"/>
+          <p:nvPr/>
+        </p:nvSpPr>
+        <p:spPr>
+          <a:xfrm>
+            <a:off x="3410794" y="2337822"/>
+            <a:ext cx="1604633" cy="307777"/>
+          </a:xfrm>
+          <a:prstGeom prst="rect">
+            <a:avLst/>
+          </a:prstGeom>
+          <a:solidFill>
+            <a:schemeClr val="bg1"/>
+          </a:solidFill>
+        </p:spPr>
+        <p:txBody>
+          <a:bodyPr wrap="square" rtlCol="0">
+            <a:spAutoFit/>
+          </a:bodyPr>
+          <a:lstStyle/>
+          <a:p>
+            <a:pPr algn="ctr"/>
+            <a:r>
+              <a:rPr lang="en-US" sz="1400" dirty="0"/>
+              <a:t>Availability Set</a:t>
+            </a:r>
+          </a:p>
+        </p:txBody>
+      </p:sp>
+      <p:sp>
+        <p:nvSpPr>
+          <p:cNvPr id="25" name="TextBox 24">
+            <a:extLst>
+              <a:ext uri="{FF2B5EF4-FFF2-40B4-BE49-F238E27FC236}">
+                <a16:creationId xmlns:a16="http://schemas.microsoft.com/office/drawing/2014/main" id="{1968904F-096D-464F-8E4A-58CEB2F6AA42}"/>
+              </a:ext>
+            </a:extLst>
+          </p:cNvPr>
+          <p:cNvSpPr txBox="1"/>
+          <p:nvPr/>
+        </p:nvSpPr>
+        <p:spPr>
+          <a:xfrm>
+            <a:off x="4693321" y="2763415"/>
+            <a:ext cx="1604633" cy="307777"/>
+          </a:xfrm>
+          <a:prstGeom prst="rect">
+            <a:avLst/>
+          </a:prstGeom>
+          <a:solidFill>
+            <a:schemeClr val="bg1"/>
+          </a:solidFill>
+        </p:spPr>
+        <p:txBody>
+          <a:bodyPr wrap="square" rtlCol="0">
+            <a:spAutoFit/>
+          </a:bodyPr>
+          <a:lstStyle/>
+          <a:p>
+            <a:pPr algn="ctr"/>
+            <a:r>
+              <a:rPr lang="en-US" sz="1400" dirty="0"/>
+              <a:t>Load Balancer</a:t>
+            </a:r>
+          </a:p>
+        </p:txBody>
+      </p:sp>
+      <p:sp>
+        <p:nvSpPr>
+          <p:cNvPr id="28" name="TextBox 27">
+            <a:extLst>
+              <a:ext uri="{FF2B5EF4-FFF2-40B4-BE49-F238E27FC236}">
+                <a16:creationId xmlns:a16="http://schemas.microsoft.com/office/drawing/2014/main" id="{83E2B9EF-E38C-4F20-AEF7-EBA190994E49}"/>
+              </a:ext>
+            </a:extLst>
+          </p:cNvPr>
+          <p:cNvSpPr txBox="1"/>
+          <p:nvPr/>
+        </p:nvSpPr>
+        <p:spPr>
+          <a:xfrm>
+            <a:off x="4099647" y="5307871"/>
+            <a:ext cx="2929803" cy="307777"/>
+          </a:xfrm>
+          <a:prstGeom prst="rect">
+            <a:avLst/>
+          </a:prstGeom>
+          <a:noFill/>
+        </p:spPr>
+        <p:txBody>
+          <a:bodyPr wrap="square" rtlCol="0">
+            <a:spAutoFit/>
+          </a:bodyPr>
+          <a:lstStyle/>
+          <a:p>
+            <a:pPr algn="ctr"/>
+            <a:r>
+              <a:rPr lang="en-US" sz="1400" dirty="0"/>
+              <a:t>Managed Disks</a:t>
+            </a:r>
+          </a:p>
+        </p:txBody>
+      </p:sp>
+      <p:sp>
+        <p:nvSpPr>
+          <p:cNvPr id="32" name="TextBox 31">
+            <a:extLst>
+              <a:ext uri="{FF2B5EF4-FFF2-40B4-BE49-F238E27FC236}">
+                <a16:creationId xmlns:a16="http://schemas.microsoft.com/office/drawing/2014/main" id="{9EB4E68E-1CA2-4691-9C64-337F8F5834A3}"/>
+              </a:ext>
+            </a:extLst>
+          </p:cNvPr>
+          <p:cNvSpPr txBox="1"/>
+          <p:nvPr/>
+        </p:nvSpPr>
+        <p:spPr>
+          <a:xfrm>
+            <a:off x="2617115" y="5936436"/>
+            <a:ext cx="2929803" cy="307777"/>
+          </a:xfrm>
+          <a:prstGeom prst="rect">
+            <a:avLst/>
+          </a:prstGeom>
+          <a:noFill/>
+        </p:spPr>
+        <p:txBody>
+          <a:bodyPr wrap="square" rtlCol="0">
+            <a:spAutoFit/>
+          </a:bodyPr>
+          <a:lstStyle/>
+          <a:p>
+            <a:pPr algn="ctr"/>
+            <a:r>
+              <a:rPr lang="en-US" sz="1400" dirty="0"/>
+              <a:t>Virtual Network</a:t>
+            </a:r>
+          </a:p>
+        </p:txBody>
+      </p:sp>
     </p:spTree>
     <p:extLst>
       <p:ext uri="{BB962C8B-B14F-4D97-AF65-F5344CB8AC3E}">
-        <p14:creationId xmlns:p14="http://schemas.microsoft.com/office/powerpoint/2010/main" val="3982386796"/>
+        <p14:creationId xmlns:p14="http://schemas.microsoft.com/office/powerpoint/2010/main" val="2163705761"/>
       </p:ext>
     </p:extLst>
   </p:cSld>
@@ -6552,10 +7298,68 @@
       </p:grpSpPr>
       <p:sp>
         <p:nvSpPr>
-          <p:cNvPr id="2" name="Titel 1">
-            <a:extLst>
-              <a:ext uri="{FF2B5EF4-FFF2-40B4-BE49-F238E27FC236}">
-                <a16:creationId xmlns:a16="http://schemas.microsoft.com/office/drawing/2014/main" id="{7114DA6D-FE59-490A-9004-62DF38B2D936}"/>
+          <p:cNvPr id="53" name="Rectangle 52">
+            <a:extLst>
+              <a:ext uri="{FF2B5EF4-FFF2-40B4-BE49-F238E27FC236}">
+                <a16:creationId xmlns:a16="http://schemas.microsoft.com/office/drawing/2014/main" id="{9C1DC4AD-B0B7-470D-846E-2870E95DB857}"/>
+              </a:ext>
+            </a:extLst>
+          </p:cNvPr>
+          <p:cNvSpPr/>
+          <p:nvPr/>
+        </p:nvSpPr>
+        <p:spPr>
+          <a:xfrm>
+            <a:off x="7382506" y="4565898"/>
+            <a:ext cx="1989338" cy="1299588"/>
+          </a:xfrm>
+          <a:prstGeom prst="rect">
+            <a:avLst/>
+          </a:prstGeom>
+          <a:solidFill>
+            <a:schemeClr val="bg1">
+              <a:lumMod val="85000"/>
+            </a:schemeClr>
+          </a:solidFill>
+          <a:ln>
+            <a:solidFill>
+              <a:schemeClr val="bg1">
+                <a:lumMod val="95000"/>
+              </a:schemeClr>
+            </a:solidFill>
+          </a:ln>
+        </p:spPr>
+        <p:style>
+          <a:lnRef idx="2">
+            <a:schemeClr val="accent1">
+              <a:shade val="50000"/>
+            </a:schemeClr>
+          </a:lnRef>
+          <a:fillRef idx="1">
+            <a:schemeClr val="accent1"/>
+          </a:fillRef>
+          <a:effectRef idx="0">
+            <a:schemeClr val="accent1"/>
+          </a:effectRef>
+          <a:fontRef idx="minor">
+            <a:schemeClr val="lt1"/>
+          </a:fontRef>
+        </p:style>
+        <p:txBody>
+          <a:bodyPr rtlCol="0" anchor="ctr"/>
+          <a:lstStyle/>
+          <a:p>
+            <a:pPr algn="ctr"/>
+            <a:endParaRPr lang="en-US"/>
+          </a:p>
+        </p:txBody>
+      </p:sp>
+      <p:sp>
+        <p:nvSpPr>
+          <p:cNvPr id="2" name="Title 1">
+            <a:extLst>
+              <a:ext uri="{FF2B5EF4-FFF2-40B4-BE49-F238E27FC236}">
+                <a16:creationId xmlns:a16="http://schemas.microsoft.com/office/drawing/2014/main" id="{DF5C27B1-C847-48A0-8B75-ACFD7B2DE47F}"/>
               </a:ext>
             </a:extLst>
           </p:cNvPr>
@@ -6566,6 +7370,39 @@
             <p:ph type="title"/>
           </p:nvPr>
         </p:nvSpPr>
+        <p:spPr>
+          <a:xfrm>
+            <a:off x="838200" y="365125"/>
+            <a:ext cx="7517524" cy="1325563"/>
+          </a:xfrm>
+        </p:spPr>
+        <p:txBody>
+          <a:bodyPr/>
+          <a:lstStyle/>
+          <a:p>
+            <a:r>
+              <a:rPr lang="en-US" dirty="0"/>
+              <a:t>Nested deployments</a:t>
+            </a:r>
+          </a:p>
+        </p:txBody>
+      </p:sp>
+      <p:sp>
+        <p:nvSpPr>
+          <p:cNvPr id="4" name="Footer Placeholder 3">
+            <a:extLst>
+              <a:ext uri="{FF2B5EF4-FFF2-40B4-BE49-F238E27FC236}">
+                <a16:creationId xmlns:a16="http://schemas.microsoft.com/office/drawing/2014/main" id="{8976B5AA-0E0C-4ABC-872F-B42D9857F10B}"/>
+              </a:ext>
+            </a:extLst>
+          </p:cNvPr>
+          <p:cNvSpPr>
+            <a:spLocks noGrp="1"/>
+          </p:cNvSpPr>
+          <p:nvPr>
+            <p:ph type="ftr" sz="quarter" idx="11"/>
+          </p:nvPr>
+        </p:nvSpPr>
         <p:spPr/>
         <p:txBody>
           <a:bodyPr/>
@@ -6573,54 +7410,7 @@
           <a:p>
             <a:r>
               <a:rPr lang="de-DE" dirty="0"/>
-              <a:t>Template </a:t>
-            </a:r>
-            <a:r>
-              <a:rPr lang="de-DE" dirty="0" err="1"/>
-              <a:t>Deployment</a:t>
-            </a:r>
-            <a:r>
-              <a:rPr lang="de-DE" dirty="0"/>
-              <a:t> </a:t>
-            </a:r>
-            <a:r>
-              <a:rPr lang="de-DE" dirty="0" err="1"/>
-              <a:t>Process</a:t>
-            </a:r>
-            <a:endParaRPr lang="de-DE" dirty="0"/>
-          </a:p>
-        </p:txBody>
-      </p:sp>
-      <p:sp>
-        <p:nvSpPr>
-          <p:cNvPr id="4" name="Fußzeilenplatzhalter 3">
-            <a:extLst>
-              <a:ext uri="{FF2B5EF4-FFF2-40B4-BE49-F238E27FC236}">
-                <a16:creationId xmlns:a16="http://schemas.microsoft.com/office/drawing/2014/main" id="{EAAA7E8D-7422-4D87-A4CD-DA509BDDF5DC}"/>
-              </a:ext>
-            </a:extLst>
-          </p:cNvPr>
-          <p:cNvSpPr>
-            <a:spLocks noGrp="1"/>
-          </p:cNvSpPr>
-          <p:nvPr>
-            <p:ph type="ftr" sz="quarter" idx="11"/>
-          </p:nvPr>
-        </p:nvSpPr>
-        <p:spPr/>
-        <p:txBody>
-          <a:bodyPr/>
-          <a:lstStyle/>
-          <a:p>
-            <a:r>
-              <a:rPr lang="de-DE" dirty="0"/>
-              <a:t>Deploy Christmas </a:t>
-            </a:r>
-          </a:p>
-          <a:p>
-            <a:r>
-              <a:rPr lang="de-DE" dirty="0"/>
-              <a:t> Azure Infrastructure </a:t>
+              <a:t>Azure Infrastructure </a:t>
             </a:r>
             <a:r>
               <a:rPr lang="de-DE" dirty="0" err="1"/>
@@ -6635,10 +7425,10 @@
       </p:sp>
       <p:sp>
         <p:nvSpPr>
-          <p:cNvPr id="5" name="Foliennummernplatzhalter 4">
-            <a:extLst>
-              <a:ext uri="{FF2B5EF4-FFF2-40B4-BE49-F238E27FC236}">
-                <a16:creationId xmlns:a16="http://schemas.microsoft.com/office/drawing/2014/main" id="{34D2BEEB-B9A2-4D14-85A6-544FCED20DD5}"/>
+          <p:cNvPr id="5" name="Slide Number Placeholder 4">
+            <a:extLst>
+              <a:ext uri="{FF2B5EF4-FFF2-40B4-BE49-F238E27FC236}">
+                <a16:creationId xmlns:a16="http://schemas.microsoft.com/office/drawing/2014/main" id="{E06669C3-0F4B-4209-8979-FDC09B5456CE}"/>
               </a:ext>
             </a:extLst>
           </p:cNvPr>
@@ -6657,6 +7447,1467 @@
             <a:fld id="{EC4199FD-2E7C-41C7-A81B-1AFEDD0F02BC}" type="slidenum">
               <a:rPr lang="de-DE" smtClean="0"/>
               <a:t>14</a:t>
+            </a:fld>
+            <a:endParaRPr lang="de-DE"/>
+          </a:p>
+        </p:txBody>
+      </p:sp>
+      <p:pic>
+        <p:nvPicPr>
+          <p:cNvPr id="9" name="Content Placeholder 6" descr="A close up of a sign&#10;&#10;Description generated with very high confidence">
+            <a:extLst>
+              <a:ext uri="{FF2B5EF4-FFF2-40B4-BE49-F238E27FC236}">
+                <a16:creationId xmlns:a16="http://schemas.microsoft.com/office/drawing/2014/main" id="{0E256757-68D3-4F56-9113-A770C0A39025}"/>
+              </a:ext>
+            </a:extLst>
+          </p:cNvPr>
+          <p:cNvPicPr>
+            <a:picLocks noChangeAspect="1"/>
+          </p:cNvPicPr>
+          <p:nvPr/>
+        </p:nvPicPr>
+        <p:blipFill>
+          <a:blip r:embed="rId2">
+            <a:extLst>
+              <a:ext uri="{28A0092B-C50C-407E-A947-70E740481C1C}">
+                <a14:useLocalDpi xmlns:a14="http://schemas.microsoft.com/office/drawing/2010/main" val="0"/>
+              </a:ext>
+            </a:extLst>
+          </a:blip>
+          <a:stretch>
+            <a:fillRect/>
+          </a:stretch>
+        </p:blipFill>
+        <p:spPr>
+          <a:xfrm>
+            <a:off x="5712782" y="1947377"/>
+            <a:ext cx="780290" cy="780290"/>
+          </a:xfrm>
+          <a:prstGeom prst="rect">
+            <a:avLst/>
+          </a:prstGeom>
+        </p:spPr>
+      </p:pic>
+      <p:pic>
+        <p:nvPicPr>
+          <p:cNvPr id="10" name="Content Placeholder 6" descr="A close up of a sign&#10;&#10;Description generated with very high confidence">
+            <a:extLst>
+              <a:ext uri="{FF2B5EF4-FFF2-40B4-BE49-F238E27FC236}">
+                <a16:creationId xmlns:a16="http://schemas.microsoft.com/office/drawing/2014/main" id="{32296DDF-FF23-41D7-BF10-4D88D922C9E9}"/>
+              </a:ext>
+            </a:extLst>
+          </p:cNvPr>
+          <p:cNvPicPr>
+            <a:picLocks noChangeAspect="1"/>
+          </p:cNvPicPr>
+          <p:nvPr/>
+        </p:nvPicPr>
+        <p:blipFill>
+          <a:blip r:embed="rId2">
+            <a:extLst>
+              <a:ext uri="{28A0092B-C50C-407E-A947-70E740481C1C}">
+                <a14:useLocalDpi xmlns:a14="http://schemas.microsoft.com/office/drawing/2010/main" val="0"/>
+              </a:ext>
+            </a:extLst>
+          </a:blip>
+          <a:stretch>
+            <a:fillRect/>
+          </a:stretch>
+        </p:blipFill>
+        <p:spPr>
+          <a:xfrm>
+            <a:off x="3521594" y="3307482"/>
+            <a:ext cx="563449" cy="563449"/>
+          </a:xfrm>
+          <a:prstGeom prst="rect">
+            <a:avLst/>
+          </a:prstGeom>
+        </p:spPr>
+      </p:pic>
+      <p:pic>
+        <p:nvPicPr>
+          <p:cNvPr id="11" name="Content Placeholder 6" descr="A close up of a sign&#10;&#10;Description generated with very high confidence">
+            <a:extLst>
+              <a:ext uri="{FF2B5EF4-FFF2-40B4-BE49-F238E27FC236}">
+                <a16:creationId xmlns:a16="http://schemas.microsoft.com/office/drawing/2014/main" id="{F8C18D51-DC3F-40CD-90EA-38F9DEEE34C3}"/>
+              </a:ext>
+            </a:extLst>
+          </p:cNvPr>
+          <p:cNvPicPr>
+            <a:picLocks noChangeAspect="1"/>
+          </p:cNvPicPr>
+          <p:nvPr/>
+        </p:nvPicPr>
+        <p:blipFill>
+          <a:blip r:embed="rId2">
+            <a:extLst>
+              <a:ext uri="{28A0092B-C50C-407E-A947-70E740481C1C}">
+                <a14:useLocalDpi xmlns:a14="http://schemas.microsoft.com/office/drawing/2010/main" val="0"/>
+              </a:ext>
+            </a:extLst>
+          </a:blip>
+          <a:stretch>
+            <a:fillRect/>
+          </a:stretch>
+        </p:blipFill>
+        <p:spPr>
+          <a:xfrm>
+            <a:off x="5801521" y="3307483"/>
+            <a:ext cx="563449" cy="563449"/>
+          </a:xfrm>
+          <a:prstGeom prst="rect">
+            <a:avLst/>
+          </a:prstGeom>
+        </p:spPr>
+      </p:pic>
+      <p:pic>
+        <p:nvPicPr>
+          <p:cNvPr id="12" name="Content Placeholder 6" descr="A close up of a sign&#10;&#10;Description generated with very high confidence">
+            <a:extLst>
+              <a:ext uri="{FF2B5EF4-FFF2-40B4-BE49-F238E27FC236}">
+                <a16:creationId xmlns:a16="http://schemas.microsoft.com/office/drawing/2014/main" id="{0EB85EC1-6418-48A0-815D-4645BFE9A0A4}"/>
+              </a:ext>
+            </a:extLst>
+          </p:cNvPr>
+          <p:cNvPicPr>
+            <a:picLocks noChangeAspect="1"/>
+          </p:cNvPicPr>
+          <p:nvPr/>
+        </p:nvPicPr>
+        <p:blipFill>
+          <a:blip r:embed="rId2">
+            <a:extLst>
+              <a:ext uri="{28A0092B-C50C-407E-A947-70E740481C1C}">
+                <a14:useLocalDpi xmlns:a14="http://schemas.microsoft.com/office/drawing/2010/main" val="0"/>
+              </a:ext>
+            </a:extLst>
+          </a:blip>
+          <a:stretch>
+            <a:fillRect/>
+          </a:stretch>
+        </p:blipFill>
+        <p:spPr>
+          <a:xfrm>
+            <a:off x="8081448" y="3341857"/>
+            <a:ext cx="563449" cy="563449"/>
+          </a:xfrm>
+          <a:prstGeom prst="rect">
+            <a:avLst/>
+          </a:prstGeom>
+        </p:spPr>
+      </p:pic>
+      <p:pic>
+        <p:nvPicPr>
+          <p:cNvPr id="15" name="Picture 14" descr="A picture containing furniture, table&#10;&#10;Description generated with high confidence">
+            <a:extLst>
+              <a:ext uri="{FF2B5EF4-FFF2-40B4-BE49-F238E27FC236}">
+                <a16:creationId xmlns:a16="http://schemas.microsoft.com/office/drawing/2014/main" id="{91465030-DF13-473A-A329-F7063F3315CF}"/>
+              </a:ext>
+            </a:extLst>
+          </p:cNvPr>
+          <p:cNvPicPr>
+            <a:picLocks noChangeAspect="1"/>
+          </p:cNvPicPr>
+          <p:nvPr/>
+        </p:nvPicPr>
+        <p:blipFill>
+          <a:blip r:embed="rId3">
+            <a:extLst>
+              <a:ext uri="{28A0092B-C50C-407E-A947-70E740481C1C}">
+                <a14:useLocalDpi xmlns:a14="http://schemas.microsoft.com/office/drawing/2010/main" val="0"/>
+              </a:ext>
+            </a:extLst>
+          </a:blip>
+          <a:stretch>
+            <a:fillRect/>
+          </a:stretch>
+        </p:blipFill>
+        <p:spPr>
+          <a:xfrm>
+            <a:off x="8175025" y="4427462"/>
+            <a:ext cx="376293" cy="376293"/>
+          </a:xfrm>
+          <a:prstGeom prst="rect">
+            <a:avLst/>
+          </a:prstGeom>
+        </p:spPr>
+      </p:pic>
+      <p:cxnSp>
+        <p:nvCxnSpPr>
+          <p:cNvPr id="18" name="Connector: Elbow 17">
+            <a:extLst>
+              <a:ext uri="{FF2B5EF4-FFF2-40B4-BE49-F238E27FC236}">
+                <a16:creationId xmlns:a16="http://schemas.microsoft.com/office/drawing/2014/main" id="{F11E6180-79FB-4EC7-9BBC-6AC434A6E534}"/>
+              </a:ext>
+            </a:extLst>
+          </p:cNvPr>
+          <p:cNvCxnSpPr>
+            <a:cxnSpLocks/>
+            <a:stCxn id="9" idx="2"/>
+            <a:endCxn id="11" idx="0"/>
+          </p:cNvCxnSpPr>
+          <p:nvPr/>
+        </p:nvCxnSpPr>
+        <p:spPr>
+          <a:xfrm rot="5400000">
+            <a:off x="5803179" y="3007735"/>
+            <a:ext cx="579816" cy="19681"/>
+          </a:xfrm>
+          <a:prstGeom prst="bentConnector3">
+            <a:avLst>
+              <a:gd name="adj1" fmla="val 50000"/>
+            </a:avLst>
+          </a:prstGeom>
+          <a:ln w="28575"/>
+        </p:spPr>
+        <p:style>
+          <a:lnRef idx="1">
+            <a:schemeClr val="accent1"/>
+          </a:lnRef>
+          <a:fillRef idx="0">
+            <a:schemeClr val="accent1"/>
+          </a:fillRef>
+          <a:effectRef idx="0">
+            <a:schemeClr val="accent1"/>
+          </a:effectRef>
+          <a:fontRef idx="minor">
+            <a:schemeClr val="tx1"/>
+          </a:fontRef>
+        </p:style>
+      </p:cxnSp>
+      <p:cxnSp>
+        <p:nvCxnSpPr>
+          <p:cNvPr id="21" name="Connector: Elbow 20">
+            <a:extLst>
+              <a:ext uri="{FF2B5EF4-FFF2-40B4-BE49-F238E27FC236}">
+                <a16:creationId xmlns:a16="http://schemas.microsoft.com/office/drawing/2014/main" id="{F8310B9E-AFE5-4805-8ED9-983429C47680}"/>
+              </a:ext>
+            </a:extLst>
+          </p:cNvPr>
+          <p:cNvCxnSpPr>
+            <a:cxnSpLocks/>
+            <a:stCxn id="11" idx="2"/>
+            <a:endCxn id="81" idx="0"/>
+          </p:cNvCxnSpPr>
+          <p:nvPr/>
+        </p:nvCxnSpPr>
+        <p:spPr>
+          <a:xfrm rot="16200000" flipH="1">
+            <a:off x="5794110" y="4160068"/>
+            <a:ext cx="583176" cy="4904"/>
+          </a:xfrm>
+          <a:prstGeom prst="bentConnector3">
+            <a:avLst>
+              <a:gd name="adj1" fmla="val 50000"/>
+            </a:avLst>
+          </a:prstGeom>
+          <a:ln w="28575"/>
+        </p:spPr>
+        <p:style>
+          <a:lnRef idx="1">
+            <a:schemeClr val="accent1"/>
+          </a:lnRef>
+          <a:fillRef idx="0">
+            <a:schemeClr val="accent1"/>
+          </a:fillRef>
+          <a:effectRef idx="0">
+            <a:schemeClr val="accent1"/>
+          </a:effectRef>
+          <a:fontRef idx="minor">
+            <a:schemeClr val="tx1"/>
+          </a:fontRef>
+        </p:style>
+      </p:cxnSp>
+      <p:cxnSp>
+        <p:nvCxnSpPr>
+          <p:cNvPr id="24" name="Connector: Elbow 23">
+            <a:extLst>
+              <a:ext uri="{FF2B5EF4-FFF2-40B4-BE49-F238E27FC236}">
+                <a16:creationId xmlns:a16="http://schemas.microsoft.com/office/drawing/2014/main" id="{C69F2CE1-CFF2-4871-A626-33CE4F6F571D}"/>
+              </a:ext>
+            </a:extLst>
+          </p:cNvPr>
+          <p:cNvCxnSpPr>
+            <a:cxnSpLocks/>
+            <a:stCxn id="9" idx="2"/>
+            <a:endCxn id="10" idx="0"/>
+          </p:cNvCxnSpPr>
+          <p:nvPr/>
+        </p:nvCxnSpPr>
+        <p:spPr>
+          <a:xfrm rot="5400000">
+            <a:off x="4663216" y="1867770"/>
+            <a:ext cx="579815" cy="2299608"/>
+          </a:xfrm>
+          <a:prstGeom prst="bentConnector3">
+            <a:avLst>
+              <a:gd name="adj1" fmla="val 50000"/>
+            </a:avLst>
+          </a:prstGeom>
+          <a:ln w="28575"/>
+        </p:spPr>
+        <p:style>
+          <a:lnRef idx="1">
+            <a:schemeClr val="accent1"/>
+          </a:lnRef>
+          <a:fillRef idx="0">
+            <a:schemeClr val="accent1"/>
+          </a:fillRef>
+          <a:effectRef idx="0">
+            <a:schemeClr val="accent1"/>
+          </a:effectRef>
+          <a:fontRef idx="minor">
+            <a:schemeClr val="tx1"/>
+          </a:fontRef>
+        </p:style>
+      </p:cxnSp>
+      <p:cxnSp>
+        <p:nvCxnSpPr>
+          <p:cNvPr id="27" name="Connector: Elbow 26">
+            <a:extLst>
+              <a:ext uri="{FF2B5EF4-FFF2-40B4-BE49-F238E27FC236}">
+                <a16:creationId xmlns:a16="http://schemas.microsoft.com/office/drawing/2014/main" id="{78B6B5E2-3017-4027-B2EA-0A303F0AA804}"/>
+              </a:ext>
+            </a:extLst>
+          </p:cNvPr>
+          <p:cNvCxnSpPr>
+            <a:cxnSpLocks/>
+            <a:stCxn id="12" idx="0"/>
+            <a:endCxn id="9" idx="2"/>
+          </p:cNvCxnSpPr>
+          <p:nvPr/>
+        </p:nvCxnSpPr>
+        <p:spPr>
+          <a:xfrm rot="16200000" flipV="1">
+            <a:off x="6925955" y="1904639"/>
+            <a:ext cx="614190" cy="2260246"/>
+          </a:xfrm>
+          <a:prstGeom prst="bentConnector3">
+            <a:avLst>
+              <a:gd name="adj1" fmla="val 50000"/>
+            </a:avLst>
+          </a:prstGeom>
+          <a:ln w="28575"/>
+        </p:spPr>
+        <p:style>
+          <a:lnRef idx="1">
+            <a:schemeClr val="accent1"/>
+          </a:lnRef>
+          <a:fillRef idx="0">
+            <a:schemeClr val="accent1"/>
+          </a:fillRef>
+          <a:effectRef idx="0">
+            <a:schemeClr val="accent1"/>
+          </a:effectRef>
+          <a:fontRef idx="minor">
+            <a:schemeClr val="tx1"/>
+          </a:fontRef>
+        </p:style>
+      </p:cxnSp>
+      <p:sp>
+        <p:nvSpPr>
+          <p:cNvPr id="29" name="TextBox 28">
+            <a:extLst>
+              <a:ext uri="{FF2B5EF4-FFF2-40B4-BE49-F238E27FC236}">
+                <a16:creationId xmlns:a16="http://schemas.microsoft.com/office/drawing/2014/main" id="{FE71746E-0945-447C-A3AB-FD59B90B7A48}"/>
+              </a:ext>
+            </a:extLst>
+          </p:cNvPr>
+          <p:cNvSpPr txBox="1"/>
+          <p:nvPr/>
+        </p:nvSpPr>
+        <p:spPr>
+          <a:xfrm>
+            <a:off x="5406768" y="2861672"/>
+            <a:ext cx="1392317" cy="307777"/>
+          </a:xfrm>
+          <a:prstGeom prst="rect">
+            <a:avLst/>
+          </a:prstGeom>
+          <a:solidFill>
+            <a:schemeClr val="bg1"/>
+          </a:solidFill>
+        </p:spPr>
+        <p:txBody>
+          <a:bodyPr wrap="square" rtlCol="0">
+            <a:spAutoFit/>
+          </a:bodyPr>
+          <a:lstStyle/>
+          <a:p>
+            <a:pPr algn="ctr"/>
+            <a:r>
+              <a:rPr lang="en-US" sz="1400" dirty="0"/>
+              <a:t>Template Links</a:t>
+            </a:r>
+          </a:p>
+        </p:txBody>
+      </p:sp>
+      <p:cxnSp>
+        <p:nvCxnSpPr>
+          <p:cNvPr id="32" name="Connector: Elbow 31">
+            <a:extLst>
+              <a:ext uri="{FF2B5EF4-FFF2-40B4-BE49-F238E27FC236}">
+                <a16:creationId xmlns:a16="http://schemas.microsoft.com/office/drawing/2014/main" id="{93D3C9C3-F674-4466-B2F6-763CE1543097}"/>
+              </a:ext>
+            </a:extLst>
+          </p:cNvPr>
+          <p:cNvCxnSpPr>
+            <a:cxnSpLocks/>
+            <a:stCxn id="71" idx="0"/>
+            <a:endCxn id="10" idx="2"/>
+          </p:cNvCxnSpPr>
+          <p:nvPr/>
+        </p:nvCxnSpPr>
+        <p:spPr>
+          <a:xfrm rot="5400000" flipH="1" flipV="1">
+            <a:off x="3507579" y="4162479"/>
+            <a:ext cx="587287" cy="4193"/>
+          </a:xfrm>
+          <a:prstGeom prst="bentConnector3">
+            <a:avLst>
+              <a:gd name="adj1" fmla="val 50000"/>
+            </a:avLst>
+          </a:prstGeom>
+          <a:ln w="28575"/>
+        </p:spPr>
+        <p:style>
+          <a:lnRef idx="1">
+            <a:schemeClr val="accent1"/>
+          </a:lnRef>
+          <a:fillRef idx="0">
+            <a:schemeClr val="accent1"/>
+          </a:fillRef>
+          <a:effectRef idx="0">
+            <a:schemeClr val="accent1"/>
+          </a:effectRef>
+          <a:fontRef idx="minor">
+            <a:schemeClr val="tx1"/>
+          </a:fontRef>
+        </p:style>
+      </p:cxnSp>
+      <p:cxnSp>
+        <p:nvCxnSpPr>
+          <p:cNvPr id="38" name="Connector: Elbow 37">
+            <a:extLst>
+              <a:ext uri="{FF2B5EF4-FFF2-40B4-BE49-F238E27FC236}">
+                <a16:creationId xmlns:a16="http://schemas.microsoft.com/office/drawing/2014/main" id="{11567DCF-7A77-4620-A2B1-2A5281FDF90D}"/>
+              </a:ext>
+            </a:extLst>
+          </p:cNvPr>
+          <p:cNvCxnSpPr>
+            <a:cxnSpLocks/>
+            <a:stCxn id="12" idx="2"/>
+            <a:endCxn id="15" idx="0"/>
+          </p:cNvCxnSpPr>
+          <p:nvPr/>
+        </p:nvCxnSpPr>
+        <p:spPr>
+          <a:xfrm rot="5400000">
+            <a:off x="8102095" y="4166384"/>
+            <a:ext cx="522156" cy="1"/>
+          </a:xfrm>
+          <a:prstGeom prst="bentConnector3">
+            <a:avLst>
+              <a:gd name="adj1" fmla="val 50000"/>
+            </a:avLst>
+          </a:prstGeom>
+          <a:ln w="28575"/>
+        </p:spPr>
+        <p:style>
+          <a:lnRef idx="1">
+            <a:schemeClr val="accent1"/>
+          </a:lnRef>
+          <a:fillRef idx="0">
+            <a:schemeClr val="accent1"/>
+          </a:fillRef>
+          <a:effectRef idx="0">
+            <a:schemeClr val="accent1"/>
+          </a:effectRef>
+          <a:fontRef idx="minor">
+            <a:schemeClr val="tx1"/>
+          </a:fontRef>
+        </p:style>
+      </p:cxnSp>
+      <p:sp>
+        <p:nvSpPr>
+          <p:cNvPr id="42" name="TextBox 41">
+            <a:extLst>
+              <a:ext uri="{FF2B5EF4-FFF2-40B4-BE49-F238E27FC236}">
+                <a16:creationId xmlns:a16="http://schemas.microsoft.com/office/drawing/2014/main" id="{1BB401A9-3BAF-4998-9A80-1837E24710CA}"/>
+              </a:ext>
+            </a:extLst>
+          </p:cNvPr>
+          <p:cNvSpPr txBox="1"/>
+          <p:nvPr/>
+        </p:nvSpPr>
+        <p:spPr>
+          <a:xfrm>
+            <a:off x="7382506" y="5508444"/>
+            <a:ext cx="1989337" cy="307777"/>
+          </a:xfrm>
+          <a:prstGeom prst="rect">
+            <a:avLst/>
+          </a:prstGeom>
+          <a:noFill/>
+        </p:spPr>
+        <p:txBody>
+          <a:bodyPr wrap="square" rtlCol="0">
+            <a:spAutoFit/>
+          </a:bodyPr>
+          <a:lstStyle/>
+          <a:p>
+            <a:pPr algn="ctr"/>
+            <a:r>
+              <a:rPr lang="en-US" sz="1400" dirty="0"/>
+              <a:t>Network</a:t>
+            </a:r>
+          </a:p>
+        </p:txBody>
+      </p:sp>
+      <p:sp>
+        <p:nvSpPr>
+          <p:cNvPr id="43" name="TextBox 42">
+            <a:extLst>
+              <a:ext uri="{FF2B5EF4-FFF2-40B4-BE49-F238E27FC236}">
+                <a16:creationId xmlns:a16="http://schemas.microsoft.com/office/drawing/2014/main" id="{265F4F89-896C-44B0-93A6-07ED6FC97856}"/>
+              </a:ext>
+            </a:extLst>
+          </p:cNvPr>
+          <p:cNvSpPr txBox="1"/>
+          <p:nvPr/>
+        </p:nvSpPr>
+        <p:spPr>
+          <a:xfrm>
+            <a:off x="3102966" y="3944382"/>
+            <a:ext cx="1392317" cy="307777"/>
+          </a:xfrm>
+          <a:prstGeom prst="rect">
+            <a:avLst/>
+          </a:prstGeom>
+          <a:solidFill>
+            <a:schemeClr val="bg1"/>
+          </a:solidFill>
+        </p:spPr>
+        <p:txBody>
+          <a:bodyPr wrap="square" rtlCol="0">
+            <a:spAutoFit/>
+          </a:bodyPr>
+          <a:lstStyle/>
+          <a:p>
+            <a:pPr algn="ctr"/>
+            <a:r>
+              <a:rPr lang="en-US" sz="1400" dirty="0"/>
+              <a:t>VM</a:t>
+            </a:r>
+          </a:p>
+        </p:txBody>
+      </p:sp>
+      <p:sp>
+        <p:nvSpPr>
+          <p:cNvPr id="44" name="TextBox 43">
+            <a:extLst>
+              <a:ext uri="{FF2B5EF4-FFF2-40B4-BE49-F238E27FC236}">
+                <a16:creationId xmlns:a16="http://schemas.microsoft.com/office/drawing/2014/main" id="{31CEBFA5-831B-4CA4-9D14-EC1A6C085D61}"/>
+              </a:ext>
+            </a:extLst>
+          </p:cNvPr>
+          <p:cNvSpPr txBox="1"/>
+          <p:nvPr/>
+        </p:nvSpPr>
+        <p:spPr>
+          <a:xfrm>
+            <a:off x="5406768" y="3933895"/>
+            <a:ext cx="1392317" cy="307777"/>
+          </a:xfrm>
+          <a:prstGeom prst="rect">
+            <a:avLst/>
+          </a:prstGeom>
+          <a:solidFill>
+            <a:schemeClr val="bg1"/>
+          </a:solidFill>
+        </p:spPr>
+        <p:txBody>
+          <a:bodyPr wrap="square" rtlCol="0">
+            <a:spAutoFit/>
+          </a:bodyPr>
+          <a:lstStyle/>
+          <a:p>
+            <a:pPr algn="ctr"/>
+            <a:r>
+              <a:rPr lang="en-US" sz="1400" dirty="0"/>
+              <a:t>VM</a:t>
+            </a:r>
+          </a:p>
+        </p:txBody>
+      </p:sp>
+      <p:sp>
+        <p:nvSpPr>
+          <p:cNvPr id="45" name="TextBox 44">
+            <a:extLst>
+              <a:ext uri="{FF2B5EF4-FFF2-40B4-BE49-F238E27FC236}">
+                <a16:creationId xmlns:a16="http://schemas.microsoft.com/office/drawing/2014/main" id="{DBE3C532-E06B-462B-9197-38A403B84350}"/>
+              </a:ext>
+            </a:extLst>
+          </p:cNvPr>
+          <p:cNvSpPr txBox="1"/>
+          <p:nvPr/>
+        </p:nvSpPr>
+        <p:spPr>
+          <a:xfrm>
+            <a:off x="7659565" y="3939660"/>
+            <a:ext cx="1392317" cy="307777"/>
+          </a:xfrm>
+          <a:prstGeom prst="rect">
+            <a:avLst/>
+          </a:prstGeom>
+          <a:solidFill>
+            <a:schemeClr val="bg1"/>
+          </a:solidFill>
+        </p:spPr>
+        <p:txBody>
+          <a:bodyPr wrap="square" rtlCol="0">
+            <a:spAutoFit/>
+          </a:bodyPr>
+          <a:lstStyle/>
+          <a:p>
+            <a:pPr algn="ctr"/>
+            <a:r>
+              <a:rPr lang="en-US" sz="1400" dirty="0"/>
+              <a:t>Network</a:t>
+            </a:r>
+          </a:p>
+        </p:txBody>
+      </p:sp>
+      <p:sp>
+        <p:nvSpPr>
+          <p:cNvPr id="47" name="TextBox 46">
+            <a:extLst>
+              <a:ext uri="{FF2B5EF4-FFF2-40B4-BE49-F238E27FC236}">
+                <a16:creationId xmlns:a16="http://schemas.microsoft.com/office/drawing/2014/main" id="{E7008E08-1ACA-4DD7-A09A-A2144F08AD89}"/>
+              </a:ext>
+            </a:extLst>
+          </p:cNvPr>
+          <p:cNvSpPr txBox="1"/>
+          <p:nvPr/>
+        </p:nvSpPr>
+        <p:spPr>
+          <a:xfrm>
+            <a:off x="5293683" y="1582893"/>
+            <a:ext cx="1604633" cy="307777"/>
+          </a:xfrm>
+          <a:prstGeom prst="rect">
+            <a:avLst/>
+          </a:prstGeom>
+          <a:solidFill>
+            <a:schemeClr val="bg1"/>
+          </a:solidFill>
+        </p:spPr>
+        <p:txBody>
+          <a:bodyPr wrap="square" rtlCol="0">
+            <a:spAutoFit/>
+          </a:bodyPr>
+          <a:lstStyle/>
+          <a:p>
+            <a:pPr algn="ctr"/>
+            <a:r>
+              <a:rPr lang="en-US" sz="1400" dirty="0"/>
+              <a:t>Parent Template</a:t>
+            </a:r>
+          </a:p>
+        </p:txBody>
+      </p:sp>
+      <p:pic>
+        <p:nvPicPr>
+          <p:cNvPr id="52" name="Picture 51">
+            <a:extLst>
+              <a:ext uri="{FF2B5EF4-FFF2-40B4-BE49-F238E27FC236}">
+                <a16:creationId xmlns:a16="http://schemas.microsoft.com/office/drawing/2014/main" id="{A5C048AE-40F9-4673-ADC8-B201392007EC}"/>
+              </a:ext>
+            </a:extLst>
+          </p:cNvPr>
+          <p:cNvPicPr>
+            <a:picLocks noChangeAspect="1"/>
+          </p:cNvPicPr>
+          <p:nvPr/>
+        </p:nvPicPr>
+        <p:blipFill>
+          <a:blip r:embed="rId4">
+            <a:extLst>
+              <a:ext uri="{28A0092B-C50C-407E-A947-70E740481C1C}">
+                <a14:useLocalDpi xmlns:a14="http://schemas.microsoft.com/office/drawing/2010/main" val="0"/>
+              </a:ext>
+            </a:extLst>
+          </a:blip>
+          <a:stretch>
+            <a:fillRect/>
+          </a:stretch>
+        </p:blipFill>
+        <p:spPr>
+          <a:xfrm>
+            <a:off x="8175025" y="4962811"/>
+            <a:ext cx="412768" cy="412768"/>
+          </a:xfrm>
+          <a:prstGeom prst="rect">
+            <a:avLst/>
+          </a:prstGeom>
+        </p:spPr>
+      </p:pic>
+      <p:grpSp>
+        <p:nvGrpSpPr>
+          <p:cNvPr id="1030" name="Group 1029">
+            <a:extLst>
+              <a:ext uri="{FF2B5EF4-FFF2-40B4-BE49-F238E27FC236}">
+                <a16:creationId xmlns:a16="http://schemas.microsoft.com/office/drawing/2014/main" id="{A8A0DA72-72CB-435A-80CD-B68D7FE05D9B}"/>
+              </a:ext>
+            </a:extLst>
+          </p:cNvPr>
+          <p:cNvGrpSpPr/>
+          <p:nvPr/>
+        </p:nvGrpSpPr>
+        <p:grpSpPr>
+          <a:xfrm>
+            <a:off x="2804457" y="4458218"/>
+            <a:ext cx="1989338" cy="1411378"/>
+            <a:chOff x="2995028" y="4450832"/>
+            <a:chExt cx="1989338" cy="1411378"/>
+          </a:xfrm>
+        </p:grpSpPr>
+        <p:sp>
+          <p:nvSpPr>
+            <p:cNvPr id="70" name="Rectangle 69">
+              <a:extLst>
+                <a:ext uri="{FF2B5EF4-FFF2-40B4-BE49-F238E27FC236}">
+                  <a16:creationId xmlns:a16="http://schemas.microsoft.com/office/drawing/2014/main" id="{6A7886C8-E459-4676-9D92-3C2A4AE26411}"/>
+                </a:ext>
+              </a:extLst>
+            </p:cNvPr>
+            <p:cNvSpPr/>
+            <p:nvPr/>
+          </p:nvSpPr>
+          <p:spPr>
+            <a:xfrm>
+              <a:off x="2995028" y="4562622"/>
+              <a:ext cx="1989338" cy="1299588"/>
+            </a:xfrm>
+            <a:prstGeom prst="rect">
+              <a:avLst/>
+            </a:prstGeom>
+            <a:solidFill>
+              <a:schemeClr val="bg1">
+                <a:lumMod val="85000"/>
+              </a:schemeClr>
+            </a:solidFill>
+            <a:ln>
+              <a:solidFill>
+                <a:schemeClr val="bg1">
+                  <a:lumMod val="95000"/>
+                </a:schemeClr>
+              </a:solidFill>
+            </a:ln>
+          </p:spPr>
+          <p:style>
+            <a:lnRef idx="2">
+              <a:schemeClr val="accent1">
+                <a:shade val="50000"/>
+              </a:schemeClr>
+            </a:lnRef>
+            <a:fillRef idx="1">
+              <a:schemeClr val="accent1"/>
+            </a:fillRef>
+            <a:effectRef idx="0">
+              <a:schemeClr val="accent1"/>
+            </a:effectRef>
+            <a:fontRef idx="minor">
+              <a:schemeClr val="lt1"/>
+            </a:fontRef>
+          </p:style>
+          <p:txBody>
+            <a:bodyPr rtlCol="0" anchor="ctr"/>
+            <a:lstStyle/>
+            <a:p>
+              <a:pPr algn="ctr"/>
+              <a:endParaRPr lang="en-US"/>
+            </a:p>
+          </p:txBody>
+        </p:sp>
+        <p:pic>
+          <p:nvPicPr>
+            <p:cNvPr id="71" name="Picture 70" descr="A picture containing furniture, table&#10;&#10;Description generated with high confidence">
+              <a:extLst>
+                <a:ext uri="{FF2B5EF4-FFF2-40B4-BE49-F238E27FC236}">
+                  <a16:creationId xmlns:a16="http://schemas.microsoft.com/office/drawing/2014/main" id="{55BB19DB-9B49-4B37-862A-0718E8382FF8}"/>
+                </a:ext>
+              </a:extLst>
+            </p:cNvPr>
+            <p:cNvPicPr>
+              <a:picLocks noChangeAspect="1"/>
+            </p:cNvPicPr>
+            <p:nvPr/>
+          </p:nvPicPr>
+          <p:blipFill>
+            <a:blip r:embed="rId3">
+              <a:extLst>
+                <a:ext uri="{28A0092B-C50C-407E-A947-70E740481C1C}">
+                  <a14:useLocalDpi xmlns:a14="http://schemas.microsoft.com/office/drawing/2010/main" val="0"/>
+                </a:ext>
+              </a:extLst>
+            </a:blip>
+            <a:stretch>
+              <a:fillRect/>
+            </a:stretch>
+          </p:blipFill>
+          <p:spPr>
+            <a:xfrm>
+              <a:off x="3801550" y="4450832"/>
+              <a:ext cx="376293" cy="376293"/>
+            </a:xfrm>
+            <a:prstGeom prst="rect">
+              <a:avLst/>
+            </a:prstGeom>
+          </p:spPr>
+        </p:pic>
+        <p:sp>
+          <p:nvSpPr>
+            <p:cNvPr id="72" name="TextBox 71">
+              <a:extLst>
+                <a:ext uri="{FF2B5EF4-FFF2-40B4-BE49-F238E27FC236}">
+                  <a16:creationId xmlns:a16="http://schemas.microsoft.com/office/drawing/2014/main" id="{DD420988-AFC0-48C5-BA6C-3218493CD9CA}"/>
+                </a:ext>
+              </a:extLst>
+            </p:cNvPr>
+            <p:cNvSpPr txBox="1"/>
+            <p:nvPr/>
+          </p:nvSpPr>
+          <p:spPr>
+            <a:xfrm>
+              <a:off x="3269490" y="5505168"/>
+              <a:ext cx="1392317" cy="307777"/>
+            </a:xfrm>
+            <a:prstGeom prst="rect">
+              <a:avLst/>
+            </a:prstGeom>
+            <a:noFill/>
+          </p:spPr>
+          <p:txBody>
+            <a:bodyPr wrap="square" rtlCol="0">
+              <a:spAutoFit/>
+            </a:bodyPr>
+            <a:lstStyle/>
+            <a:p>
+              <a:pPr algn="ctr"/>
+              <a:r>
+                <a:rPr lang="en-US" sz="1400" dirty="0"/>
+                <a:t>Service 1</a:t>
+              </a:r>
+            </a:p>
+          </p:txBody>
+        </p:sp>
+        <p:pic>
+          <p:nvPicPr>
+            <p:cNvPr id="73" name="Picture 72">
+              <a:extLst>
+                <a:ext uri="{FF2B5EF4-FFF2-40B4-BE49-F238E27FC236}">
+                  <a16:creationId xmlns:a16="http://schemas.microsoft.com/office/drawing/2014/main" id="{31A32FB4-A86E-4D22-957D-D543A05DA00C}"/>
+                </a:ext>
+              </a:extLst>
+            </p:cNvPr>
+            <p:cNvPicPr>
+              <a:picLocks noChangeAspect="1"/>
+            </p:cNvPicPr>
+            <p:nvPr/>
+          </p:nvPicPr>
+          <p:blipFill>
+            <a:blip r:embed="rId5"/>
+            <a:stretch>
+              <a:fillRect/>
+            </a:stretch>
+          </p:blipFill>
+          <p:spPr>
+            <a:xfrm>
+              <a:off x="3200868" y="4997224"/>
+              <a:ext cx="387844" cy="384784"/>
+            </a:xfrm>
+            <a:prstGeom prst="rect">
+              <a:avLst/>
+            </a:prstGeom>
+          </p:spPr>
+        </p:pic>
+        <p:pic>
+          <p:nvPicPr>
+            <p:cNvPr id="74" name="Picture 73">
+              <a:extLst>
+                <a:ext uri="{FF2B5EF4-FFF2-40B4-BE49-F238E27FC236}">
+                  <a16:creationId xmlns:a16="http://schemas.microsoft.com/office/drawing/2014/main" id="{A2B918C1-0E59-4DA5-A312-6488B42C7779}"/>
+                </a:ext>
+              </a:extLst>
+            </p:cNvPr>
+            <p:cNvPicPr>
+              <a:picLocks noChangeAspect="1"/>
+            </p:cNvPicPr>
+            <p:nvPr/>
+          </p:nvPicPr>
+          <p:blipFill>
+            <a:blip r:embed="rId6"/>
+            <a:stretch>
+              <a:fillRect/>
+            </a:stretch>
+          </p:blipFill>
+          <p:spPr>
+            <a:xfrm>
+              <a:off x="4317081" y="5034270"/>
+              <a:ext cx="385973" cy="329495"/>
+            </a:xfrm>
+            <a:prstGeom prst="rect">
+              <a:avLst/>
+            </a:prstGeom>
+          </p:spPr>
+        </p:pic>
+        <p:pic>
+          <p:nvPicPr>
+            <p:cNvPr id="75" name="Picture 74" descr="A picture containing electronics, display&#10;&#10;Description generated with very high confidence">
+              <a:extLst>
+                <a:ext uri="{FF2B5EF4-FFF2-40B4-BE49-F238E27FC236}">
+                  <a16:creationId xmlns:a16="http://schemas.microsoft.com/office/drawing/2014/main" id="{25233A56-3FBE-4A8E-945A-FF2D13BAEBEB}"/>
+                </a:ext>
+              </a:extLst>
+            </p:cNvPr>
+            <p:cNvPicPr>
+              <a:picLocks noChangeAspect="1"/>
+            </p:cNvPicPr>
+            <p:nvPr/>
+          </p:nvPicPr>
+          <p:blipFill>
+            <a:blip r:embed="rId7">
+              <a:extLst>
+                <a:ext uri="{28A0092B-C50C-407E-A947-70E740481C1C}">
+                  <a14:useLocalDpi xmlns:a14="http://schemas.microsoft.com/office/drawing/2010/main" val="0"/>
+                </a:ext>
+              </a:extLst>
+            </a:blip>
+            <a:stretch>
+              <a:fillRect/>
+            </a:stretch>
+          </p:blipFill>
+          <p:spPr>
+            <a:xfrm>
+              <a:off x="3759910" y="5006032"/>
+              <a:ext cx="385973" cy="385973"/>
+            </a:xfrm>
+            <a:prstGeom prst="rect">
+              <a:avLst/>
+            </a:prstGeom>
+          </p:spPr>
+        </p:pic>
+      </p:grpSp>
+      <p:grpSp>
+        <p:nvGrpSpPr>
+          <p:cNvPr id="79" name="Group 78">
+            <a:extLst>
+              <a:ext uri="{FF2B5EF4-FFF2-40B4-BE49-F238E27FC236}">
+                <a16:creationId xmlns:a16="http://schemas.microsoft.com/office/drawing/2014/main" id="{1C44597A-3E9B-4DDC-AF28-4CE678A3383D}"/>
+              </a:ext>
+            </a:extLst>
+          </p:cNvPr>
+          <p:cNvGrpSpPr/>
+          <p:nvPr/>
+        </p:nvGrpSpPr>
+        <p:grpSpPr>
+          <a:xfrm>
+            <a:off x="5093481" y="4454108"/>
+            <a:ext cx="1989338" cy="1411378"/>
+            <a:chOff x="2995028" y="4450832"/>
+            <a:chExt cx="1989338" cy="1411378"/>
+          </a:xfrm>
+        </p:grpSpPr>
+        <p:sp>
+          <p:nvSpPr>
+            <p:cNvPr id="80" name="Rectangle 79">
+              <a:extLst>
+                <a:ext uri="{FF2B5EF4-FFF2-40B4-BE49-F238E27FC236}">
+                  <a16:creationId xmlns:a16="http://schemas.microsoft.com/office/drawing/2014/main" id="{BCA22CDE-499A-4C42-BC9B-0730ED0221D0}"/>
+                </a:ext>
+              </a:extLst>
+            </p:cNvPr>
+            <p:cNvSpPr/>
+            <p:nvPr/>
+          </p:nvSpPr>
+          <p:spPr>
+            <a:xfrm>
+              <a:off x="2995028" y="4562622"/>
+              <a:ext cx="1989338" cy="1299588"/>
+            </a:xfrm>
+            <a:prstGeom prst="rect">
+              <a:avLst/>
+            </a:prstGeom>
+            <a:solidFill>
+              <a:schemeClr val="bg1">
+                <a:lumMod val="85000"/>
+              </a:schemeClr>
+            </a:solidFill>
+            <a:ln>
+              <a:solidFill>
+                <a:schemeClr val="bg1">
+                  <a:lumMod val="95000"/>
+                </a:schemeClr>
+              </a:solidFill>
+            </a:ln>
+          </p:spPr>
+          <p:style>
+            <a:lnRef idx="2">
+              <a:schemeClr val="accent1">
+                <a:shade val="50000"/>
+              </a:schemeClr>
+            </a:lnRef>
+            <a:fillRef idx="1">
+              <a:schemeClr val="accent1"/>
+            </a:fillRef>
+            <a:effectRef idx="0">
+              <a:schemeClr val="accent1"/>
+            </a:effectRef>
+            <a:fontRef idx="minor">
+              <a:schemeClr val="lt1"/>
+            </a:fontRef>
+          </p:style>
+          <p:txBody>
+            <a:bodyPr rtlCol="0" anchor="ctr"/>
+            <a:lstStyle/>
+            <a:p>
+              <a:pPr algn="ctr"/>
+              <a:endParaRPr lang="en-US"/>
+            </a:p>
+          </p:txBody>
+        </p:sp>
+        <p:pic>
+          <p:nvPicPr>
+            <p:cNvPr id="81" name="Picture 80" descr="A picture containing furniture, table&#10;&#10;Description generated with high confidence">
+              <a:extLst>
+                <a:ext uri="{FF2B5EF4-FFF2-40B4-BE49-F238E27FC236}">
+                  <a16:creationId xmlns:a16="http://schemas.microsoft.com/office/drawing/2014/main" id="{57444C40-ADDB-4810-BE27-B12C0E24682E}"/>
+                </a:ext>
+              </a:extLst>
+            </p:cNvPr>
+            <p:cNvPicPr>
+              <a:picLocks noChangeAspect="1"/>
+            </p:cNvPicPr>
+            <p:nvPr/>
+          </p:nvPicPr>
+          <p:blipFill>
+            <a:blip r:embed="rId3">
+              <a:extLst>
+                <a:ext uri="{28A0092B-C50C-407E-A947-70E740481C1C}">
+                  <a14:useLocalDpi xmlns:a14="http://schemas.microsoft.com/office/drawing/2010/main" val="0"/>
+                </a:ext>
+              </a:extLst>
+            </a:blip>
+            <a:stretch>
+              <a:fillRect/>
+            </a:stretch>
+          </p:blipFill>
+          <p:spPr>
+            <a:xfrm>
+              <a:off x="3801550" y="4450832"/>
+              <a:ext cx="376293" cy="376293"/>
+            </a:xfrm>
+            <a:prstGeom prst="rect">
+              <a:avLst/>
+            </a:prstGeom>
+          </p:spPr>
+        </p:pic>
+        <p:sp>
+          <p:nvSpPr>
+            <p:cNvPr id="82" name="TextBox 81">
+              <a:extLst>
+                <a:ext uri="{FF2B5EF4-FFF2-40B4-BE49-F238E27FC236}">
+                  <a16:creationId xmlns:a16="http://schemas.microsoft.com/office/drawing/2014/main" id="{ED6B3CB6-37C3-4802-9F26-ABD32CDADE0E}"/>
+                </a:ext>
+              </a:extLst>
+            </p:cNvPr>
+            <p:cNvSpPr txBox="1"/>
+            <p:nvPr/>
+          </p:nvSpPr>
+          <p:spPr>
+            <a:xfrm>
+              <a:off x="3269490" y="5505168"/>
+              <a:ext cx="1392317" cy="307777"/>
+            </a:xfrm>
+            <a:prstGeom prst="rect">
+              <a:avLst/>
+            </a:prstGeom>
+            <a:noFill/>
+          </p:spPr>
+          <p:txBody>
+            <a:bodyPr wrap="square" rtlCol="0">
+              <a:spAutoFit/>
+            </a:bodyPr>
+            <a:lstStyle/>
+            <a:p>
+              <a:pPr algn="ctr"/>
+              <a:r>
+                <a:rPr lang="en-US" sz="1400" dirty="0"/>
+                <a:t>Service 2</a:t>
+              </a:r>
+            </a:p>
+          </p:txBody>
+        </p:sp>
+        <p:pic>
+          <p:nvPicPr>
+            <p:cNvPr id="83" name="Picture 82">
+              <a:extLst>
+                <a:ext uri="{FF2B5EF4-FFF2-40B4-BE49-F238E27FC236}">
+                  <a16:creationId xmlns:a16="http://schemas.microsoft.com/office/drawing/2014/main" id="{56FA955F-7A56-4349-B4FD-ED39694B55B5}"/>
+                </a:ext>
+              </a:extLst>
+            </p:cNvPr>
+            <p:cNvPicPr>
+              <a:picLocks noChangeAspect="1"/>
+            </p:cNvPicPr>
+            <p:nvPr/>
+          </p:nvPicPr>
+          <p:blipFill>
+            <a:blip r:embed="rId5"/>
+            <a:stretch>
+              <a:fillRect/>
+            </a:stretch>
+          </p:blipFill>
+          <p:spPr>
+            <a:xfrm>
+              <a:off x="3200868" y="4997224"/>
+              <a:ext cx="387844" cy="384784"/>
+            </a:xfrm>
+            <a:prstGeom prst="rect">
+              <a:avLst/>
+            </a:prstGeom>
+          </p:spPr>
+        </p:pic>
+        <p:pic>
+          <p:nvPicPr>
+            <p:cNvPr id="84" name="Picture 83">
+              <a:extLst>
+                <a:ext uri="{FF2B5EF4-FFF2-40B4-BE49-F238E27FC236}">
+                  <a16:creationId xmlns:a16="http://schemas.microsoft.com/office/drawing/2014/main" id="{B1C19E4D-8641-462C-A85C-E200AB2CFADA}"/>
+                </a:ext>
+              </a:extLst>
+            </p:cNvPr>
+            <p:cNvPicPr>
+              <a:picLocks noChangeAspect="1"/>
+            </p:cNvPicPr>
+            <p:nvPr/>
+          </p:nvPicPr>
+          <p:blipFill>
+            <a:blip r:embed="rId6"/>
+            <a:stretch>
+              <a:fillRect/>
+            </a:stretch>
+          </p:blipFill>
+          <p:spPr>
+            <a:xfrm>
+              <a:off x="4317081" y="5034270"/>
+              <a:ext cx="385973" cy="329495"/>
+            </a:xfrm>
+            <a:prstGeom prst="rect">
+              <a:avLst/>
+            </a:prstGeom>
+          </p:spPr>
+        </p:pic>
+        <p:pic>
+          <p:nvPicPr>
+            <p:cNvPr id="85" name="Picture 84" descr="A picture containing electronics, display&#10;&#10;Description generated with very high confidence">
+              <a:extLst>
+                <a:ext uri="{FF2B5EF4-FFF2-40B4-BE49-F238E27FC236}">
+                  <a16:creationId xmlns:a16="http://schemas.microsoft.com/office/drawing/2014/main" id="{29095257-12CF-444E-8D66-13153ED46DAE}"/>
+                </a:ext>
+              </a:extLst>
+            </p:cNvPr>
+            <p:cNvPicPr>
+              <a:picLocks noChangeAspect="1"/>
+            </p:cNvPicPr>
+            <p:nvPr/>
+          </p:nvPicPr>
+          <p:blipFill>
+            <a:blip r:embed="rId7">
+              <a:extLst>
+                <a:ext uri="{28A0092B-C50C-407E-A947-70E740481C1C}">
+                  <a14:useLocalDpi xmlns:a14="http://schemas.microsoft.com/office/drawing/2010/main" val="0"/>
+                </a:ext>
+              </a:extLst>
+            </a:blip>
+            <a:stretch>
+              <a:fillRect/>
+            </a:stretch>
+          </p:blipFill>
+          <p:spPr>
+            <a:xfrm>
+              <a:off x="3759910" y="5006032"/>
+              <a:ext cx="385973" cy="385973"/>
+            </a:xfrm>
+            <a:prstGeom prst="rect">
+              <a:avLst/>
+            </a:prstGeom>
+          </p:spPr>
+        </p:pic>
+      </p:grpSp>
+    </p:spTree>
+    <p:extLst>
+      <p:ext uri="{BB962C8B-B14F-4D97-AF65-F5344CB8AC3E}">
+        <p14:creationId xmlns:p14="http://schemas.microsoft.com/office/powerpoint/2010/main" val="3131318668"/>
+      </p:ext>
+    </p:extLst>
+  </p:cSld>
+  <p:clrMapOvr>
+    <a:masterClrMapping/>
+  </p:clrMapOvr>
+</p:sld>
+</file>
+
+<file path=ppt/slides/slide15.xml><?xml version="1.0" encoding="utf-8"?>
+<p:sld xmlns:a="http://schemas.openxmlformats.org/drawingml/2006/main" xmlns:r="http://schemas.openxmlformats.org/officeDocument/2006/relationships" xmlns:p="http://schemas.openxmlformats.org/presentationml/2006/main">
+  <p:cSld>
+    <p:spTree>
+      <p:nvGrpSpPr>
+        <p:cNvPr id="1" name=""/>
+        <p:cNvGrpSpPr/>
+        <p:nvPr/>
+      </p:nvGrpSpPr>
+      <p:grpSpPr>
+        <a:xfrm>
+          <a:off x="0" y="0"/>
+          <a:ext cx="0" cy="0"/>
+          <a:chOff x="0" y="0"/>
+          <a:chExt cx="0" cy="0"/>
+        </a:xfrm>
+      </p:grpSpPr>
+      <p:sp>
+        <p:nvSpPr>
+          <p:cNvPr id="2" name="Titel 1">
+            <a:extLst>
+              <a:ext uri="{FF2B5EF4-FFF2-40B4-BE49-F238E27FC236}">
+                <a16:creationId xmlns:a16="http://schemas.microsoft.com/office/drawing/2014/main" id="{7114DA6D-FE59-490A-9004-62DF38B2D936}"/>
+              </a:ext>
+            </a:extLst>
+          </p:cNvPr>
+          <p:cNvSpPr>
+            <a:spLocks noGrp="1"/>
+          </p:cNvSpPr>
+          <p:nvPr>
+            <p:ph type="title"/>
+          </p:nvPr>
+        </p:nvSpPr>
+        <p:spPr>
+          <a:xfrm>
+            <a:off x="0" y="2766218"/>
+            <a:ext cx="12192000" cy="1325563"/>
+          </a:xfrm>
+        </p:spPr>
+        <p:txBody>
+          <a:bodyPr>
+            <a:normAutofit/>
+          </a:bodyPr>
+          <a:lstStyle/>
+          <a:p>
+            <a:pPr algn="ctr"/>
+            <a:r>
+              <a:rPr lang="de-DE" sz="8800" dirty="0"/>
+              <a:t>Hands On!</a:t>
+            </a:r>
+          </a:p>
+        </p:txBody>
+      </p:sp>
+      <p:sp>
+        <p:nvSpPr>
+          <p:cNvPr id="4" name="Fußzeilenplatzhalter 3">
+            <a:extLst>
+              <a:ext uri="{FF2B5EF4-FFF2-40B4-BE49-F238E27FC236}">
+                <a16:creationId xmlns:a16="http://schemas.microsoft.com/office/drawing/2014/main" id="{EAAA7E8D-7422-4D87-A4CD-DA509BDDF5DC}"/>
+              </a:ext>
+            </a:extLst>
+          </p:cNvPr>
+          <p:cNvSpPr>
+            <a:spLocks noGrp="1"/>
+          </p:cNvSpPr>
+          <p:nvPr>
+            <p:ph type="ftr" sz="quarter" idx="11"/>
+          </p:nvPr>
+        </p:nvSpPr>
+        <p:spPr/>
+        <p:txBody>
+          <a:bodyPr/>
+          <a:lstStyle/>
+          <a:p>
+            <a:r>
+              <a:rPr lang="de-DE" dirty="0"/>
+              <a:t>Azure Infrastructure </a:t>
+            </a:r>
+            <a:r>
+              <a:rPr lang="de-DE" dirty="0" err="1"/>
+              <a:t>Resource</a:t>
+            </a:r>
+            <a:r>
+              <a:rPr lang="de-DE" dirty="0"/>
+              <a:t> Template Tricks</a:t>
+            </a:r>
+          </a:p>
+        </p:txBody>
+      </p:sp>
+      <p:sp>
+        <p:nvSpPr>
+          <p:cNvPr id="5" name="Foliennummernplatzhalter 4">
+            <a:extLst>
+              <a:ext uri="{FF2B5EF4-FFF2-40B4-BE49-F238E27FC236}">
+                <a16:creationId xmlns:a16="http://schemas.microsoft.com/office/drawing/2014/main" id="{34D2BEEB-B9A2-4D14-85A6-544FCED20DD5}"/>
+              </a:ext>
+            </a:extLst>
+          </p:cNvPr>
+          <p:cNvSpPr>
+            <a:spLocks noGrp="1"/>
+          </p:cNvSpPr>
+          <p:nvPr>
+            <p:ph type="sldNum" sz="quarter" idx="12"/>
+          </p:nvPr>
+        </p:nvSpPr>
+        <p:spPr/>
+        <p:txBody>
+          <a:bodyPr/>
+          <a:lstStyle/>
+          <a:p>
+            <a:fld id="{EC4199FD-2E7C-41C7-A81B-1AFEDD0F02BC}" type="slidenum">
+              <a:rPr lang="de-DE" smtClean="0"/>
+              <a:t>15</a:t>
+            </a:fld>
+            <a:endParaRPr lang="de-DE"/>
+          </a:p>
+        </p:txBody>
+      </p:sp>
+    </p:spTree>
+    <p:extLst>
+      <p:ext uri="{BB962C8B-B14F-4D97-AF65-F5344CB8AC3E}">
+        <p14:creationId xmlns:p14="http://schemas.microsoft.com/office/powerpoint/2010/main" val="3982386796"/>
+      </p:ext>
+    </p:extLst>
+  </p:cSld>
+  <p:clrMapOvr>
+    <a:masterClrMapping/>
+  </p:clrMapOvr>
+</p:sld>
+</file>
+
+<file path=ppt/slides/slide16.xml><?xml version="1.0" encoding="utf-8"?>
+<p:sld xmlns:a="http://schemas.openxmlformats.org/drawingml/2006/main" xmlns:r="http://schemas.openxmlformats.org/officeDocument/2006/relationships" xmlns:p="http://schemas.openxmlformats.org/presentationml/2006/main">
+  <p:cSld>
+    <p:spTree>
+      <p:nvGrpSpPr>
+        <p:cNvPr id="1" name=""/>
+        <p:cNvGrpSpPr/>
+        <p:nvPr/>
+      </p:nvGrpSpPr>
+      <p:grpSpPr>
+        <a:xfrm>
+          <a:off x="0" y="0"/>
+          <a:ext cx="0" cy="0"/>
+          <a:chOff x="0" y="0"/>
+          <a:chExt cx="0" cy="0"/>
+        </a:xfrm>
+      </p:grpSpPr>
+      <p:sp>
+        <p:nvSpPr>
+          <p:cNvPr id="2" name="Titel 1">
+            <a:extLst>
+              <a:ext uri="{FF2B5EF4-FFF2-40B4-BE49-F238E27FC236}">
+                <a16:creationId xmlns:a16="http://schemas.microsoft.com/office/drawing/2014/main" id="{7114DA6D-FE59-490A-9004-62DF38B2D936}"/>
+              </a:ext>
+            </a:extLst>
+          </p:cNvPr>
+          <p:cNvSpPr>
+            <a:spLocks noGrp="1"/>
+          </p:cNvSpPr>
+          <p:nvPr>
+            <p:ph type="title"/>
+          </p:nvPr>
+        </p:nvSpPr>
+        <p:spPr/>
+        <p:txBody>
+          <a:bodyPr/>
+          <a:lstStyle/>
+          <a:p>
+            <a:r>
+              <a:rPr lang="de-DE" dirty="0"/>
+              <a:t>Template </a:t>
+            </a:r>
+            <a:r>
+              <a:rPr lang="de-DE" dirty="0" err="1"/>
+              <a:t>Deployment</a:t>
+            </a:r>
+            <a:r>
+              <a:rPr lang="de-DE" dirty="0"/>
+              <a:t> </a:t>
+            </a:r>
+            <a:r>
+              <a:rPr lang="de-DE" dirty="0" err="1"/>
+              <a:t>Process</a:t>
+            </a:r>
+            <a:endParaRPr lang="de-DE" dirty="0"/>
+          </a:p>
+        </p:txBody>
+      </p:sp>
+      <p:sp>
+        <p:nvSpPr>
+          <p:cNvPr id="4" name="Fußzeilenplatzhalter 3">
+            <a:extLst>
+              <a:ext uri="{FF2B5EF4-FFF2-40B4-BE49-F238E27FC236}">
+                <a16:creationId xmlns:a16="http://schemas.microsoft.com/office/drawing/2014/main" id="{EAAA7E8D-7422-4D87-A4CD-DA509BDDF5DC}"/>
+              </a:ext>
+            </a:extLst>
+          </p:cNvPr>
+          <p:cNvSpPr>
+            <a:spLocks noGrp="1"/>
+          </p:cNvSpPr>
+          <p:nvPr>
+            <p:ph type="ftr" sz="quarter" idx="11"/>
+          </p:nvPr>
+        </p:nvSpPr>
+        <p:spPr/>
+        <p:txBody>
+          <a:bodyPr/>
+          <a:lstStyle/>
+          <a:p>
+            <a:r>
+              <a:rPr lang="de-DE" dirty="0"/>
+              <a:t>Azure Infrastructure </a:t>
+            </a:r>
+            <a:r>
+              <a:rPr lang="de-DE" dirty="0" err="1"/>
+              <a:t>Resource</a:t>
+            </a:r>
+            <a:r>
+              <a:rPr lang="de-DE" dirty="0"/>
+              <a:t> Template Tricks</a:t>
+            </a:r>
+          </a:p>
+        </p:txBody>
+      </p:sp>
+      <p:sp>
+        <p:nvSpPr>
+          <p:cNvPr id="5" name="Foliennummernplatzhalter 4">
+            <a:extLst>
+              <a:ext uri="{FF2B5EF4-FFF2-40B4-BE49-F238E27FC236}">
+                <a16:creationId xmlns:a16="http://schemas.microsoft.com/office/drawing/2014/main" id="{34D2BEEB-B9A2-4D14-85A6-544FCED20DD5}"/>
+              </a:ext>
+            </a:extLst>
+          </p:cNvPr>
+          <p:cNvSpPr>
+            <a:spLocks noGrp="1"/>
+          </p:cNvSpPr>
+          <p:nvPr>
+            <p:ph type="sldNum" sz="quarter" idx="12"/>
+          </p:nvPr>
+        </p:nvSpPr>
+        <p:spPr/>
+        <p:txBody>
+          <a:bodyPr/>
+          <a:lstStyle/>
+          <a:p>
+            <a:fld id="{EC4199FD-2E7C-41C7-A81B-1AFEDD0F02BC}" type="slidenum">
+              <a:rPr lang="de-DE" smtClean="0"/>
+              <a:t>16</a:t>
             </a:fld>
             <a:endParaRPr lang="de-DE"/>
           </a:p>
@@ -6738,15 +8989,21 @@
             <p:ph type="title"/>
           </p:nvPr>
         </p:nvSpPr>
-        <p:spPr/>
+        <p:spPr>
+          <a:xfrm>
+            <a:off x="838200" y="365125"/>
+            <a:ext cx="7517524" cy="1325563"/>
+          </a:xfrm>
+        </p:spPr>
         <p:txBody>
           <a:bodyPr/>
           <a:lstStyle/>
           <a:p>
             <a:r>
-              <a:rPr lang="de-DE" dirty="0"/>
+              <a:rPr lang="de-DE"/>
               <a:t>Unsere Sponsoren</a:t>
             </a:r>
+            <a:endParaRPr lang="de-DE" dirty="0"/>
           </a:p>
         </p:txBody>
       </p:sp>
@@ -6788,10 +9045,10 @@
       </p:pic>
       <p:pic>
         <p:nvPicPr>
-          <p:cNvPr id="1026" name="Picture 2" descr="ceterion">
-            <a:extLst>
-              <a:ext uri="{FF2B5EF4-FFF2-40B4-BE49-F238E27FC236}">
-                <a16:creationId xmlns:a16="http://schemas.microsoft.com/office/drawing/2014/main" id="{0CBFBFBC-2BAD-47EA-AB61-EAE0172B2954}"/>
+          <p:cNvPr id="1028" name="Picture 4" descr="Bildergebnis für Microsoft logo">
+            <a:extLst>
+              <a:ext uri="{FF2B5EF4-FFF2-40B4-BE49-F238E27FC236}">
+                <a16:creationId xmlns:a16="http://schemas.microsoft.com/office/drawing/2014/main" id="{4CC070BE-CE16-4002-AB62-B60CB898A3F0}"/>
               </a:ext>
             </a:extLst>
           </p:cNvPr>
@@ -6815,8 +9072,8 @@
         </p:blipFill>
         <p:spPr bwMode="auto">
           <a:xfrm>
-            <a:off x="4195114" y="1690688"/>
-            <a:ext cx="3740041" cy="2149449"/>
+            <a:off x="5898508" y="4752150"/>
+            <a:ext cx="2964930" cy="633136"/>
           </a:xfrm>
           <a:prstGeom prst="rect">
             <a:avLst/>
@@ -6833,17 +9090,85 @@
           </a:extLst>
         </p:spPr>
       </p:pic>
+      <p:sp>
+        <p:nvSpPr>
+          <p:cNvPr id="5" name="Fußzeilenplatzhalter 4">
+            <a:extLst>
+              <a:ext uri="{FF2B5EF4-FFF2-40B4-BE49-F238E27FC236}">
+                <a16:creationId xmlns:a16="http://schemas.microsoft.com/office/drawing/2014/main" id="{0E22C88B-2755-44A0-B550-70041F92D196}"/>
+              </a:ext>
+            </a:extLst>
+          </p:cNvPr>
+          <p:cNvSpPr>
+            <a:spLocks noGrp="1"/>
+          </p:cNvSpPr>
+          <p:nvPr>
+            <p:ph type="ftr" sz="quarter" idx="11"/>
+          </p:nvPr>
+        </p:nvSpPr>
+        <p:spPr>
+          <a:xfrm>
+            <a:off x="4038600" y="6356350"/>
+            <a:ext cx="4114800" cy="365125"/>
+          </a:xfrm>
+        </p:spPr>
+        <p:txBody>
+          <a:bodyPr/>
+          <a:lstStyle/>
+          <a:p>
+            <a:r>
+              <a:rPr lang="de-DE"/>
+              <a:t>Azure Infrastructure Resource Template Tricks</a:t>
+            </a:r>
+            <a:endParaRPr lang="de-DE" dirty="0"/>
+          </a:p>
+        </p:txBody>
+      </p:sp>
+      <p:sp>
+        <p:nvSpPr>
+          <p:cNvPr id="6" name="Foliennummernplatzhalter 5">
+            <a:extLst>
+              <a:ext uri="{FF2B5EF4-FFF2-40B4-BE49-F238E27FC236}">
+                <a16:creationId xmlns:a16="http://schemas.microsoft.com/office/drawing/2014/main" id="{C0E8A5B5-BCD0-4170-9626-C70205D9CD33}"/>
+              </a:ext>
+            </a:extLst>
+          </p:cNvPr>
+          <p:cNvSpPr>
+            <a:spLocks noGrp="1"/>
+          </p:cNvSpPr>
+          <p:nvPr>
+            <p:ph type="sldNum" sz="quarter" idx="12"/>
+          </p:nvPr>
+        </p:nvSpPr>
+        <p:spPr>
+          <a:xfrm>
+            <a:off x="8610600" y="6356350"/>
+            <a:ext cx="2743200" cy="365125"/>
+          </a:xfrm>
+        </p:spPr>
+        <p:txBody>
+          <a:bodyPr/>
+          <a:lstStyle/>
+          <a:p>
+            <a:fld id="{EC4199FD-2E7C-41C7-A81B-1AFEDD0F02BC}" type="slidenum">
+              <a:rPr lang="de-DE" smtClean="0"/>
+              <a:t>2</a:t>
+            </a:fld>
+            <a:endParaRPr lang="de-DE"/>
+          </a:p>
+        </p:txBody>
+      </p:sp>
       <p:pic>
         <p:nvPicPr>
-          <p:cNvPr id="1028" name="Picture 4" descr="Bildergebnis für Microsoft logo">
-            <a:extLst>
-              <a:ext uri="{FF2B5EF4-FFF2-40B4-BE49-F238E27FC236}">
-                <a16:creationId xmlns:a16="http://schemas.microsoft.com/office/drawing/2014/main" id="{4CC070BE-CE16-4002-AB62-B60CB898A3F0}"/>
+          <p:cNvPr id="9" name="Picture 8" descr="A close up of a logo&#10;&#10;Description generated with very high confidence">
+            <a:extLst>
+              <a:ext uri="{FF2B5EF4-FFF2-40B4-BE49-F238E27FC236}">
+                <a16:creationId xmlns:a16="http://schemas.microsoft.com/office/drawing/2014/main" id="{4CF2E871-8ECE-43BF-ACA9-20D301162C03}"/>
               </a:ext>
             </a:extLst>
           </p:cNvPr>
           <p:cNvPicPr>
-            <a:picLocks noChangeAspect="1" noChangeArrowheads="1"/>
+            <a:picLocks noChangeAspect="1"/>
           </p:cNvPicPr>
           <p:nvPr/>
         </p:nvPicPr>
@@ -6855,102 +9180,20 @@
               </a:ext>
             </a:extLst>
           </a:blip>
-          <a:srcRect/>
           <a:stretch>
             <a:fillRect/>
           </a:stretch>
         </p:blipFill>
-        <p:spPr bwMode="auto">
-          <a:xfrm>
-            <a:off x="5898508" y="4752150"/>
-            <a:ext cx="2964930" cy="633136"/>
+        <p:spPr>
+          <a:xfrm>
+            <a:off x="3620967" y="1292459"/>
+            <a:ext cx="5242471" cy="3276545"/>
           </a:xfrm>
           <a:prstGeom prst="rect">
             <a:avLst/>
           </a:prstGeom>
-          <a:noFill/>
-          <a:extLst>
-            <a:ext uri="{909E8E84-426E-40DD-AFC4-6F175D3DCCD1}">
-              <a14:hiddenFill xmlns:a14="http://schemas.microsoft.com/office/drawing/2010/main">
-                <a:solidFill>
-                  <a:srgbClr val="FFFFFF"/>
-                </a:solidFill>
-              </a14:hiddenFill>
-            </a:ext>
-          </a:extLst>
         </p:spPr>
       </p:pic>
-      <p:sp>
-        <p:nvSpPr>
-          <p:cNvPr id="5" name="Fußzeilenplatzhalter 4">
-            <a:extLst>
-              <a:ext uri="{FF2B5EF4-FFF2-40B4-BE49-F238E27FC236}">
-                <a16:creationId xmlns:a16="http://schemas.microsoft.com/office/drawing/2014/main" id="{0E22C88B-2755-44A0-B550-70041F92D196}"/>
-              </a:ext>
-            </a:extLst>
-          </p:cNvPr>
-          <p:cNvSpPr>
-            <a:spLocks noGrp="1"/>
-          </p:cNvSpPr>
-          <p:nvPr>
-            <p:ph type="ftr" sz="quarter" idx="11"/>
-          </p:nvPr>
-        </p:nvSpPr>
-        <p:spPr/>
-        <p:txBody>
-          <a:bodyPr/>
-          <a:lstStyle/>
-          <a:p>
-            <a:r>
-              <a:rPr lang="de-DE" dirty="0"/>
-              <a:t>Deploy Christmas </a:t>
-            </a:r>
-          </a:p>
-          <a:p>
-            <a:r>
-              <a:rPr lang="de-DE" dirty="0"/>
-              <a:t> Azure Infrastructure </a:t>
-            </a:r>
-            <a:r>
-              <a:rPr lang="de-DE" dirty="0" err="1"/>
-              <a:t>Resource</a:t>
-            </a:r>
-            <a:r>
-              <a:rPr lang="de-DE" dirty="0"/>
-              <a:t> Template Tricks</a:t>
-            </a:r>
-          </a:p>
-        </p:txBody>
-      </p:sp>
-      <p:sp>
-        <p:nvSpPr>
-          <p:cNvPr id="6" name="Foliennummernplatzhalter 5">
-            <a:extLst>
-              <a:ext uri="{FF2B5EF4-FFF2-40B4-BE49-F238E27FC236}">
-                <a16:creationId xmlns:a16="http://schemas.microsoft.com/office/drawing/2014/main" id="{C0E8A5B5-BCD0-4170-9626-C70205D9CD33}"/>
-              </a:ext>
-            </a:extLst>
-          </p:cNvPr>
-          <p:cNvSpPr>
-            <a:spLocks noGrp="1"/>
-          </p:cNvSpPr>
-          <p:nvPr>
-            <p:ph type="sldNum" sz="quarter" idx="12"/>
-          </p:nvPr>
-        </p:nvSpPr>
-        <p:spPr/>
-        <p:txBody>
-          <a:bodyPr/>
-          <a:lstStyle/>
-          <a:p>
-            <a:fld id="{EC4199FD-2E7C-41C7-A81B-1AFEDD0F02BC}" type="slidenum">
-              <a:rPr lang="de-DE" smtClean="0"/>
-              <a:t>2</a:t>
-            </a:fld>
-            <a:endParaRPr lang="de-DE"/>
-          </a:p>
-        </p:txBody>
-      </p:sp>
     </p:spTree>
     <p:extLst>
       <p:ext uri="{BB962C8B-B14F-4D97-AF65-F5344CB8AC3E}">
@@ -6981,6 +9224,42 @@
           <a:chExt cx="0" cy="0"/>
         </a:xfrm>
       </p:grpSpPr>
+      <p:pic>
+        <p:nvPicPr>
+          <p:cNvPr id="22" name="Picture 21">
+            <a:extLst>
+              <a:ext uri="{FF2B5EF4-FFF2-40B4-BE49-F238E27FC236}">
+                <a16:creationId xmlns:a16="http://schemas.microsoft.com/office/drawing/2014/main" id="{2E6A8C88-4F8F-438B-ADCD-F571DF0A9F64}"/>
+              </a:ext>
+            </a:extLst>
+          </p:cNvPr>
+          <p:cNvPicPr>
+            <a:picLocks noChangeAspect="1"/>
+          </p:cNvPicPr>
+          <p:nvPr/>
+        </p:nvPicPr>
+        <p:blipFill>
+          <a:blip r:embed="rId2">
+            <a:extLst>
+              <a:ext uri="{28A0092B-C50C-407E-A947-70E740481C1C}">
+                <a14:useLocalDpi xmlns:a14="http://schemas.microsoft.com/office/drawing/2010/main" val="0"/>
+              </a:ext>
+            </a:extLst>
+          </a:blip>
+          <a:stretch>
+            <a:fillRect/>
+          </a:stretch>
+        </p:blipFill>
+        <p:spPr>
+          <a:xfrm>
+            <a:off x="7004482" y="1552604"/>
+            <a:ext cx="4114800" cy="4114800"/>
+          </a:xfrm>
+          <a:prstGeom prst="rect">
+            <a:avLst/>
+          </a:prstGeom>
+        </p:spPr>
+      </p:pic>
       <p:sp>
         <p:nvSpPr>
           <p:cNvPr id="9" name="Textfeld 8">
@@ -6996,7 +9275,7 @@
         <p:spPr>
           <a:xfrm>
             <a:off x="3410607" y="2508031"/>
-            <a:ext cx="3794235" cy="2031325"/>
+            <a:ext cx="3794235" cy="369332"/>
           </a:xfrm>
           <a:prstGeom prst="rect">
             <a:avLst/>
@@ -7021,96 +9300,32 @@
             </a:r>
             <a:endParaRPr lang="de-DE" b="1" dirty="0"/>
           </a:p>
-          <a:p>
-            <a:endParaRPr lang="de-DE" dirty="0"/>
-          </a:p>
+        </p:txBody>
+      </p:sp>
+      <p:sp>
+        <p:nvSpPr>
+          <p:cNvPr id="14" name="Fußzeilenplatzhalter 13">
+            <a:extLst>
+              <a:ext uri="{FF2B5EF4-FFF2-40B4-BE49-F238E27FC236}">
+                <a16:creationId xmlns:a16="http://schemas.microsoft.com/office/drawing/2014/main" id="{845BCE41-33F1-40BB-955F-3D6084B6C4B8}"/>
+              </a:ext>
+            </a:extLst>
+          </p:cNvPr>
+          <p:cNvSpPr>
+            <a:spLocks noGrp="1"/>
+          </p:cNvSpPr>
+          <p:nvPr>
+            <p:ph type="ftr" sz="quarter" idx="11"/>
+          </p:nvPr>
+        </p:nvSpPr>
+        <p:spPr/>
+        <p:txBody>
+          <a:bodyPr/>
+          <a:lstStyle/>
           <a:p>
             <a:r>
               <a:rPr lang="de-DE" dirty="0"/>
-              <a:t>@</a:t>
-            </a:r>
-            <a:r>
-              <a:rPr lang="de-DE" dirty="0" err="1"/>
-              <a:t>fabianflanhardt</a:t>
-            </a:r>
-            <a:endParaRPr lang="de-DE" dirty="0"/>
-          </a:p>
-          <a:p>
-            <a:endParaRPr lang="de-DE" dirty="0">
-              <a:hlinkClick r:id="rId2"/>
-            </a:endParaRPr>
-          </a:p>
-          <a:p>
-            <a:r>
-              <a:rPr lang="de-DE" dirty="0">
-                <a:hlinkClick r:id="rId2"/>
-              </a:rPr>
-              <a:t>fabian.</a:t>
-            </a:r>
-            <a:r>
-              <a:rPr lang="de-DE" dirty="0">
-                <a:cs typeface="Segoe UI"/>
-                <a:hlinkClick r:id="rId2"/>
-              </a:rPr>
-              <a:t>flanhardt@outlook.com</a:t>
-            </a:r>
-            <a:endParaRPr lang="de-DE" dirty="0">
-              <a:cs typeface="Segoe UI"/>
-            </a:endParaRPr>
-          </a:p>
-          <a:p>
-            <a:r>
-              <a:rPr lang="de-DE" dirty="0">
-                <a:hlinkClick r:id="rId3"/>
-              </a:rPr>
-              <a:t>fabian.</a:t>
-            </a:r>
-            <a:r>
-              <a:rPr lang="de-DE" dirty="0">
-                <a:cs typeface="Segoe UI"/>
-                <a:hlinkClick r:id="rId3"/>
-              </a:rPr>
-              <a:t>flanhardt@ceterion.com</a:t>
-            </a:r>
-            <a:endParaRPr lang="de-DE" dirty="0">
-              <a:cs typeface="Segoe UI"/>
-            </a:endParaRPr>
-          </a:p>
-          <a:p>
-            <a:endParaRPr lang="de-DE" dirty="0"/>
-          </a:p>
-        </p:txBody>
-      </p:sp>
-      <p:sp>
-        <p:nvSpPr>
-          <p:cNvPr id="14" name="Fußzeilenplatzhalter 13">
-            <a:extLst>
-              <a:ext uri="{FF2B5EF4-FFF2-40B4-BE49-F238E27FC236}">
-                <a16:creationId xmlns:a16="http://schemas.microsoft.com/office/drawing/2014/main" id="{845BCE41-33F1-40BB-955F-3D6084B6C4B8}"/>
-              </a:ext>
-            </a:extLst>
-          </p:cNvPr>
-          <p:cNvSpPr>
-            <a:spLocks noGrp="1"/>
-          </p:cNvSpPr>
-          <p:nvPr>
-            <p:ph type="ftr" sz="quarter" idx="11"/>
-          </p:nvPr>
-        </p:nvSpPr>
-        <p:spPr/>
-        <p:txBody>
-          <a:bodyPr/>
-          <a:lstStyle/>
-          <a:p>
-            <a:r>
-              <a:rPr lang="de-DE" dirty="0"/>
-              <a:t>Deploy Christmas </a:t>
-            </a:r>
-          </a:p>
-          <a:p>
-            <a:r>
-              <a:rPr lang="de-DE" dirty="0"/>
-              <a:t> Azure Infrastructure </a:t>
+              <a:t>Azure Infrastructure </a:t>
             </a:r>
             <a:r>
               <a:rPr lang="de-DE" dirty="0" err="1"/>
@@ -7158,6 +9373,75 @@
             <a:extLst>
               <a:ext uri="{FF2B5EF4-FFF2-40B4-BE49-F238E27FC236}">
                 <a16:creationId xmlns:a16="http://schemas.microsoft.com/office/drawing/2014/main" id="{B940B00D-4869-4248-A92C-7DF18E622BAC}"/>
+              </a:ext>
+            </a:extLst>
+          </p:cNvPr>
+          <p:cNvPicPr>
+            <a:picLocks noChangeAspect="1"/>
+          </p:cNvPicPr>
+          <p:nvPr/>
+        </p:nvPicPr>
+        <p:blipFill>
+          <a:blip r:embed="rId3">
+            <a:extLst>
+              <a:ext uri="{28A0092B-C50C-407E-A947-70E740481C1C}">
+                <a14:useLocalDpi xmlns:a14="http://schemas.microsoft.com/office/drawing/2010/main" val="0"/>
+              </a:ext>
+            </a:extLst>
+          </a:blip>
+          <a:stretch>
+            <a:fillRect/>
+          </a:stretch>
+        </p:blipFill>
+        <p:spPr>
+          <a:xfrm>
+            <a:off x="1516359" y="2504842"/>
+            <a:ext cx="1680164" cy="1848315"/>
+          </a:xfrm>
+          <a:prstGeom prst="rect">
+            <a:avLst/>
+          </a:prstGeom>
+        </p:spPr>
+      </p:pic>
+      <p:sp>
+        <p:nvSpPr>
+          <p:cNvPr id="17" name="Titel 1">
+            <a:extLst>
+              <a:ext uri="{FF2B5EF4-FFF2-40B4-BE49-F238E27FC236}">
+                <a16:creationId xmlns:a16="http://schemas.microsoft.com/office/drawing/2014/main" id="{99947366-B9EF-4439-8DEA-79BBAD3F88FB}"/>
+              </a:ext>
+            </a:extLst>
+          </p:cNvPr>
+          <p:cNvSpPr>
+            <a:spLocks noGrp="1"/>
+          </p:cNvSpPr>
+          <p:nvPr>
+            <p:ph type="title"/>
+          </p:nvPr>
+        </p:nvSpPr>
+        <p:spPr>
+          <a:xfrm>
+            <a:off x="838200" y="365125"/>
+            <a:ext cx="7517524" cy="1325563"/>
+          </a:xfrm>
+        </p:spPr>
+        <p:txBody>
+          <a:bodyPr/>
+          <a:lstStyle/>
+          <a:p>
+            <a:r>
+              <a:rPr lang="de-DE" dirty="0"/>
+              <a:t>Profil</a:t>
+            </a:r>
+          </a:p>
+        </p:txBody>
+      </p:sp>
+      <p:pic>
+        <p:nvPicPr>
+          <p:cNvPr id="3" name="Picture 2" descr="A picture containing clipart&#10;&#10;Description generated with very high confidence">
+            <a:extLst>
+              <a:ext uri="{FF2B5EF4-FFF2-40B4-BE49-F238E27FC236}">
+                <a16:creationId xmlns:a16="http://schemas.microsoft.com/office/drawing/2014/main" id="{B92BC594-D477-405E-8E86-98F1F98E2103}"/>
               </a:ext>
             </a:extLst>
           </p:cNvPr>
@@ -7180,8 +9464,8 @@
         </p:blipFill>
         <p:spPr>
           <a:xfrm>
-            <a:off x="1516359" y="2504842"/>
-            <a:ext cx="1680164" cy="1848315"/>
+            <a:off x="3493324" y="3511716"/>
+            <a:ext cx="369332" cy="369332"/>
           </a:xfrm>
           <a:prstGeom prst="rect">
             <a:avLst/>
@@ -7190,15 +9474,15 @@
       </p:pic>
       <p:pic>
         <p:nvPicPr>
-          <p:cNvPr id="16" name="Picture 2" descr="ceterion">
-            <a:extLst>
-              <a:ext uri="{FF2B5EF4-FFF2-40B4-BE49-F238E27FC236}">
-                <a16:creationId xmlns:a16="http://schemas.microsoft.com/office/drawing/2014/main" id="{57AE281E-A92B-4715-8A96-F80F6F52F92A}"/>
+          <p:cNvPr id="6" name="Picture 5">
+            <a:extLst>
+              <a:ext uri="{FF2B5EF4-FFF2-40B4-BE49-F238E27FC236}">
+                <a16:creationId xmlns:a16="http://schemas.microsoft.com/office/drawing/2014/main" id="{440AF257-48C1-4B6A-8A00-9AD48749A94D}"/>
               </a:ext>
             </a:extLst>
           </p:cNvPr>
           <p:cNvPicPr>
-            <a:picLocks noChangeAspect="1" noChangeArrowheads="1"/>
+            <a:picLocks noChangeAspect="1"/>
           </p:cNvPicPr>
           <p:nvPr/>
         </p:nvPicPr>
@@ -7210,64 +9494,182 @@
               </a:ext>
             </a:extLst>
           </a:blip>
-          <a:srcRect/>
           <a:stretch>
             <a:fillRect/>
           </a:stretch>
         </p:blipFill>
-        <p:spPr bwMode="auto">
-          <a:xfrm>
-            <a:off x="7323377" y="2504842"/>
-            <a:ext cx="3061376" cy="1759412"/>
+        <p:spPr>
+          <a:xfrm>
+            <a:off x="3493324" y="3015216"/>
+            <a:ext cx="369332" cy="369332"/>
+          </a:xfrm>
+          <a:prstGeom prst="rect">
+            <a:avLst/>
+          </a:prstGeom>
+        </p:spPr>
+      </p:pic>
+      <p:sp>
+        <p:nvSpPr>
+          <p:cNvPr id="10" name="TextBox 9">
+            <a:extLst>
+              <a:ext uri="{FF2B5EF4-FFF2-40B4-BE49-F238E27FC236}">
+                <a16:creationId xmlns:a16="http://schemas.microsoft.com/office/drawing/2014/main" id="{A33514BF-EE76-49B7-B36C-CC80BA4FE2E3}"/>
+              </a:ext>
+            </a:extLst>
+          </p:cNvPr>
+          <p:cNvSpPr txBox="1"/>
+          <p:nvPr/>
+        </p:nvSpPr>
+        <p:spPr>
+          <a:xfrm>
+            <a:off x="3862656" y="3016760"/>
+            <a:ext cx="2601897" cy="369332"/>
           </a:xfrm>
           <a:prstGeom prst="rect">
             <a:avLst/>
           </a:prstGeom>
           <a:noFill/>
-          <a:extLst>
-            <a:ext uri="{909E8E84-426E-40DD-AFC4-6F175D3DCCD1}">
-              <a14:hiddenFill xmlns:a14="http://schemas.microsoft.com/office/drawing/2010/main">
-                <a:solidFill>
-                  <a:srgbClr val="FFFFFF"/>
-                </a:solidFill>
-              </a14:hiddenFill>
-            </a:ext>
-          </a:extLst>
+        </p:spPr>
+        <p:txBody>
+          <a:bodyPr wrap="square" rtlCol="0">
+            <a:spAutoFit/>
+          </a:bodyPr>
+          <a:lstStyle/>
+          <a:p>
+            <a:r>
+              <a:rPr lang="en-US" dirty="0"/>
+              <a:t>@</a:t>
+            </a:r>
+            <a:r>
+              <a:rPr lang="en-US" dirty="0" err="1"/>
+              <a:t>fabianflanhardt</a:t>
+            </a:r>
+            <a:endParaRPr lang="en-US" dirty="0"/>
+          </a:p>
+        </p:txBody>
+      </p:sp>
+      <p:sp>
+        <p:nvSpPr>
+          <p:cNvPr id="12" name="TextBox 11">
+            <a:extLst>
+              <a:ext uri="{FF2B5EF4-FFF2-40B4-BE49-F238E27FC236}">
+                <a16:creationId xmlns:a16="http://schemas.microsoft.com/office/drawing/2014/main" id="{6698E5A6-5FEB-4BF0-91D2-B6A49B8C5D6C}"/>
+              </a:ext>
+            </a:extLst>
+          </p:cNvPr>
+          <p:cNvSpPr txBox="1"/>
+          <p:nvPr/>
+        </p:nvSpPr>
+        <p:spPr>
+          <a:xfrm>
+            <a:off x="3862655" y="4014615"/>
+            <a:ext cx="3313728" cy="646331"/>
+          </a:xfrm>
+          <a:prstGeom prst="rect">
+            <a:avLst/>
+          </a:prstGeom>
+          <a:noFill/>
+        </p:spPr>
+        <p:txBody>
+          <a:bodyPr wrap="none" rtlCol="0">
+            <a:spAutoFit/>
+          </a:bodyPr>
+          <a:lstStyle/>
+          <a:p>
+            <a:r>
+              <a:rPr lang="de-DE" dirty="0">
+                <a:hlinkClick r:id="rId6"/>
+              </a:rPr>
+              <a:t>fabian.</a:t>
+            </a:r>
+            <a:r>
+              <a:rPr lang="de-DE" dirty="0">
+                <a:cs typeface="Segoe UI"/>
+                <a:hlinkClick r:id="rId6"/>
+              </a:rPr>
+              <a:t>flanhardt@outlook.com</a:t>
+            </a:r>
+            <a:endParaRPr lang="de-DE" dirty="0">
+              <a:cs typeface="Segoe UI"/>
+            </a:endParaRPr>
+          </a:p>
+          <a:p>
+            <a:r>
+              <a:rPr lang="de-DE" dirty="0">
+                <a:cs typeface="Segoe UI"/>
+                <a:hlinkClick r:id="rId7"/>
+              </a:rPr>
+              <a:t>fabian.flanhardt@ceterion.com</a:t>
+            </a:r>
+            <a:endParaRPr lang="en-US" dirty="0"/>
+          </a:p>
+        </p:txBody>
+      </p:sp>
+      <p:sp>
+        <p:nvSpPr>
+          <p:cNvPr id="19" name="TextBox 18">
+            <a:extLst>
+              <a:ext uri="{FF2B5EF4-FFF2-40B4-BE49-F238E27FC236}">
+                <a16:creationId xmlns:a16="http://schemas.microsoft.com/office/drawing/2014/main" id="{5693B421-96B4-496E-8F93-A15FC6D87C50}"/>
+              </a:ext>
+            </a:extLst>
+          </p:cNvPr>
+          <p:cNvSpPr txBox="1"/>
+          <p:nvPr/>
+        </p:nvSpPr>
+        <p:spPr>
+          <a:xfrm>
+            <a:off x="3862656" y="3504332"/>
+            <a:ext cx="2601897" cy="369332"/>
+          </a:xfrm>
+          <a:prstGeom prst="rect">
+            <a:avLst/>
+          </a:prstGeom>
+          <a:noFill/>
+        </p:spPr>
+        <p:txBody>
+          <a:bodyPr wrap="square" rtlCol="0">
+            <a:spAutoFit/>
+          </a:bodyPr>
+          <a:lstStyle/>
+          <a:p>
+            <a:r>
+              <a:rPr lang="en-US" dirty="0"/>
+              <a:t>Fabian Flanhardt</a:t>
+            </a:r>
+          </a:p>
+        </p:txBody>
+      </p:sp>
+      <p:pic>
+        <p:nvPicPr>
+          <p:cNvPr id="13" name="Picture 12">
+            <a:extLst>
+              <a:ext uri="{FF2B5EF4-FFF2-40B4-BE49-F238E27FC236}">
+                <a16:creationId xmlns:a16="http://schemas.microsoft.com/office/drawing/2014/main" id="{EB5BF93E-77E5-4167-9B49-82A9867A22B6}"/>
+              </a:ext>
+            </a:extLst>
+          </p:cNvPr>
+          <p:cNvPicPr>
+            <a:picLocks noChangeAspect="1"/>
+          </p:cNvPicPr>
+          <p:nvPr/>
+        </p:nvPicPr>
+        <p:blipFill>
+          <a:blip r:embed="rId8"/>
+          <a:stretch>
+            <a:fillRect/>
+          </a:stretch>
+        </p:blipFill>
+        <p:spPr>
+          <a:xfrm>
+            <a:off x="3493324" y="4081394"/>
+            <a:ext cx="369331" cy="286263"/>
+          </a:xfrm>
+          <a:prstGeom prst="rect">
+            <a:avLst/>
+          </a:prstGeom>
         </p:spPr>
       </p:pic>
-      <p:sp>
-        <p:nvSpPr>
-          <p:cNvPr id="17" name="Titel 1">
-            <a:extLst>
-              <a:ext uri="{FF2B5EF4-FFF2-40B4-BE49-F238E27FC236}">
-                <a16:creationId xmlns:a16="http://schemas.microsoft.com/office/drawing/2014/main" id="{99947366-B9EF-4439-8DEA-79BBAD3F88FB}"/>
-              </a:ext>
-            </a:extLst>
-          </p:cNvPr>
-          <p:cNvSpPr>
-            <a:spLocks noGrp="1"/>
-          </p:cNvSpPr>
-          <p:nvPr>
-            <p:ph type="title"/>
-          </p:nvPr>
-        </p:nvSpPr>
-        <p:spPr>
-          <a:xfrm>
-            <a:off x="838200" y="365125"/>
-            <a:ext cx="7517524" cy="1325563"/>
-          </a:xfrm>
-        </p:spPr>
-        <p:txBody>
-          <a:bodyPr/>
-          <a:lstStyle/>
-          <a:p>
-            <a:r>
-              <a:rPr lang="de-DE" dirty="0"/>
-              <a:t>Profil</a:t>
-            </a:r>
-          </a:p>
-        </p:txBody>
-      </p:sp>
     </p:spTree>
     <p:extLst>
       <p:ext uri="{BB962C8B-B14F-4D97-AF65-F5344CB8AC3E}">
@@ -7350,13 +9752,7 @@
           <a:p>
             <a:r>
               <a:rPr lang="de-DE" dirty="0"/>
-              <a:t>Deploy Christmas </a:t>
-            </a:r>
-          </a:p>
-          <a:p>
-            <a:r>
-              <a:rPr lang="de-DE" dirty="0"/>
-              <a:t> Azure Infrastructure </a:t>
+              <a:t>Azure Infrastructure </a:t>
             </a:r>
             <a:r>
               <a:rPr lang="de-DE" dirty="0" err="1"/>
@@ -7783,13 +10179,7 @@
           <a:p>
             <a:r>
               <a:rPr lang="de-DE" dirty="0"/>
-              <a:t>Deploy Christmas </a:t>
-            </a:r>
-          </a:p>
-          <a:p>
-            <a:r>
-              <a:rPr lang="de-DE" dirty="0"/>
-              <a:t> Azure Infrastructure </a:t>
+              <a:t>Azure Infrastructure </a:t>
             </a:r>
             <a:r>
               <a:rPr lang="de-DE" dirty="0" err="1"/>
@@ -8055,13 +10445,7 @@
           <a:p>
             <a:r>
               <a:rPr lang="de-DE" dirty="0"/>
-              <a:t>Deploy Christmas </a:t>
-            </a:r>
-          </a:p>
-          <a:p>
-            <a:r>
-              <a:rPr lang="de-DE" dirty="0"/>
-              <a:t> Azure Infrastructure </a:t>
+              <a:t>Azure Infrastructure </a:t>
             </a:r>
             <a:r>
               <a:rPr lang="de-DE" dirty="0" err="1"/>
@@ -8337,13 +10721,7 @@
           <a:p>
             <a:r>
               <a:rPr lang="de-DE" dirty="0"/>
-              <a:t>Deploy Christmas </a:t>
-            </a:r>
-          </a:p>
-          <a:p>
-            <a:r>
-              <a:rPr lang="de-DE" dirty="0"/>
-              <a:t> Azure Infrastructure </a:t>
+              <a:t>Azure Infrastructure </a:t>
             </a:r>
             <a:r>
               <a:rPr lang="de-DE" dirty="0" err="1"/>
@@ -8887,13 +11265,7 @@
           <a:p>
             <a:r>
               <a:rPr lang="de-DE" dirty="0"/>
-              <a:t>Deploy Christmas </a:t>
-            </a:r>
-          </a:p>
-          <a:p>
-            <a:r>
-              <a:rPr lang="de-DE" dirty="0"/>
-              <a:t> Azure Infrastructure </a:t>
+              <a:t>Azure Infrastructure </a:t>
             </a:r>
             <a:r>
               <a:rPr lang="de-DE" dirty="0" err="1"/>
@@ -9299,13 +11671,7 @@
           <a:p>
             <a:r>
               <a:rPr lang="de-DE" dirty="0"/>
-              <a:t>Deploy Christmas </a:t>
-            </a:r>
-          </a:p>
-          <a:p>
-            <a:r>
-              <a:rPr lang="de-DE" dirty="0"/>
-              <a:t> Azure Infrastructure </a:t>
+              <a:t>Azure Infrastructure </a:t>
             </a:r>
             <a:r>
               <a:rPr lang="de-DE" dirty="0" err="1"/>
@@ -10520,21 +12886,6 @@
 </file>
 
 <file path=customXml/item1.xml><?xml version="1.0" encoding="utf-8"?>
-<?mso-contentType ?>
-<FormTemplates xmlns="http://schemas.microsoft.com/sharepoint/v3/contenttype/forms">
-  <Display>DocumentLibraryForm</Display>
-  <Edit>DocumentLibraryForm</Edit>
-  <New>DocumentLibraryForm</New>
-</FormTemplates>
-</file>
-
-<file path=customXml/item2.xml><?xml version="1.0" encoding="utf-8"?>
-<p:properties xmlns:p="http://schemas.microsoft.com/office/2006/metadata/properties" xmlns:xsi="http://www.w3.org/2001/XMLSchema-instance" xmlns:pc="http://schemas.microsoft.com/office/infopath/2007/PartnerControls">
-  <documentManagement/>
-</p:properties>
-</file>
-
-<file path=customXml/item3.xml><?xml version="1.0" encoding="utf-8"?>
 <ct:contentTypeSchema xmlns:ct="http://schemas.microsoft.com/office/2006/metadata/contentType" xmlns:ma="http://schemas.microsoft.com/office/2006/metadata/properties/metaAttributes" ct:_="" ma:_="" ma:contentTypeName="Document" ma:contentTypeID="0x0101001F112F312FB99D4C8C85E3CAD0E55F42" ma:contentTypeVersion="4" ma:contentTypeDescription="Create a new document." ma:contentTypeScope="" ma:versionID="ec48e5751b103e566fe3d559e8dd9e2b">
   <xsd:schema xmlns:xsd="http://www.w3.org/2001/XMLSchema" xmlns:xs="http://www.w3.org/2001/XMLSchema" xmlns:p="http://schemas.microsoft.com/office/2006/metadata/properties" xmlns:ns2="d852a3fa-7f53-4bce-9e2d-7f4925209575" targetNamespace="http://schemas.microsoft.com/office/2006/metadata/properties" ma:root="true" ma:fieldsID="5d73d0c807f4727bdee2e942b5c886d3" ns2:_="">
     <xsd:import namespace="d852a3fa-7f53-4bce-9e2d-7f4925209575"/>
@@ -10680,10 +13031,35 @@
 </ct:contentTypeSchema>
 </file>
 
+<file path=customXml/item2.xml><?xml version="1.0" encoding="utf-8"?>
+<p:properties xmlns:p="http://schemas.microsoft.com/office/2006/metadata/properties" xmlns:xsi="http://www.w3.org/2001/XMLSchema-instance" xmlns:pc="http://schemas.microsoft.com/office/infopath/2007/PartnerControls">
+  <documentManagement/>
+</p:properties>
+</file>
+
+<file path=customXml/item3.xml><?xml version="1.0" encoding="utf-8"?>
+<?mso-contentType ?>
+<FormTemplates xmlns="http://schemas.microsoft.com/sharepoint/v3/contenttype/forms">
+  <Display>DocumentLibraryForm</Display>
+  <Edit>DocumentLibraryForm</Edit>
+  <New>DocumentLibraryForm</New>
+</FormTemplates>
+</file>
+
 <file path=customXml/itemProps1.xml><?xml version="1.0" encoding="utf-8"?>
-<ds:datastoreItem xmlns:ds="http://schemas.openxmlformats.org/officeDocument/2006/customXml" ds:itemID="{AB651D1B-557D-4042-BC35-EFEC30942A2C}">
+<ds:datastoreItem xmlns:ds="http://schemas.openxmlformats.org/officeDocument/2006/customXml" ds:itemID="{2A9F5563-62DB-4324-9FCF-4BA7D8C0532C}">
   <ds:schemaRefs>
-    <ds:schemaRef ds:uri="http://schemas.microsoft.com/sharepoint/v3/contenttype/forms"/>
+    <ds:schemaRef ds:uri="d852a3fa-7f53-4bce-9e2d-7f4925209575"/>
+    <ds:schemaRef ds:uri="http://purl.org/dc/elements/1.1/"/>
+    <ds:schemaRef ds:uri="http://purl.org/dc/terms/"/>
+    <ds:schemaRef ds:uri="http://schemas.microsoft.com/internal/obd"/>
+    <ds:schemaRef ds:uri="http://schemas.microsoft.com/office/2006/documentManagement/types"/>
+    <ds:schemaRef ds:uri="http://schemas.microsoft.com/office/2006/metadata/contentType"/>
+    <ds:schemaRef ds:uri="http://schemas.microsoft.com/office/2006/metadata/properties"/>
+    <ds:schemaRef ds:uri="http://schemas.microsoft.com/office/2006/metadata/properties/metaAttributes"/>
+    <ds:schemaRef ds:uri="http://schemas.microsoft.com/office/infopath/2007/PartnerControls"/>
+    <ds:schemaRef ds:uri="http://schemas.openxmlformats.org/package/2006/metadata/core-properties"/>
+    <ds:schemaRef ds:uri="http://www.w3.org/2001/XMLSchema"/>
   </ds:schemaRefs>
 </ds:datastoreItem>
 </file>
@@ -10705,19 +13081,9 @@
 </file>
 
 <file path=customXml/itemProps3.xml><?xml version="1.0" encoding="utf-8"?>
-<ds:datastoreItem xmlns:ds="http://schemas.openxmlformats.org/officeDocument/2006/customXml" ds:itemID="{2A9F5563-62DB-4324-9FCF-4BA7D8C0532C}">
+<ds:datastoreItem xmlns:ds="http://schemas.openxmlformats.org/officeDocument/2006/customXml" ds:itemID="{AB651D1B-557D-4042-BC35-EFEC30942A2C}">
   <ds:schemaRefs>
-    <ds:schemaRef ds:uri="d852a3fa-7f53-4bce-9e2d-7f4925209575"/>
-    <ds:schemaRef ds:uri="http://purl.org/dc/elements/1.1/"/>
-    <ds:schemaRef ds:uri="http://purl.org/dc/terms/"/>
-    <ds:schemaRef ds:uri="http://schemas.microsoft.com/internal/obd"/>
-    <ds:schemaRef ds:uri="http://schemas.microsoft.com/office/2006/documentManagement/types"/>
-    <ds:schemaRef ds:uri="http://schemas.microsoft.com/office/2006/metadata/contentType"/>
-    <ds:schemaRef ds:uri="http://schemas.microsoft.com/office/2006/metadata/properties"/>
-    <ds:schemaRef ds:uri="http://schemas.microsoft.com/office/2006/metadata/properties/metaAttributes"/>
-    <ds:schemaRef ds:uri="http://schemas.microsoft.com/office/infopath/2007/PartnerControls"/>
-    <ds:schemaRef ds:uri="http://schemas.openxmlformats.org/package/2006/metadata/core-properties"/>
-    <ds:schemaRef ds:uri="http://www.w3.org/2001/XMLSchema"/>
+    <ds:schemaRef ds:uri="http://schemas.microsoft.com/sharepoint/v3/contenttype/forms"/>
   </ds:schemaRefs>
 </ds:datastoreItem>
 </file>
</xml_diff>